<commit_message>
chopped down to 5 chapters. finished reviesing the equation chapter. Now I need to rewrite the GPU stuff
</commit_message>
<xml_diff>
--- a/figures/eq_equations/eq_equalizers.pptx
+++ b/figures/eq_equations/eq_equalizers.pptx
@@ -7,6 +7,7 @@
   <p:sldIdLst>
     <p:sldId id="256" r:id="rId2"/>
     <p:sldId id="257" r:id="rId3"/>
+    <p:sldId id="258" r:id="rId4"/>
   </p:sldIdLst>
   <p:sldSz cx="12192000" cy="6858000"/>
   <p:notesSz cx="6858000" cy="9144000"/>
@@ -255,7 +256,7 @@
           <a:p>
             <a:fld id="{EB58624E-6335-4896-8152-6B70D42582B1}" type="datetimeFigureOut">
               <a:rPr lang="en-US" smtClean="0"/>
-              <a:t>3/12/2017</a:t>
+              <a:t>4/4/2017</a:t>
             </a:fld>
             <a:endParaRPr lang="en-US"/>
           </a:p>
@@ -425,7 +426,7 @@
           <a:p>
             <a:fld id="{EB58624E-6335-4896-8152-6B70D42582B1}" type="datetimeFigureOut">
               <a:rPr lang="en-US" smtClean="0"/>
-              <a:t>3/12/2017</a:t>
+              <a:t>4/4/2017</a:t>
             </a:fld>
             <a:endParaRPr lang="en-US"/>
           </a:p>
@@ -605,7 +606,7 @@
           <a:p>
             <a:fld id="{EB58624E-6335-4896-8152-6B70D42582B1}" type="datetimeFigureOut">
               <a:rPr lang="en-US" smtClean="0"/>
-              <a:t>3/12/2017</a:t>
+              <a:t>4/4/2017</a:t>
             </a:fld>
             <a:endParaRPr lang="en-US"/>
           </a:p>
@@ -775,7 +776,7 @@
           <a:p>
             <a:fld id="{EB58624E-6335-4896-8152-6B70D42582B1}" type="datetimeFigureOut">
               <a:rPr lang="en-US" smtClean="0"/>
-              <a:t>3/12/2017</a:t>
+              <a:t>4/4/2017</a:t>
             </a:fld>
             <a:endParaRPr lang="en-US"/>
           </a:p>
@@ -1021,7 +1022,7 @@
           <a:p>
             <a:fld id="{EB58624E-6335-4896-8152-6B70D42582B1}" type="datetimeFigureOut">
               <a:rPr lang="en-US" smtClean="0"/>
-              <a:t>3/12/2017</a:t>
+              <a:t>4/4/2017</a:t>
             </a:fld>
             <a:endParaRPr lang="en-US"/>
           </a:p>
@@ -1253,7 +1254,7 @@
           <a:p>
             <a:fld id="{EB58624E-6335-4896-8152-6B70D42582B1}" type="datetimeFigureOut">
               <a:rPr lang="en-US" smtClean="0"/>
-              <a:t>3/12/2017</a:t>
+              <a:t>4/4/2017</a:t>
             </a:fld>
             <a:endParaRPr lang="en-US"/>
           </a:p>
@@ -1620,7 +1621,7 @@
           <a:p>
             <a:fld id="{EB58624E-6335-4896-8152-6B70D42582B1}" type="datetimeFigureOut">
               <a:rPr lang="en-US" smtClean="0"/>
-              <a:t>3/12/2017</a:t>
+              <a:t>4/4/2017</a:t>
             </a:fld>
             <a:endParaRPr lang="en-US"/>
           </a:p>
@@ -1738,7 +1739,7 @@
           <a:p>
             <a:fld id="{EB58624E-6335-4896-8152-6B70D42582B1}" type="datetimeFigureOut">
               <a:rPr lang="en-US" smtClean="0"/>
-              <a:t>3/12/2017</a:t>
+              <a:t>4/4/2017</a:t>
             </a:fld>
             <a:endParaRPr lang="en-US"/>
           </a:p>
@@ -1833,7 +1834,7 @@
           <a:p>
             <a:fld id="{EB58624E-6335-4896-8152-6B70D42582B1}" type="datetimeFigureOut">
               <a:rPr lang="en-US" smtClean="0"/>
-              <a:t>3/12/2017</a:t>
+              <a:t>4/4/2017</a:t>
             </a:fld>
             <a:endParaRPr lang="en-US"/>
           </a:p>
@@ -2110,7 +2111,7 @@
           <a:p>
             <a:fld id="{EB58624E-6335-4896-8152-6B70D42582B1}" type="datetimeFigureOut">
               <a:rPr lang="en-US" smtClean="0"/>
-              <a:t>3/12/2017</a:t>
+              <a:t>4/4/2017</a:t>
             </a:fld>
             <a:endParaRPr lang="en-US"/>
           </a:p>
@@ -2363,7 +2364,7 @@
           <a:p>
             <a:fld id="{EB58624E-6335-4896-8152-6B70D42582B1}" type="datetimeFigureOut">
               <a:rPr lang="en-US" smtClean="0"/>
-              <a:t>3/12/2017</a:t>
+              <a:t>4/4/2017</a:t>
             </a:fld>
             <a:endParaRPr lang="en-US"/>
           </a:p>
@@ -2576,7 +2577,7 @@
           <a:p>
             <a:fld id="{EB58624E-6335-4896-8152-6B70D42582B1}" type="datetimeFigureOut">
               <a:rPr lang="en-US" smtClean="0"/>
-              <a:t>3/12/2017</a:t>
+              <a:t>4/4/2017</a:t>
             </a:fld>
             <a:endParaRPr lang="en-US"/>
           </a:p>
@@ -9859,6 +9860,1209 @@
 </p:sld>
 </file>
 
+<file path=ppt/slides/slide3.xml><?xml version="1.0" encoding="utf-8"?>
+<p:sld xmlns:a="http://schemas.openxmlformats.org/drawingml/2006/main" xmlns:r="http://schemas.openxmlformats.org/officeDocument/2006/relationships" xmlns:p="http://schemas.openxmlformats.org/presentationml/2006/main">
+  <p:cSld>
+    <p:spTree>
+      <p:nvGrpSpPr>
+        <p:cNvPr id="1" name=""/>
+        <p:cNvGrpSpPr/>
+        <p:nvPr/>
+      </p:nvGrpSpPr>
+      <p:grpSpPr>
+        <a:xfrm>
+          <a:off x="0" y="0"/>
+          <a:ext cx="0" cy="0"/>
+          <a:chOff x="0" y="0"/>
+          <a:chExt cx="0" cy="0"/>
+        </a:xfrm>
+      </p:grpSpPr>
+      <p:cxnSp>
+        <p:nvCxnSpPr>
+          <p:cNvPr id="11" name="Straight Arrow Connector 10"/>
+          <p:cNvCxnSpPr>
+            <a:stCxn id="27" idx="2"/>
+            <a:endCxn id="15" idx="0"/>
+          </p:cNvCxnSpPr>
+          <p:nvPr/>
+        </p:nvCxnSpPr>
+        <p:spPr>
+          <a:xfrm>
+            <a:off x="7290320" y="872506"/>
+            <a:ext cx="0" cy="831772"/>
+          </a:xfrm>
+          <a:prstGeom prst="straightConnector1">
+            <a:avLst/>
+          </a:prstGeom>
+          <a:ln w="12700" cmpd="sng">
+            <a:solidFill>
+              <a:schemeClr val="tx1"/>
+            </a:solidFill>
+            <a:tailEnd type="triangle"/>
+          </a:ln>
+          <a:effectLst/>
+        </p:spPr>
+        <p:style>
+          <a:lnRef idx="2">
+            <a:schemeClr val="accent1"/>
+          </a:lnRef>
+          <a:fillRef idx="0">
+            <a:schemeClr val="accent1"/>
+          </a:fillRef>
+          <a:effectRef idx="1">
+            <a:schemeClr val="accent1"/>
+          </a:effectRef>
+          <a:fontRef idx="minor">
+            <a:schemeClr val="tx1"/>
+          </a:fontRef>
+        </p:style>
+      </p:cxnSp>
+      <p:cxnSp>
+        <p:nvCxnSpPr>
+          <p:cNvPr id="13" name="Elbow Connector 12"/>
+          <p:cNvCxnSpPr>
+            <a:stCxn id="8" idx="4"/>
+            <a:endCxn id="17" idx="1"/>
+          </p:cNvCxnSpPr>
+          <p:nvPr/>
+        </p:nvCxnSpPr>
+        <p:spPr>
+          <a:xfrm rot="16200000" flipH="1">
+            <a:off x="3098071" y="1562108"/>
+            <a:ext cx="1132778" cy="294561"/>
+          </a:xfrm>
+          <a:prstGeom prst="bentConnector2">
+            <a:avLst/>
+          </a:prstGeom>
+          <a:ln w="12700">
+            <a:solidFill>
+              <a:schemeClr val="tx1"/>
+            </a:solidFill>
+            <a:headEnd type="triangle" w="med" len="med"/>
+            <a:tailEnd type="none" w="med" len="med"/>
+          </a:ln>
+        </p:spPr>
+        <p:style>
+          <a:lnRef idx="1">
+            <a:schemeClr val="accent1"/>
+          </a:lnRef>
+          <a:fillRef idx="0">
+            <a:schemeClr val="accent1"/>
+          </a:fillRef>
+          <a:effectRef idx="0">
+            <a:schemeClr val="accent1"/>
+          </a:effectRef>
+          <a:fontRef idx="minor">
+            <a:schemeClr val="tx1"/>
+          </a:fontRef>
+        </p:style>
+      </p:cxnSp>
+      <p:cxnSp>
+        <p:nvCxnSpPr>
+          <p:cNvPr id="14" name="Elbow Connector 13"/>
+          <p:cNvCxnSpPr>
+            <a:stCxn id="15" idx="3"/>
+            <a:endCxn id="9" idx="2"/>
+          </p:cNvCxnSpPr>
+          <p:nvPr/>
+        </p:nvCxnSpPr>
+        <p:spPr>
+          <a:xfrm flipV="1">
+            <a:off x="7861820" y="1447800"/>
+            <a:ext cx="600993" cy="827978"/>
+          </a:xfrm>
+          <a:prstGeom prst="bentConnector2">
+            <a:avLst/>
+          </a:prstGeom>
+          <a:ln w="12700">
+            <a:solidFill>
+              <a:schemeClr val="tx1"/>
+            </a:solidFill>
+            <a:headEnd type="triangle" w="med" len="med"/>
+            <a:tailEnd type="none" w="med" len="med"/>
+          </a:ln>
+        </p:spPr>
+        <p:style>
+          <a:lnRef idx="1">
+            <a:schemeClr val="accent1"/>
+          </a:lnRef>
+          <a:fillRef idx="0">
+            <a:schemeClr val="accent1"/>
+          </a:fillRef>
+          <a:effectRef idx="0">
+            <a:schemeClr val="accent1"/>
+          </a:effectRef>
+          <a:fontRef idx="minor">
+            <a:schemeClr val="tx1"/>
+          </a:fontRef>
+        </p:style>
+      </p:cxnSp>
+      <p:grpSp>
+        <p:nvGrpSpPr>
+          <p:cNvPr id="3" name="Group 2"/>
+          <p:cNvGrpSpPr/>
+          <p:nvPr/>
+        </p:nvGrpSpPr>
+        <p:grpSpPr>
+          <a:xfrm>
+            <a:off x="2819241" y="1704278"/>
+            <a:ext cx="6381634" cy="3401122"/>
+            <a:chOff x="2819241" y="2514600"/>
+            <a:chExt cx="6381634" cy="3401122"/>
+          </a:xfrm>
+        </p:grpSpPr>
+        <p:pic>
+          <p:nvPicPr>
+            <p:cNvPr id="5" name="Picture 4"/>
+            <p:cNvPicPr>
+              <a:picLocks noChangeAspect="1"/>
+            </p:cNvPicPr>
+            <p:nvPr>
+              <p:custDataLst>
+                <p:tags r:id="rId4"/>
+              </p:custDataLst>
+            </p:nvPr>
+          </p:nvPicPr>
+          <p:blipFill>
+            <a:blip r:embed="rId10" cstate="print">
+              <a:extLst>
+                <a:ext uri="{28A0092B-C50C-407E-A947-70E740481C1C}">
+                  <a14:useLocalDpi xmlns:a14="http://schemas.microsoft.com/office/drawing/2010/main" val="0"/>
+                </a:ext>
+              </a:extLst>
+            </a:blip>
+            <a:stretch>
+              <a:fillRect/>
+            </a:stretch>
+          </p:blipFill>
+          <p:spPr>
+            <a:xfrm>
+              <a:off x="3091937" y="3875422"/>
+              <a:ext cx="5958083" cy="1063620"/>
+            </a:xfrm>
+            <a:prstGeom prst="rect">
+              <a:avLst/>
+            </a:prstGeom>
+          </p:spPr>
+        </p:pic>
+        <p:pic>
+          <p:nvPicPr>
+            <p:cNvPr id="6" name="Picture 5"/>
+            <p:cNvPicPr>
+              <a:picLocks noChangeAspect="1"/>
+            </p:cNvPicPr>
+            <p:nvPr>
+              <p:custDataLst>
+                <p:tags r:id="rId5"/>
+              </p:custDataLst>
+            </p:nvPr>
+          </p:nvPicPr>
+          <p:blipFill>
+            <a:blip r:embed="rId11" cstate="print">
+              <a:extLst>
+                <a:ext uri="{28A0092B-C50C-407E-A947-70E740481C1C}">
+                  <a14:useLocalDpi xmlns:a14="http://schemas.microsoft.com/office/drawing/2010/main" val="0"/>
+                </a:ext>
+              </a:extLst>
+            </a:blip>
+            <a:stretch>
+              <a:fillRect/>
+            </a:stretch>
+          </p:blipFill>
+          <p:spPr>
+            <a:xfrm>
+              <a:off x="2941081" y="5156864"/>
+              <a:ext cx="6259794" cy="758858"/>
+            </a:xfrm>
+            <a:prstGeom prst="rect">
+              <a:avLst/>
+            </a:prstGeom>
+          </p:spPr>
+        </p:pic>
+        <p:sp>
+          <p:nvSpPr>
+            <p:cNvPr id="15" name="Rectangle 14"/>
+            <p:cNvSpPr/>
+            <p:nvPr/>
+          </p:nvSpPr>
+          <p:spPr>
+            <a:xfrm>
+              <a:off x="6718820" y="2514600"/>
+              <a:ext cx="1143000" cy="1143000"/>
+            </a:xfrm>
+            <a:prstGeom prst="rect">
+              <a:avLst/>
+            </a:prstGeom>
+            <a:solidFill>
+              <a:schemeClr val="bg1">
+                <a:lumMod val="95000"/>
+              </a:schemeClr>
+            </a:solidFill>
+            <a:ln>
+              <a:solidFill>
+                <a:schemeClr val="tx1"/>
+              </a:solidFill>
+            </a:ln>
+          </p:spPr>
+          <p:style>
+            <a:lnRef idx="2">
+              <a:schemeClr val="accent1">
+                <a:shade val="50000"/>
+              </a:schemeClr>
+            </a:lnRef>
+            <a:fillRef idx="1">
+              <a:schemeClr val="accent1"/>
+            </a:fillRef>
+            <a:effectRef idx="0">
+              <a:schemeClr val="accent1"/>
+            </a:effectRef>
+            <a:fontRef idx="minor">
+              <a:schemeClr val="lt1"/>
+            </a:fontRef>
+          </p:style>
+          <p:txBody>
+            <a:bodyPr rtlCol="0" anchor="ctr"/>
+            <a:lstStyle/>
+            <a:p>
+              <a:pPr algn="ctr"/>
+              <a:r>
+                <a:rPr lang="en-US" dirty="0" smtClean="0">
+                  <a:ln w="0"/>
+                  <a:solidFill>
+                    <a:schemeClr val="tx1"/>
+                  </a:solidFill>
+                  <a:effectLst>
+                    <a:outerShdw blurRad="38100" dist="19050" dir="2700000" algn="tl" rotWithShape="0">
+                      <a:schemeClr val="dk1">
+                        <a:alpha val="40000"/>
+                      </a:schemeClr>
+                    </a:outerShdw>
+                  </a:effectLst>
+                  <a:latin typeface="Times New Roman" panose="02020603050405020304" pitchFamily="18" charset="0"/>
+                  <a:cs typeface="Times New Roman" panose="02020603050405020304" pitchFamily="18" charset="0"/>
+                </a:rPr>
+                <a:t>PED</a:t>
+              </a:r>
+              <a:endParaRPr lang="en-US" dirty="0">
+                <a:latin typeface="Times New Roman" panose="02020603050405020304" pitchFamily="18" charset="0"/>
+                <a:cs typeface="Times New Roman" panose="02020603050405020304" pitchFamily="18" charset="0"/>
+              </a:endParaRPr>
+            </a:p>
+          </p:txBody>
+        </p:sp>
+        <p:sp>
+          <p:nvSpPr>
+            <p:cNvPr id="35" name="Isosceles Triangle 34"/>
+            <p:cNvSpPr/>
+            <p:nvPr/>
+          </p:nvSpPr>
+          <p:spPr>
+            <a:xfrm rot="16200000">
+              <a:off x="5522129" y="2770632"/>
+              <a:ext cx="630936" cy="630936"/>
+            </a:xfrm>
+            <a:prstGeom prst="triangle">
+              <a:avLst/>
+            </a:prstGeom>
+            <a:solidFill>
+              <a:schemeClr val="bg1">
+                <a:lumMod val="95000"/>
+              </a:schemeClr>
+            </a:solidFill>
+            <a:ln>
+              <a:solidFill>
+                <a:schemeClr val="tx1"/>
+              </a:solidFill>
+            </a:ln>
+          </p:spPr>
+          <p:style>
+            <a:lnRef idx="2">
+              <a:schemeClr val="accent1">
+                <a:shade val="50000"/>
+              </a:schemeClr>
+            </a:lnRef>
+            <a:fillRef idx="1">
+              <a:schemeClr val="accent1"/>
+            </a:fillRef>
+            <a:effectRef idx="0">
+              <a:schemeClr val="accent1"/>
+            </a:effectRef>
+            <a:fontRef idx="minor">
+              <a:schemeClr val="lt1"/>
+            </a:fontRef>
+          </p:style>
+          <p:txBody>
+            <a:bodyPr rtlCol="0" anchor="ctr"/>
+            <a:lstStyle/>
+            <a:p>
+              <a:pPr algn="ctr"/>
+              <a:endParaRPr lang="en-US" dirty="0"/>
+            </a:p>
+          </p:txBody>
+        </p:sp>
+        <p:pic>
+          <p:nvPicPr>
+            <p:cNvPr id="36" name="Picture 35"/>
+            <p:cNvPicPr>
+              <a:picLocks noChangeAspect="1"/>
+            </p:cNvPicPr>
+            <p:nvPr>
+              <p:custDataLst>
+                <p:tags r:id="rId6"/>
+              </p:custDataLst>
+            </p:nvPr>
+          </p:nvPicPr>
+          <p:blipFill>
+            <a:blip r:embed="rId12" cstate="print">
+              <a:extLst>
+                <a:ext uri="{28A0092B-C50C-407E-A947-70E740481C1C}">
+                  <a14:useLocalDpi xmlns:a14="http://schemas.microsoft.com/office/drawing/2010/main" val="0"/>
+                </a:ext>
+              </a:extLst>
+            </a:blip>
+            <a:stretch>
+              <a:fillRect/>
+            </a:stretch>
+          </p:blipFill>
+          <p:spPr>
+            <a:xfrm>
+              <a:off x="5820071" y="2984532"/>
+              <a:ext cx="279680" cy="203136"/>
+            </a:xfrm>
+            <a:prstGeom prst="rect">
+              <a:avLst/>
+            </a:prstGeom>
+            <a:noFill/>
+          </p:spPr>
+        </p:pic>
+        <p:sp>
+          <p:nvSpPr>
+            <p:cNvPr id="17" name="Rectangle 16"/>
+            <p:cNvSpPr/>
+            <p:nvPr/>
+          </p:nvSpPr>
+          <p:spPr>
+            <a:xfrm>
+              <a:off x="3811741" y="2514600"/>
+              <a:ext cx="1143000" cy="1143000"/>
+            </a:xfrm>
+            <a:prstGeom prst="rect">
+              <a:avLst/>
+            </a:prstGeom>
+            <a:solidFill>
+              <a:schemeClr val="bg1">
+                <a:lumMod val="95000"/>
+              </a:schemeClr>
+            </a:solidFill>
+            <a:ln>
+              <a:solidFill>
+                <a:schemeClr val="tx1"/>
+              </a:solidFill>
+            </a:ln>
+          </p:spPr>
+          <p:style>
+            <a:lnRef idx="2">
+              <a:schemeClr val="accent1">
+                <a:shade val="50000"/>
+              </a:schemeClr>
+            </a:lnRef>
+            <a:fillRef idx="1">
+              <a:schemeClr val="accent1"/>
+            </a:fillRef>
+            <a:effectRef idx="0">
+              <a:schemeClr val="accent1"/>
+            </a:effectRef>
+            <a:fontRef idx="minor">
+              <a:schemeClr val="lt1"/>
+            </a:fontRef>
+          </p:style>
+          <p:txBody>
+            <a:bodyPr rtlCol="0" anchor="ctr"/>
+            <a:lstStyle/>
+            <a:p>
+              <a:pPr algn="ctr"/>
+              <a:r>
+                <a:rPr lang="en-US" dirty="0" smtClean="0">
+                  <a:ln w="0"/>
+                  <a:solidFill>
+                    <a:schemeClr val="tx1"/>
+                  </a:solidFill>
+                  <a:effectLst>
+                    <a:outerShdw blurRad="38100" dist="19050" dir="2700000" algn="tl" rotWithShape="0">
+                      <a:schemeClr val="dk1">
+                        <a:alpha val="40000"/>
+                      </a:schemeClr>
+                    </a:outerShdw>
+                  </a:effectLst>
+                  <a:latin typeface="Times New Roman" panose="02020603050405020304" pitchFamily="18" charset="0"/>
+                  <a:cs typeface="Times New Roman" panose="02020603050405020304" pitchFamily="18" charset="0"/>
+                </a:rPr>
+                <a:t>DDS</a:t>
+              </a:r>
+              <a:endParaRPr lang="en-US" dirty="0">
+                <a:latin typeface="Times New Roman" panose="02020603050405020304" pitchFamily="18" charset="0"/>
+                <a:cs typeface="Times New Roman" panose="02020603050405020304" pitchFamily="18" charset="0"/>
+              </a:endParaRPr>
+            </a:p>
+          </p:txBody>
+        </p:sp>
+        <p:cxnSp>
+          <p:nvCxnSpPr>
+            <p:cNvPr id="18" name="Straight Arrow Connector 17"/>
+            <p:cNvCxnSpPr>
+              <a:stCxn id="35" idx="3"/>
+              <a:endCxn id="15" idx="1"/>
+            </p:cNvCxnSpPr>
+            <p:nvPr/>
+          </p:nvCxnSpPr>
+          <p:spPr>
+            <a:xfrm>
+              <a:off x="6153065" y="3086100"/>
+              <a:ext cx="565755" cy="0"/>
+            </a:xfrm>
+            <a:prstGeom prst="straightConnector1">
+              <a:avLst/>
+            </a:prstGeom>
+            <a:ln w="12700">
+              <a:solidFill>
+                <a:schemeClr val="tx1"/>
+              </a:solidFill>
+              <a:headEnd type="triangle" w="med" len="med"/>
+              <a:tailEnd type="none" w="med" len="med"/>
+            </a:ln>
+          </p:spPr>
+          <p:style>
+            <a:lnRef idx="1">
+              <a:schemeClr val="accent1"/>
+            </a:lnRef>
+            <a:fillRef idx="0">
+              <a:schemeClr val="accent1"/>
+            </a:fillRef>
+            <a:effectRef idx="0">
+              <a:schemeClr val="accent1"/>
+            </a:effectRef>
+            <a:fontRef idx="minor">
+              <a:schemeClr val="tx1"/>
+            </a:fontRef>
+          </p:style>
+        </p:cxnSp>
+        <p:cxnSp>
+          <p:nvCxnSpPr>
+            <p:cNvPr id="19" name="Straight Arrow Connector 18"/>
+            <p:cNvCxnSpPr>
+              <a:stCxn id="17" idx="3"/>
+              <a:endCxn id="35" idx="0"/>
+            </p:cNvCxnSpPr>
+            <p:nvPr/>
+          </p:nvCxnSpPr>
+          <p:spPr>
+            <a:xfrm>
+              <a:off x="4954741" y="3086100"/>
+              <a:ext cx="567388" cy="0"/>
+            </a:xfrm>
+            <a:prstGeom prst="straightConnector1">
+              <a:avLst/>
+            </a:prstGeom>
+            <a:ln w="12700">
+              <a:solidFill>
+                <a:schemeClr val="tx1"/>
+              </a:solidFill>
+              <a:headEnd type="triangle" w="med" len="med"/>
+              <a:tailEnd type="none" w="med" len="med"/>
+            </a:ln>
+          </p:spPr>
+          <p:style>
+            <a:lnRef idx="1">
+              <a:schemeClr val="accent1"/>
+            </a:lnRef>
+            <a:fillRef idx="0">
+              <a:schemeClr val="accent1"/>
+            </a:fillRef>
+            <a:effectRef idx="0">
+              <a:schemeClr val="accent1"/>
+            </a:effectRef>
+            <a:fontRef idx="minor">
+              <a:schemeClr val="tx1"/>
+            </a:fontRef>
+          </p:style>
+        </p:cxnSp>
+        <p:pic>
+          <p:nvPicPr>
+            <p:cNvPr id="20" name="Picture 19"/>
+            <p:cNvPicPr>
+              <a:picLocks noChangeAspect="1"/>
+            </p:cNvPicPr>
+            <p:nvPr>
+              <p:custDataLst>
+                <p:tags r:id="rId7"/>
+              </p:custDataLst>
+            </p:nvPr>
+          </p:nvPicPr>
+          <p:blipFill>
+            <a:blip r:embed="rId13" cstate="print">
+              <a:extLst>
+                <a:ext uri="{28A0092B-C50C-407E-A947-70E740481C1C}">
+                  <a14:useLocalDpi xmlns:a14="http://schemas.microsoft.com/office/drawing/2010/main" val="0"/>
+                </a:ext>
+              </a:extLst>
+            </a:blip>
+            <a:stretch>
+              <a:fillRect/>
+            </a:stretch>
+          </p:blipFill>
+          <p:spPr>
+            <a:xfrm>
+              <a:off x="6234847" y="2742008"/>
+              <a:ext cx="419048" cy="251429"/>
+            </a:xfrm>
+            <a:prstGeom prst="rect">
+              <a:avLst/>
+            </a:prstGeom>
+          </p:spPr>
+        </p:pic>
+        <p:pic>
+          <p:nvPicPr>
+            <p:cNvPr id="21" name="Picture 20"/>
+            <p:cNvPicPr>
+              <a:picLocks noChangeAspect="1"/>
+            </p:cNvPicPr>
+            <p:nvPr>
+              <p:custDataLst>
+                <p:tags r:id="rId8"/>
+              </p:custDataLst>
+            </p:nvPr>
+          </p:nvPicPr>
+          <p:blipFill>
+            <a:blip r:embed="rId14" cstate="print">
+              <a:extLst>
+                <a:ext uri="{28A0092B-C50C-407E-A947-70E740481C1C}">
+                  <a14:useLocalDpi xmlns:a14="http://schemas.microsoft.com/office/drawing/2010/main" val="0"/>
+                </a:ext>
+              </a:extLst>
+            </a:blip>
+            <a:stretch>
+              <a:fillRect/>
+            </a:stretch>
+          </p:blipFill>
+          <p:spPr>
+            <a:xfrm>
+              <a:off x="2819241" y="2583621"/>
+              <a:ext cx="621713" cy="265143"/>
+            </a:xfrm>
+            <a:prstGeom prst="rect">
+              <a:avLst/>
+            </a:prstGeom>
+          </p:spPr>
+        </p:pic>
+      </p:grpSp>
+      <p:grpSp>
+        <p:nvGrpSpPr>
+          <p:cNvPr id="2" name="Group 1"/>
+          <p:cNvGrpSpPr/>
+          <p:nvPr/>
+        </p:nvGrpSpPr>
+        <p:grpSpPr>
+          <a:xfrm>
+            <a:off x="1905000" y="304800"/>
+            <a:ext cx="8331956" cy="1143000"/>
+            <a:chOff x="1905000" y="803894"/>
+            <a:chExt cx="8331956" cy="1143000"/>
+          </a:xfrm>
+        </p:grpSpPr>
+        <p:sp>
+          <p:nvSpPr>
+            <p:cNvPr id="8" name="Flowchart: Summing Junction 7"/>
+            <p:cNvSpPr/>
+            <p:nvPr/>
+          </p:nvSpPr>
+          <p:spPr>
+            <a:xfrm>
+              <a:off x="3250480" y="1108694"/>
+              <a:ext cx="533400" cy="533400"/>
+            </a:xfrm>
+            <a:prstGeom prst="flowChartSummingJunction">
+              <a:avLst/>
+            </a:prstGeom>
+            <a:solidFill>
+              <a:schemeClr val="bg1">
+                <a:lumMod val="95000"/>
+              </a:schemeClr>
+            </a:solidFill>
+            <a:ln>
+              <a:solidFill>
+                <a:schemeClr val="tx1"/>
+              </a:solidFill>
+            </a:ln>
+          </p:spPr>
+          <p:style>
+            <a:lnRef idx="2">
+              <a:schemeClr val="accent1">
+                <a:shade val="50000"/>
+              </a:schemeClr>
+            </a:lnRef>
+            <a:fillRef idx="1">
+              <a:schemeClr val="accent1"/>
+            </a:fillRef>
+            <a:effectRef idx="0">
+              <a:schemeClr val="accent1"/>
+            </a:effectRef>
+            <a:fontRef idx="minor">
+              <a:schemeClr val="lt1"/>
+            </a:fontRef>
+          </p:style>
+          <p:txBody>
+            <a:bodyPr rtlCol="0" anchor="ctr"/>
+            <a:lstStyle/>
+            <a:p>
+              <a:pPr algn="ctr"/>
+              <a:endParaRPr lang="en-US">
+                <a:latin typeface="Times New Roman" panose="02020603050405020304" pitchFamily="18" charset="0"/>
+                <a:cs typeface="Times New Roman" panose="02020603050405020304" pitchFamily="18" charset="0"/>
+              </a:endParaRPr>
+            </a:p>
+          </p:txBody>
+        </p:sp>
+        <p:sp>
+          <p:nvSpPr>
+            <p:cNvPr id="9" name="Rectangle 8"/>
+            <p:cNvSpPr/>
+            <p:nvPr/>
+          </p:nvSpPr>
+          <p:spPr>
+            <a:xfrm>
+              <a:off x="7891313" y="803894"/>
+              <a:ext cx="1143000" cy="1143000"/>
+            </a:xfrm>
+            <a:prstGeom prst="rect">
+              <a:avLst/>
+            </a:prstGeom>
+            <a:solidFill>
+              <a:schemeClr val="bg1">
+                <a:lumMod val="95000"/>
+              </a:schemeClr>
+            </a:solidFill>
+            <a:ln>
+              <a:solidFill>
+                <a:schemeClr val="tx1"/>
+              </a:solidFill>
+            </a:ln>
+          </p:spPr>
+          <p:style>
+            <a:lnRef idx="2">
+              <a:schemeClr val="accent1">
+                <a:shade val="50000"/>
+              </a:schemeClr>
+            </a:lnRef>
+            <a:fillRef idx="1">
+              <a:schemeClr val="accent1"/>
+            </a:fillRef>
+            <a:effectRef idx="0">
+              <a:schemeClr val="accent1"/>
+            </a:effectRef>
+            <a:fontRef idx="minor">
+              <a:schemeClr val="lt1"/>
+            </a:fontRef>
+          </p:style>
+          <p:txBody>
+            <a:bodyPr rtlCol="0" anchor="ctr"/>
+            <a:lstStyle/>
+            <a:p>
+              <a:pPr algn="ctr"/>
+              <a:endParaRPr lang="en-US" dirty="0">
+                <a:latin typeface="Times New Roman" panose="02020603050405020304" pitchFamily="18" charset="0"/>
+                <a:cs typeface="Times New Roman" panose="02020603050405020304" pitchFamily="18" charset="0"/>
+              </a:endParaRPr>
+            </a:p>
+          </p:txBody>
+        </p:sp>
+        <p:cxnSp>
+          <p:nvCxnSpPr>
+            <p:cNvPr id="10" name="Straight Arrow Connector 9"/>
+            <p:cNvCxnSpPr/>
+            <p:nvPr/>
+          </p:nvCxnSpPr>
+          <p:spPr>
+            <a:xfrm>
+              <a:off x="3783880" y="1375394"/>
+              <a:ext cx="4107433" cy="0"/>
+            </a:xfrm>
+            <a:prstGeom prst="straightConnector1">
+              <a:avLst/>
+            </a:prstGeom>
+            <a:ln w="12700" cmpd="sng">
+              <a:solidFill>
+                <a:schemeClr val="tx1"/>
+              </a:solidFill>
+              <a:tailEnd type="triangle"/>
+            </a:ln>
+            <a:effectLst/>
+          </p:spPr>
+          <p:style>
+            <a:lnRef idx="2">
+              <a:schemeClr val="accent1"/>
+            </a:lnRef>
+            <a:fillRef idx="0">
+              <a:schemeClr val="accent1"/>
+            </a:fillRef>
+            <a:effectRef idx="1">
+              <a:schemeClr val="accent1"/>
+            </a:effectRef>
+            <a:fontRef idx="minor">
+              <a:schemeClr val="tx1"/>
+            </a:fontRef>
+          </p:style>
+        </p:cxnSp>
+        <p:cxnSp>
+          <p:nvCxnSpPr>
+            <p:cNvPr id="12" name="Straight Arrow Connector 11"/>
+            <p:cNvCxnSpPr/>
+            <p:nvPr/>
+          </p:nvCxnSpPr>
+          <p:spPr>
+            <a:xfrm>
+              <a:off x="2566157" y="1375394"/>
+              <a:ext cx="684323" cy="0"/>
+            </a:xfrm>
+            <a:prstGeom prst="straightConnector1">
+              <a:avLst/>
+            </a:prstGeom>
+            <a:ln w="12700">
+              <a:solidFill>
+                <a:schemeClr val="tx1"/>
+              </a:solidFill>
+              <a:tailEnd type="triangle"/>
+            </a:ln>
+          </p:spPr>
+          <p:style>
+            <a:lnRef idx="1">
+              <a:schemeClr val="accent1"/>
+            </a:lnRef>
+            <a:fillRef idx="0">
+              <a:schemeClr val="accent1"/>
+            </a:fillRef>
+            <a:effectRef idx="0">
+              <a:schemeClr val="accent1"/>
+            </a:effectRef>
+            <a:fontRef idx="minor">
+              <a:schemeClr val="tx1"/>
+            </a:fontRef>
+          </p:style>
+        </p:cxnSp>
+        <p:cxnSp>
+          <p:nvCxnSpPr>
+            <p:cNvPr id="22" name="Straight Arrow Connector 21"/>
+            <p:cNvCxnSpPr/>
+            <p:nvPr/>
+          </p:nvCxnSpPr>
+          <p:spPr>
+            <a:xfrm>
+              <a:off x="9034313" y="1375394"/>
+              <a:ext cx="684323" cy="0"/>
+            </a:xfrm>
+            <a:prstGeom prst="straightConnector1">
+              <a:avLst/>
+            </a:prstGeom>
+            <a:ln w="12700">
+              <a:solidFill>
+                <a:schemeClr val="tx1"/>
+              </a:solidFill>
+              <a:tailEnd type="triangle"/>
+            </a:ln>
+          </p:spPr>
+          <p:style>
+            <a:lnRef idx="1">
+              <a:schemeClr val="accent1"/>
+            </a:lnRef>
+            <a:fillRef idx="0">
+              <a:schemeClr val="accent1"/>
+            </a:fillRef>
+            <a:effectRef idx="0">
+              <a:schemeClr val="accent1"/>
+            </a:effectRef>
+            <a:fontRef idx="minor">
+              <a:schemeClr val="tx1"/>
+            </a:fontRef>
+          </p:style>
+        </p:cxnSp>
+        <p:pic>
+          <p:nvPicPr>
+            <p:cNvPr id="23" name="Picture 22"/>
+            <p:cNvPicPr>
+              <a:picLocks noChangeAspect="1"/>
+            </p:cNvPicPr>
+            <p:nvPr>
+              <p:custDataLst>
+                <p:tags r:id="rId1"/>
+              </p:custDataLst>
+            </p:nvPr>
+          </p:nvPicPr>
+          <p:blipFill>
+            <a:blip r:embed="rId15" cstate="print">
+              <a:extLst>
+                <a:ext uri="{28A0092B-C50C-407E-A947-70E740481C1C}">
+                  <a14:useLocalDpi xmlns:a14="http://schemas.microsoft.com/office/drawing/2010/main" val="0"/>
+                </a:ext>
+              </a:extLst>
+            </a:blip>
+            <a:stretch>
+              <a:fillRect/>
+            </a:stretch>
+          </p:blipFill>
+          <p:spPr>
+            <a:xfrm>
+              <a:off x="9801147" y="1249680"/>
+              <a:ext cx="435809" cy="251429"/>
+            </a:xfrm>
+            <a:prstGeom prst="rect">
+              <a:avLst/>
+            </a:prstGeom>
+          </p:spPr>
+        </p:pic>
+        <p:pic>
+          <p:nvPicPr>
+            <p:cNvPr id="24" name="Picture 23"/>
+            <p:cNvPicPr>
+              <a:picLocks noChangeAspect="1"/>
+            </p:cNvPicPr>
+            <p:nvPr>
+              <p:custDataLst>
+                <p:tags r:id="rId2"/>
+              </p:custDataLst>
+            </p:nvPr>
+          </p:nvPicPr>
+          <p:blipFill>
+            <a:blip r:embed="rId16" cstate="print">
+              <a:extLst>
+                <a:ext uri="{28A0092B-C50C-407E-A947-70E740481C1C}">
+                  <a14:useLocalDpi xmlns:a14="http://schemas.microsoft.com/office/drawing/2010/main" val="0"/>
+                </a:ext>
+              </a:extLst>
+            </a:blip>
+            <a:stretch>
+              <a:fillRect/>
+            </a:stretch>
+          </p:blipFill>
+          <p:spPr>
+            <a:xfrm>
+              <a:off x="1905000" y="1249680"/>
+              <a:ext cx="557714" cy="251429"/>
+            </a:xfrm>
+            <a:prstGeom prst="rect">
+              <a:avLst/>
+            </a:prstGeom>
+            <a:ln w="12700">
+              <a:noFill/>
+            </a:ln>
+          </p:spPr>
+        </p:pic>
+        <p:pic>
+          <p:nvPicPr>
+            <p:cNvPr id="25" name="Picture 24"/>
+            <p:cNvPicPr>
+              <a:picLocks noChangeAspect="1"/>
+            </p:cNvPicPr>
+            <p:nvPr>
+              <p:custDataLst>
+                <p:tags r:id="rId3"/>
+              </p:custDataLst>
+            </p:nvPr>
+          </p:nvPicPr>
+          <p:blipFill>
+            <a:blip r:embed="rId17" cstate="print">
+              <a:extLst>
+                <a:ext uri="{28A0092B-C50C-407E-A947-70E740481C1C}">
+                  <a14:useLocalDpi xmlns:a14="http://schemas.microsoft.com/office/drawing/2010/main" val="0"/>
+                </a:ext>
+              </a:extLst>
+            </a:blip>
+            <a:stretch>
+              <a:fillRect/>
+            </a:stretch>
+          </p:blipFill>
+          <p:spPr>
+            <a:xfrm>
+              <a:off x="4020188" y="1066800"/>
+              <a:ext cx="524190" cy="251429"/>
+            </a:xfrm>
+            <a:prstGeom prst="rect">
+              <a:avLst/>
+            </a:prstGeom>
+            <a:ln w="12700">
+              <a:noFill/>
+            </a:ln>
+          </p:spPr>
+        </p:pic>
+        <p:cxnSp>
+          <p:nvCxnSpPr>
+            <p:cNvPr id="28" name="Straight Connector 27"/>
+            <p:cNvCxnSpPr/>
+            <p:nvPr/>
+          </p:nvCxnSpPr>
+          <p:spPr>
+            <a:xfrm>
+              <a:off x="8125856" y="1375394"/>
+              <a:ext cx="673915" cy="1"/>
+            </a:xfrm>
+            <a:prstGeom prst="line">
+              <a:avLst/>
+            </a:prstGeom>
+            <a:ln w="12700">
+              <a:solidFill>
+                <a:schemeClr val="tx1"/>
+              </a:solidFill>
+            </a:ln>
+          </p:spPr>
+          <p:style>
+            <a:lnRef idx="1">
+              <a:schemeClr val="accent1"/>
+            </a:lnRef>
+            <a:fillRef idx="0">
+              <a:schemeClr val="accent1"/>
+            </a:fillRef>
+            <a:effectRef idx="0">
+              <a:schemeClr val="accent1"/>
+            </a:effectRef>
+            <a:fontRef idx="minor">
+              <a:schemeClr val="tx1"/>
+            </a:fontRef>
+          </p:style>
+        </p:cxnSp>
+        <p:cxnSp>
+          <p:nvCxnSpPr>
+            <p:cNvPr id="29" name="Straight Connector 28"/>
+            <p:cNvCxnSpPr/>
+            <p:nvPr/>
+          </p:nvCxnSpPr>
+          <p:spPr>
+            <a:xfrm>
+              <a:off x="8462813" y="1143597"/>
+              <a:ext cx="0" cy="463595"/>
+            </a:xfrm>
+            <a:prstGeom prst="line">
+              <a:avLst/>
+            </a:prstGeom>
+            <a:ln w="19050">
+              <a:solidFill>
+                <a:schemeClr val="tx1"/>
+              </a:solidFill>
+            </a:ln>
+          </p:spPr>
+          <p:style>
+            <a:lnRef idx="1">
+              <a:schemeClr val="accent1"/>
+            </a:lnRef>
+            <a:fillRef idx="0">
+              <a:schemeClr val="accent1"/>
+            </a:fillRef>
+            <a:effectRef idx="0">
+              <a:schemeClr val="accent1"/>
+            </a:effectRef>
+            <a:fontRef idx="minor">
+              <a:schemeClr val="tx1"/>
+            </a:fontRef>
+          </p:style>
+        </p:cxnSp>
+        <p:cxnSp>
+          <p:nvCxnSpPr>
+            <p:cNvPr id="33" name="Straight Connector 32"/>
+            <p:cNvCxnSpPr/>
+            <p:nvPr/>
+          </p:nvCxnSpPr>
+          <p:spPr>
+            <a:xfrm rot="10800000" flipH="1">
+              <a:off x="8461176" y="1150047"/>
+              <a:ext cx="310196" cy="0"/>
+            </a:xfrm>
+            <a:prstGeom prst="line">
+              <a:avLst/>
+            </a:prstGeom>
+            <a:ln w="19050">
+              <a:solidFill>
+                <a:schemeClr val="tx1"/>
+              </a:solidFill>
+            </a:ln>
+          </p:spPr>
+          <p:style>
+            <a:lnRef idx="1">
+              <a:schemeClr val="accent1"/>
+            </a:lnRef>
+            <a:fillRef idx="0">
+              <a:schemeClr val="accent1"/>
+            </a:fillRef>
+            <a:effectRef idx="0">
+              <a:schemeClr val="accent1"/>
+            </a:effectRef>
+            <a:fontRef idx="minor">
+              <a:schemeClr val="tx1"/>
+            </a:fontRef>
+          </p:style>
+        </p:cxnSp>
+        <p:cxnSp>
+          <p:nvCxnSpPr>
+            <p:cNvPr id="34" name="Straight Connector 33"/>
+            <p:cNvCxnSpPr/>
+            <p:nvPr/>
+          </p:nvCxnSpPr>
+          <p:spPr>
+            <a:xfrm flipH="1">
+              <a:off x="8154254" y="1600742"/>
+              <a:ext cx="310196" cy="0"/>
+            </a:xfrm>
+            <a:prstGeom prst="line">
+              <a:avLst/>
+            </a:prstGeom>
+            <a:ln w="19050">
+              <a:solidFill>
+                <a:schemeClr val="tx1"/>
+              </a:solidFill>
+            </a:ln>
+          </p:spPr>
+          <p:style>
+            <a:lnRef idx="1">
+              <a:schemeClr val="accent1"/>
+            </a:lnRef>
+            <a:fillRef idx="0">
+              <a:schemeClr val="accent1"/>
+            </a:fillRef>
+            <a:effectRef idx="0">
+              <a:schemeClr val="accent1"/>
+            </a:effectRef>
+            <a:fontRef idx="minor">
+              <a:schemeClr val="tx1"/>
+            </a:fontRef>
+          </p:style>
+        </p:cxnSp>
+        <p:cxnSp>
+          <p:nvCxnSpPr>
+            <p:cNvPr id="31" name="Straight Connector 30"/>
+            <p:cNvCxnSpPr/>
+            <p:nvPr/>
+          </p:nvCxnSpPr>
+          <p:spPr>
+            <a:xfrm rot="10800000">
+              <a:off x="8462813" y="1143597"/>
+              <a:ext cx="0" cy="463595"/>
+            </a:xfrm>
+            <a:prstGeom prst="line">
+              <a:avLst/>
+            </a:prstGeom>
+            <a:ln w="19050">
+              <a:solidFill>
+                <a:schemeClr val="tx1"/>
+              </a:solidFill>
+            </a:ln>
+          </p:spPr>
+          <p:style>
+            <a:lnRef idx="1">
+              <a:schemeClr val="accent1"/>
+            </a:lnRef>
+            <a:fillRef idx="0">
+              <a:schemeClr val="accent1"/>
+            </a:fillRef>
+            <a:effectRef idx="0">
+              <a:schemeClr val="accent1"/>
+            </a:effectRef>
+            <a:fontRef idx="minor">
+              <a:schemeClr val="tx1"/>
+            </a:fontRef>
+          </p:style>
+        </p:cxnSp>
+        <p:cxnSp>
+          <p:nvCxnSpPr>
+            <p:cNvPr id="32" name="Straight Connector 31"/>
+            <p:cNvCxnSpPr/>
+            <p:nvPr/>
+          </p:nvCxnSpPr>
+          <p:spPr>
+            <a:xfrm rot="16200000">
+              <a:off x="8125856" y="1375394"/>
+              <a:ext cx="673915" cy="1"/>
+            </a:xfrm>
+            <a:prstGeom prst="line">
+              <a:avLst/>
+            </a:prstGeom>
+            <a:ln w="12700">
+              <a:solidFill>
+                <a:schemeClr val="tx1"/>
+              </a:solidFill>
+            </a:ln>
+          </p:spPr>
+          <p:style>
+            <a:lnRef idx="1">
+              <a:schemeClr val="accent1"/>
+            </a:lnRef>
+            <a:fillRef idx="0">
+              <a:schemeClr val="accent1"/>
+            </a:fillRef>
+            <a:effectRef idx="0">
+              <a:schemeClr val="accent1"/>
+            </a:effectRef>
+            <a:fontRef idx="minor">
+              <a:schemeClr val="tx1"/>
+            </a:fontRef>
+          </p:style>
+        </p:cxnSp>
+        <p:sp>
+          <p:nvSpPr>
+            <p:cNvPr id="27" name="Rectangle 26"/>
+            <p:cNvSpPr/>
+            <p:nvPr/>
+          </p:nvSpPr>
+          <p:spPr>
+            <a:xfrm>
+              <a:off x="6718820" y="1086310"/>
+              <a:ext cx="1143000" cy="285290"/>
+            </a:xfrm>
+            <a:prstGeom prst="rect">
+              <a:avLst/>
+            </a:prstGeom>
+            <a:noFill/>
+            <a:ln>
+              <a:noFill/>
+            </a:ln>
+          </p:spPr>
+          <p:style>
+            <a:lnRef idx="2">
+              <a:schemeClr val="accent1">
+                <a:shade val="50000"/>
+              </a:schemeClr>
+            </a:lnRef>
+            <a:fillRef idx="1">
+              <a:schemeClr val="accent1"/>
+            </a:fillRef>
+            <a:effectRef idx="0">
+              <a:schemeClr val="accent1"/>
+            </a:effectRef>
+            <a:fontRef idx="minor">
+              <a:schemeClr val="lt1"/>
+            </a:fontRef>
+          </p:style>
+          <p:txBody>
+            <a:bodyPr rtlCol="0" anchor="ctr"/>
+            <a:lstStyle/>
+            <a:p>
+              <a:pPr algn="ctr"/>
+              <a:endParaRPr lang="en-US" dirty="0">
+                <a:latin typeface="Times New Roman" panose="02020603050405020304" pitchFamily="18" charset="0"/>
+                <a:cs typeface="Times New Roman" panose="02020603050405020304" pitchFamily="18" charset="0"/>
+              </a:endParaRPr>
+            </a:p>
+          </p:txBody>
+        </p:sp>
+      </p:grpSp>
+    </p:spTree>
+    <p:extLst>
+      <p:ext uri="{BB962C8B-B14F-4D97-AF65-F5344CB8AC3E}">
+        <p14:creationId xmlns:p14="http://schemas.microsoft.com/office/powerpoint/2010/main" val="2814133446"/>
+      </p:ext>
+    </p:extLst>
+  </p:cSld>
+  <p:clrMapOvr>
+    <a:masterClrMapping/>
+  </p:clrMapOvr>
+</p:sld>
+</file>
+
 <file path=ppt/tags/tag1.xml><?xml version="1.0" encoding="utf-8"?>
 <p:tagLst xmlns:a="http://schemas.openxmlformats.org/drawingml/2006/main" xmlns:r="http://schemas.openxmlformats.org/officeDocument/2006/relationships" xmlns:p="http://schemas.openxmlformats.org/presentationml/2006/main">
   <p:tag name="ORIGINALHEIGHT" val="120.7349"/>
@@ -9971,6 +11175,70 @@
 </p:tagLst>
 </file>
 
+<file path=ppt/tags/tag16.xml><?xml version="1.0" encoding="utf-8"?>
+<p:tagLst xmlns:a="http://schemas.openxmlformats.org/drawingml/2006/main" xmlns:r="http://schemas.openxmlformats.org/officeDocument/2006/relationships" xmlns:p="http://schemas.openxmlformats.org/presentationml/2006/main">
+  <p:tag name="ORIGINALHEIGHT" val="123.7346"/>
+  <p:tag name="ORIGINALWIDTH" val="214.4731"/>
+  <p:tag name="OUTPUTDPI" val="1200"/>
+  <p:tag name="LATEXADDIN" val="\documentclass{article}&#10;\usepackage{amsmath}&#10;\pagestyle{empty}&#10;\begin{document}&#10;&#10;$\hat{a}(k)$&#10;&#10;&#10;\end{document}&#10;"/>
+  <p:tag name="IGUANATEXSIZE" val="20"/>
+  <p:tag name="IGUANATEXCURSOR" val="111"/>
+  <p:tag name="TRANSPARENCY" val="True"/>
+  <p:tag name="FILENAME" val=""/>
+  <p:tag name="INPUTTYPE" val="0"/>
+  <p:tag name="LATEXENGINEID" val="0"/>
+  <p:tag name="TEMPFOLDER" val="C:\Users\ecestudent\Documents\IguanaTexTemp\"/>
+</p:tagLst>
+</file>
+
+<file path=ppt/tags/tag17.xml><?xml version="1.0" encoding="utf-8"?>
+<p:tagLst xmlns:a="http://schemas.openxmlformats.org/drawingml/2006/main" xmlns:r="http://schemas.openxmlformats.org/officeDocument/2006/relationships" xmlns:p="http://schemas.openxmlformats.org/presentationml/2006/main">
+  <p:tag name="ORIGINALHEIGHT" val="123.7346"/>
+  <p:tag name="ORIGINALWIDTH" val="274.4657"/>
+  <p:tag name="OUTPUTDPI" val="1200"/>
+  <p:tag name="LATEXADDIN" val="\documentclass{article}&#10;\usepackage{amsmath}&#10;\pagestyle{empty}&#10;\begin{document}&#10;&#10;$r_\text{d}(n)$&#10;&#10;&#10;\end{document}"/>
+  <p:tag name="IGUANATEXSIZE" val="20"/>
+  <p:tag name="IGUANATEXCURSOR" val="92"/>
+  <p:tag name="TRANSPARENCY" val="True"/>
+  <p:tag name="FILENAME" val=""/>
+  <p:tag name="INPUTTYPE" val="0"/>
+  <p:tag name="LATEXENGINEID" val="0"/>
+  <p:tag name="TEMPFOLDER" val="C:\Users\ecestudent\Documents\IguanaTexTemp\"/>
+</p:tagLst>
+</file>
+
+<file path=ppt/tags/tag18.xml><?xml version="1.0" encoding="utf-8"?>
+<p:tagLst xmlns:a="http://schemas.openxmlformats.org/drawingml/2006/main" xmlns:r="http://schemas.openxmlformats.org/officeDocument/2006/relationships" xmlns:p="http://schemas.openxmlformats.org/presentationml/2006/main">
+  <p:tag name="ORIGINALHEIGHT" val="123.7346"/>
+  <p:tag name="ORIGINALWIDTH" val="257.9677"/>
+  <p:tag name="OUTPUTDPI" val="1200"/>
+  <p:tag name="LATEXADDIN" val="\documentclass{article}&#10;\usepackage{amsmath}&#10;\pagestyle{empty}&#10;\begin{document}&#10;&#10;$r_\text{r}(n)$&#10;&#10;&#10;\end{document}"/>
+  <p:tag name="IGUANATEXSIZE" val="20"/>
+  <p:tag name="IGUANATEXCURSOR" val="91"/>
+  <p:tag name="TRANSPARENCY" val="True"/>
+  <p:tag name="FILENAME" val=""/>
+  <p:tag name="INPUTTYPE" val="0"/>
+  <p:tag name="LATEXENGINEID" val="0"/>
+  <p:tag name="TEMPFOLDER" val="C:\Users\ecestudent\Documents\IguanaTexTemp\"/>
+</p:tagLst>
+</file>
+
+<file path=ppt/tags/tag19.xml><?xml version="1.0" encoding="utf-8"?>
+<p:tagLst xmlns:a="http://schemas.openxmlformats.org/drawingml/2006/main" xmlns:r="http://schemas.openxmlformats.org/officeDocument/2006/relationships" xmlns:p="http://schemas.openxmlformats.org/presentationml/2006/main">
+  <p:tag name="ORIGINALHEIGHT" val="523.4346"/>
+  <p:tag name="ORIGINALWIDTH" val="2932.134"/>
+  <p:tag name="OUTPUTDPI" val="1200"/>
+  <p:tag name="LATEXADDIN" val="\documentclass{article}&#10;\usepackage{amsmath}&#10;\usepackage{amssymb}&#10;\pagestyle{empty}&#10;\begin{document}&#10;&#10;\begin{equation*}&#10;\hat{a}(k)= \begin{cases}&#10;p(k) &amp;k&lt;L_p+L_\text{asm} \\&#10;\text{sgn}(\text{Re}\{r_\text{r}(k)\})&amp;k\geq L_p+L_\text{asm} \quad \&amp; \quad \text{$k$ even}\\&#10;\text{sgn}(\text{Im}\{r_\text{r}(k)\})&amp;k\geq L_p+L_\text{asm} \quad \&amp; \quad \text{$k$ odd}\\&#10;\end{cases}&#10;\end{equation*}&#10;&#10;&#10;&#10;\end{document}"/>
+  <p:tag name="IGUANATEXSIZE" val="20"/>
+  <p:tag name="IGUANATEXCURSOR" val="288"/>
+  <p:tag name="TRANSPARENCY" val="True"/>
+  <p:tag name="FILENAME" val=""/>
+  <p:tag name="INPUTTYPE" val="0"/>
+  <p:tag name="LATEXENGINEID" val="0"/>
+  <p:tag name="TEMPFOLDER" val="C:\Users\ecestudent\Documents\IguanaTexTemp\"/>
+</p:tagLst>
+</file>
+
 <file path=ppt/tags/tag2.xml><?xml version="1.0" encoding="utf-8"?>
 <p:tagLst xmlns:a="http://schemas.openxmlformats.org/drawingml/2006/main" xmlns:r="http://schemas.openxmlformats.org/officeDocument/2006/relationships" xmlns:p="http://schemas.openxmlformats.org/presentationml/2006/main">
   <p:tag name="ORIGINALHEIGHT" val="85.48929"/>
@@ -9979,6 +11247,70 @@
   <p:tag name="LATEXADDIN" val="\documentclass{article}&#10;\usepackage{amsmath}&#10;\pagestyle{empty}&#10;\begin{document}&#10;&#10;$0$&#10;&#10;&#10;\end{document}"/>
   <p:tag name="IGUANATEXSIZE" val="20"/>
   <p:tag name="IGUANATEXCURSOR" val="83"/>
+  <p:tag name="TRANSPARENCY" val="True"/>
+  <p:tag name="FILENAME" val=""/>
+  <p:tag name="INPUTTYPE" val="0"/>
+  <p:tag name="LATEXENGINEID" val="0"/>
+  <p:tag name="TEMPFOLDER" val="C:\Users\ecestudent\Documents\IguanaTexTemp\"/>
+</p:tagLst>
+</file>
+
+<file path=ppt/tags/tag20.xml><?xml version="1.0" encoding="utf-8"?>
+<p:tagLst xmlns:a="http://schemas.openxmlformats.org/drawingml/2006/main" xmlns:r="http://schemas.openxmlformats.org/officeDocument/2006/relationships" xmlns:p="http://schemas.openxmlformats.org/presentationml/2006/main">
+  <p:tag name="ORIGINALHEIGHT" val="373.4533"/>
+  <p:tag name="ORIGINALWIDTH" val="3080.615"/>
+  <p:tag name="OUTPUTDPI" val="1200"/>
+  <p:tag name="LATEXADDIN" val="\documentclass{article}&#10;\usepackage{amsmath}&#10;\usepackage{amssymb}&#10;\pagestyle{empty}&#10;\begin{document}&#10;&#10;\begin{equation*}&#10;e(k)&#10;= &#10;\begin{cases}&#10;0 &amp;\text{$k$ even} \\&#10;\hat{a}(k-1)\text{Im}\{r_\text{r}(k-1)\} -  \hat{a}(k)\text{Re}\{r_\text{r}(k)\}  &amp;\text{$k$ odd}\\&#10;\end{cases}&#10;\end{equation*}&#10;&#10;&#10;&#10;\end{document}"/>
+  <p:tag name="IGUANATEXSIZE" val="20"/>
+  <p:tag name="IGUANATEXCURSOR" val="184"/>
+  <p:tag name="TRANSPARENCY" val="True"/>
+  <p:tag name="FILENAME" val=""/>
+  <p:tag name="INPUTTYPE" val="0"/>
+  <p:tag name="LATEXENGINEID" val="0"/>
+  <p:tag name="TEMPFOLDER" val="C:\Users\ecestudent\Documents\IguanaTexTemp\"/>
+</p:tagLst>
+</file>
+
+<file path=ppt/tags/tag21.xml><?xml version="1.0" encoding="utf-8"?>
+<p:tagLst xmlns:a="http://schemas.openxmlformats.org/drawingml/2006/main" xmlns:r="http://schemas.openxmlformats.org/officeDocument/2006/relationships" xmlns:p="http://schemas.openxmlformats.org/presentationml/2006/main">
+  <p:tag name="ORIGINALHEIGHT" val="103.4871"/>
+  <p:tag name="ORIGINALWIDTH" val="142.4822"/>
+  <p:tag name="OUTPUTDPI" val="1200"/>
+  <p:tag name="LATEXADDIN" val="\documentclass{article}&#10;\usepackage{amsmath}&#10;\pagestyle{empty}&#10;\begin{document}&#10;\begin{equation*}&#10;K_1&#10;\end{equation*}&#10;&#10;&#10;&#10;\end{document}"/>
+  <p:tag name="IGUANATEXSIZE" val="14"/>
+  <p:tag name="IGUANATEXCURSOR" val="101"/>
+  <p:tag name="TRANSPARENCY" val="True"/>
+  <p:tag name="FILENAME" val=""/>
+  <p:tag name="INPUTTYPE" val="0"/>
+  <p:tag name="LATEXENGINEID" val="0"/>
+  <p:tag name="TEMPFOLDER" val="C:\Users\ecestudent\Documents\IguanaTexTemp\"/>
+</p:tagLst>
+</file>
+
+<file path=ppt/tags/tag22.xml><?xml version="1.0" encoding="utf-8"?>
+<p:tagLst xmlns:a="http://schemas.openxmlformats.org/drawingml/2006/main" xmlns:r="http://schemas.openxmlformats.org/officeDocument/2006/relationships" xmlns:p="http://schemas.openxmlformats.org/presentationml/2006/main">
+  <p:tag name="ORIGINALHEIGHT" val="123.7346"/>
+  <p:tag name="ORIGINALWIDTH" val="206.2243"/>
+  <p:tag name="OUTPUTDPI" val="1200"/>
+  <p:tag name="LATEXADDIN" val="\documentclass{article}&#10;\usepackage{amsmath}&#10;\pagestyle{empty}&#10;\begin{document}&#10;&#10;$e(k)$&#10;&#10;&#10;\end{document}"/>
+  <p:tag name="IGUANATEXSIZE" val="20"/>
+  <p:tag name="IGUANATEXCURSOR" val="83"/>
+  <p:tag name="TRANSPARENCY" val="True"/>
+  <p:tag name="FILENAME" val=""/>
+  <p:tag name="INPUTTYPE" val="0"/>
+  <p:tag name="LATEXENGINEID" val="0"/>
+  <p:tag name="TEMPFOLDER" val="C:\Users\ecestudent\Documents\IguanaTexTemp\"/>
+</p:tagLst>
+</file>
+
+<file path=ppt/tags/tag23.xml><?xml version="1.0" encoding="utf-8"?>
+<p:tagLst xmlns:a="http://schemas.openxmlformats.org/drawingml/2006/main" xmlns:r="http://schemas.openxmlformats.org/officeDocument/2006/relationships" xmlns:p="http://schemas.openxmlformats.org/presentationml/2006/main">
+  <p:tag name="ORIGINALHEIGHT" val="130.4837"/>
+  <p:tag name="ORIGINALWIDTH" val="305.9617"/>
+  <p:tag name="OUTPUTDPI" val="1200"/>
+  <p:tag name="LATEXADDIN" val="\documentclass{article}&#10;\usepackage{amsmath}&#10;\pagestyle{empty}&#10;\begin{document}&#10;&#10;$e^{\text{-}j\hat{\theta}(k)}$&#10;&#10;&#10;\end{document}"/>
+  <p:tag name="IGUANATEXSIZE" val="20"/>
+  <p:tag name="IGUANATEXCURSOR" val="110"/>
   <p:tag name="TRANSPARENCY" val="True"/>
   <p:tag name="FILENAME" val=""/>
   <p:tag name="INPUTTYPE" val="0"/>

</xml_diff>

<commit_message>
finished revising all the bulk chapters, I need to fix psi to be the SOQPSK-TG psd and write the problem statement and conclusion.
</commit_message>
<xml_diff>
--- a/figures/eq_equations/eq_equalizers.pptx
+++ b/figures/eq_equations/eq_equalizers.pptx
@@ -9877,149 +9877,29 @@
           <a:chExt cx="0" cy="0"/>
         </a:xfrm>
       </p:grpSpPr>
-      <p:cxnSp>
-        <p:nvCxnSpPr>
-          <p:cNvPr id="11" name="Straight Arrow Connector 10"/>
-          <p:cNvCxnSpPr>
-            <a:stCxn id="27" idx="2"/>
-            <a:endCxn id="15" idx="0"/>
-          </p:cNvCxnSpPr>
-          <p:nvPr/>
-        </p:nvCxnSpPr>
-        <p:spPr>
-          <a:xfrm>
-            <a:off x="7290320" y="872506"/>
-            <a:ext cx="0" cy="831772"/>
-          </a:xfrm>
-          <a:prstGeom prst="straightConnector1">
-            <a:avLst/>
-          </a:prstGeom>
-          <a:ln w="12700" cmpd="sng">
-            <a:solidFill>
-              <a:schemeClr val="tx1"/>
-            </a:solidFill>
-            <a:tailEnd type="triangle"/>
-          </a:ln>
-          <a:effectLst/>
-        </p:spPr>
-        <p:style>
-          <a:lnRef idx="2">
-            <a:schemeClr val="accent1"/>
-          </a:lnRef>
-          <a:fillRef idx="0">
-            <a:schemeClr val="accent1"/>
-          </a:fillRef>
-          <a:effectRef idx="1">
-            <a:schemeClr val="accent1"/>
-          </a:effectRef>
-          <a:fontRef idx="minor">
-            <a:schemeClr val="tx1"/>
-          </a:fontRef>
-        </p:style>
-      </p:cxnSp>
-      <p:cxnSp>
-        <p:nvCxnSpPr>
-          <p:cNvPr id="13" name="Elbow Connector 12"/>
-          <p:cNvCxnSpPr>
-            <a:stCxn id="8" idx="4"/>
-            <a:endCxn id="17" idx="1"/>
-          </p:cNvCxnSpPr>
-          <p:nvPr/>
-        </p:nvCxnSpPr>
-        <p:spPr>
-          <a:xfrm rot="16200000" flipH="1">
-            <a:off x="3098071" y="1562108"/>
-            <a:ext cx="1132778" cy="294561"/>
-          </a:xfrm>
-          <a:prstGeom prst="bentConnector2">
-            <a:avLst/>
-          </a:prstGeom>
-          <a:ln w="12700">
-            <a:solidFill>
-              <a:schemeClr val="tx1"/>
-            </a:solidFill>
-            <a:headEnd type="triangle" w="med" len="med"/>
-            <a:tailEnd type="none" w="med" len="med"/>
-          </a:ln>
-        </p:spPr>
-        <p:style>
-          <a:lnRef idx="1">
-            <a:schemeClr val="accent1"/>
-          </a:lnRef>
-          <a:fillRef idx="0">
-            <a:schemeClr val="accent1"/>
-          </a:fillRef>
-          <a:effectRef idx="0">
-            <a:schemeClr val="accent1"/>
-          </a:effectRef>
-          <a:fontRef idx="minor">
-            <a:schemeClr val="tx1"/>
-          </a:fontRef>
-        </p:style>
-      </p:cxnSp>
-      <p:cxnSp>
-        <p:nvCxnSpPr>
-          <p:cNvPr id="14" name="Elbow Connector 13"/>
-          <p:cNvCxnSpPr>
-            <a:stCxn id="15" idx="3"/>
-            <a:endCxn id="9" idx="2"/>
-          </p:cNvCxnSpPr>
-          <p:nvPr/>
-        </p:nvCxnSpPr>
-        <p:spPr>
-          <a:xfrm flipV="1">
-            <a:off x="7861820" y="1447800"/>
-            <a:ext cx="600993" cy="827978"/>
-          </a:xfrm>
-          <a:prstGeom prst="bentConnector2">
-            <a:avLst/>
-          </a:prstGeom>
-          <a:ln w="12700">
-            <a:solidFill>
-              <a:schemeClr val="tx1"/>
-            </a:solidFill>
-            <a:headEnd type="triangle" w="med" len="med"/>
-            <a:tailEnd type="none" w="med" len="med"/>
-          </a:ln>
-        </p:spPr>
-        <p:style>
-          <a:lnRef idx="1">
-            <a:schemeClr val="accent1"/>
-          </a:lnRef>
-          <a:fillRef idx="0">
-            <a:schemeClr val="accent1"/>
-          </a:fillRef>
-          <a:effectRef idx="0">
-            <a:schemeClr val="accent1"/>
-          </a:effectRef>
-          <a:fontRef idx="minor">
-            <a:schemeClr val="tx1"/>
-          </a:fontRef>
-        </p:style>
-      </p:cxnSp>
       <p:grpSp>
         <p:nvGrpSpPr>
-          <p:cNvPr id="3" name="Group 2"/>
+          <p:cNvPr id="42" name="Group 41"/>
           <p:cNvGrpSpPr/>
           <p:nvPr/>
         </p:nvGrpSpPr>
         <p:grpSpPr>
           <a:xfrm>
-            <a:off x="2819241" y="1704278"/>
-            <a:ext cx="6381634" cy="3401122"/>
-            <a:chOff x="2819241" y="2514600"/>
-            <a:chExt cx="6381634" cy="3401122"/>
+            <a:off x="1905000" y="381000"/>
+            <a:ext cx="8331956" cy="4800600"/>
+            <a:chOff x="1905000" y="381000"/>
+            <a:chExt cx="8331956" cy="4800600"/>
           </a:xfrm>
         </p:grpSpPr>
         <p:pic>
           <p:nvPicPr>
-            <p:cNvPr id="5" name="Picture 4"/>
+            <p:cNvPr id="6" name="Picture 5"/>
             <p:cNvPicPr>
               <a:picLocks noChangeAspect="1"/>
             </p:cNvPicPr>
             <p:nvPr>
               <p:custDataLst>
-                <p:tags r:id="rId4"/>
+                <p:tags r:id="rId1"/>
               </p:custDataLst>
             </p:nvPr>
           </p:nvPicPr>
@@ -10037,8 +9917,8 @@
           </p:blipFill>
           <p:spPr>
             <a:xfrm>
-              <a:off x="3091937" y="3875422"/>
-              <a:ext cx="5958083" cy="1063620"/>
+              <a:off x="2941081" y="4422742"/>
+              <a:ext cx="6259794" cy="758858"/>
             </a:xfrm>
             <a:prstGeom prst="rect">
               <a:avLst/>
@@ -10047,13 +9927,13 @@
         </p:pic>
         <p:pic>
           <p:nvPicPr>
-            <p:cNvPr id="6" name="Picture 5"/>
+            <p:cNvPr id="5" name="Picture 4"/>
             <p:cNvPicPr>
               <a:picLocks noChangeAspect="1"/>
             </p:cNvPicPr>
             <p:nvPr>
               <p:custDataLst>
-                <p:tags r:id="rId5"/>
+                <p:tags r:id="rId2"/>
               </p:custDataLst>
             </p:nvPr>
           </p:nvPicPr>
@@ -10071,984 +9951,1119 @@
           </p:blipFill>
           <p:spPr>
             <a:xfrm>
-              <a:off x="2941081" y="5156864"/>
-              <a:ext cx="6259794" cy="758858"/>
+              <a:off x="3091937" y="3141300"/>
+              <a:ext cx="5958083" cy="1063620"/>
             </a:xfrm>
             <a:prstGeom prst="rect">
               <a:avLst/>
             </a:prstGeom>
           </p:spPr>
         </p:pic>
-        <p:sp>
-          <p:nvSpPr>
-            <p:cNvPr id="15" name="Rectangle 14"/>
-            <p:cNvSpPr/>
+        <p:grpSp>
+          <p:nvGrpSpPr>
+            <p:cNvPr id="39" name="Group 38"/>
+            <p:cNvGrpSpPr/>
             <p:nvPr/>
-          </p:nvSpPr>
-          <p:spPr>
+          </p:nvGrpSpPr>
+          <p:grpSpPr>
             <a:xfrm>
-              <a:off x="6718820" y="2514600"/>
-              <a:ext cx="1143000" cy="1143000"/>
+              <a:off x="1905000" y="381000"/>
+              <a:ext cx="8331956" cy="2542478"/>
+              <a:chOff x="1905000" y="304800"/>
+              <a:chExt cx="8331956" cy="2542478"/>
             </a:xfrm>
-            <a:prstGeom prst="rect">
-              <a:avLst/>
-            </a:prstGeom>
-            <a:solidFill>
-              <a:schemeClr val="bg1">
-                <a:lumMod val="95000"/>
-              </a:schemeClr>
-            </a:solidFill>
-            <a:ln>
+          </p:grpSpPr>
+          <p:cxnSp>
+            <p:nvCxnSpPr>
+              <p:cNvPr id="11" name="Straight Arrow Connector 10"/>
+              <p:cNvCxnSpPr>
+                <a:stCxn id="27" idx="2"/>
+                <a:endCxn id="15" idx="0"/>
+              </p:cNvCxnSpPr>
+              <p:nvPr/>
+            </p:nvCxnSpPr>
+            <p:spPr>
+              <a:xfrm>
+                <a:off x="7290320" y="872506"/>
+                <a:ext cx="0" cy="831772"/>
+              </a:xfrm>
+              <a:prstGeom prst="straightConnector1">
+                <a:avLst/>
+              </a:prstGeom>
+              <a:ln w="12700" cmpd="sng">
+                <a:solidFill>
+                  <a:schemeClr val="tx1"/>
+                </a:solidFill>
+                <a:tailEnd type="triangle"/>
+              </a:ln>
+              <a:effectLst/>
+            </p:spPr>
+            <p:style>
+              <a:lnRef idx="2">
+                <a:schemeClr val="accent1"/>
+              </a:lnRef>
+              <a:fillRef idx="0">
+                <a:schemeClr val="accent1"/>
+              </a:fillRef>
+              <a:effectRef idx="1">
+                <a:schemeClr val="accent1"/>
+              </a:effectRef>
+              <a:fontRef idx="minor">
+                <a:schemeClr val="tx1"/>
+              </a:fontRef>
+            </p:style>
+          </p:cxnSp>
+          <p:cxnSp>
+            <p:nvCxnSpPr>
+              <p:cNvPr id="13" name="Elbow Connector 12"/>
+              <p:cNvCxnSpPr>
+                <a:stCxn id="8" idx="4"/>
+                <a:endCxn id="17" idx="1"/>
+              </p:cNvCxnSpPr>
+              <p:nvPr/>
+            </p:nvCxnSpPr>
+            <p:spPr>
+              <a:xfrm rot="16200000" flipH="1">
+                <a:off x="3098071" y="1562108"/>
+                <a:ext cx="1132778" cy="294561"/>
+              </a:xfrm>
+              <a:prstGeom prst="bentConnector2">
+                <a:avLst/>
+              </a:prstGeom>
+              <a:ln w="12700">
+                <a:solidFill>
+                  <a:schemeClr val="tx1"/>
+                </a:solidFill>
+                <a:headEnd type="triangle" w="med" len="med"/>
+                <a:tailEnd type="none" w="med" len="med"/>
+              </a:ln>
+            </p:spPr>
+            <p:style>
+              <a:lnRef idx="1">
+                <a:schemeClr val="accent1"/>
+              </a:lnRef>
+              <a:fillRef idx="0">
+                <a:schemeClr val="accent1"/>
+              </a:fillRef>
+              <a:effectRef idx="0">
+                <a:schemeClr val="accent1"/>
+              </a:effectRef>
+              <a:fontRef idx="minor">
+                <a:schemeClr val="tx1"/>
+              </a:fontRef>
+            </p:style>
+          </p:cxnSp>
+          <p:cxnSp>
+            <p:nvCxnSpPr>
+              <p:cNvPr id="14" name="Elbow Connector 13"/>
+              <p:cNvCxnSpPr>
+                <a:stCxn id="15" idx="3"/>
+                <a:endCxn id="9" idx="2"/>
+              </p:cNvCxnSpPr>
+              <p:nvPr/>
+            </p:nvCxnSpPr>
+            <p:spPr>
+              <a:xfrm flipV="1">
+                <a:off x="7861820" y="1447800"/>
+                <a:ext cx="600993" cy="827978"/>
+              </a:xfrm>
+              <a:prstGeom prst="bentConnector2">
+                <a:avLst/>
+              </a:prstGeom>
+              <a:ln w="12700">
+                <a:solidFill>
+                  <a:schemeClr val="tx1"/>
+                </a:solidFill>
+                <a:headEnd type="triangle" w="med" len="med"/>
+                <a:tailEnd type="none" w="med" len="med"/>
+              </a:ln>
+            </p:spPr>
+            <p:style>
+              <a:lnRef idx="1">
+                <a:schemeClr val="accent1"/>
+              </a:lnRef>
+              <a:fillRef idx="0">
+                <a:schemeClr val="accent1"/>
+              </a:fillRef>
+              <a:effectRef idx="0">
+                <a:schemeClr val="accent1"/>
+              </a:effectRef>
+              <a:fontRef idx="minor">
+                <a:schemeClr val="tx1"/>
+              </a:fontRef>
+            </p:style>
+          </p:cxnSp>
+          <p:sp>
+            <p:nvSpPr>
+              <p:cNvPr id="15" name="Rectangle 14"/>
+              <p:cNvSpPr/>
+              <p:nvPr/>
+            </p:nvSpPr>
+            <p:spPr>
+              <a:xfrm>
+                <a:off x="6718820" y="1704278"/>
+                <a:ext cx="1143000" cy="1143000"/>
+              </a:xfrm>
+              <a:prstGeom prst="rect">
+                <a:avLst/>
+              </a:prstGeom>
               <a:solidFill>
+                <a:schemeClr val="bg1">
+                  <a:lumMod val="95000"/>
+                </a:schemeClr>
+              </a:solidFill>
+              <a:ln>
+                <a:solidFill>
+                  <a:schemeClr val="tx1"/>
+                </a:solidFill>
+              </a:ln>
+            </p:spPr>
+            <p:style>
+              <a:lnRef idx="2">
+                <a:schemeClr val="accent1">
+                  <a:shade val="50000"/>
+                </a:schemeClr>
+              </a:lnRef>
+              <a:fillRef idx="1">
+                <a:schemeClr val="accent1"/>
+              </a:fillRef>
+              <a:effectRef idx="0">
+                <a:schemeClr val="accent1"/>
+              </a:effectRef>
+              <a:fontRef idx="minor">
+                <a:schemeClr val="lt1"/>
+              </a:fontRef>
+            </p:style>
+            <p:txBody>
+              <a:bodyPr rtlCol="0" anchor="ctr"/>
+              <a:lstStyle/>
+              <a:p>
+                <a:pPr algn="ctr"/>
+                <a:r>
+                  <a:rPr lang="en-US" dirty="0" smtClean="0">
+                    <a:ln w="0"/>
+                    <a:solidFill>
+                      <a:schemeClr val="tx1"/>
+                    </a:solidFill>
+                    <a:effectLst>
+                      <a:outerShdw blurRad="38100" dist="19050" dir="2700000" algn="tl" rotWithShape="0">
+                        <a:schemeClr val="dk1">
+                          <a:alpha val="40000"/>
+                        </a:schemeClr>
+                      </a:outerShdw>
+                    </a:effectLst>
+                    <a:latin typeface="Times New Roman" panose="02020603050405020304" pitchFamily="18" charset="0"/>
+                    <a:cs typeface="Times New Roman" panose="02020603050405020304" pitchFamily="18" charset="0"/>
+                  </a:rPr>
+                  <a:t>PED</a:t>
+                </a:r>
+                <a:endParaRPr lang="en-US" dirty="0">
+                  <a:latin typeface="Times New Roman" panose="02020603050405020304" pitchFamily="18" charset="0"/>
+                  <a:cs typeface="Times New Roman" panose="02020603050405020304" pitchFamily="18" charset="0"/>
+                </a:endParaRPr>
+              </a:p>
+            </p:txBody>
+          </p:sp>
+          <p:sp>
+            <p:nvSpPr>
+              <p:cNvPr id="35" name="Isosceles Triangle 34"/>
+              <p:cNvSpPr/>
+              <p:nvPr/>
+            </p:nvSpPr>
+            <p:spPr>
+              <a:xfrm rot="16200000">
+                <a:off x="5522129" y="1960310"/>
+                <a:ext cx="630936" cy="630936"/>
+              </a:xfrm>
+              <a:prstGeom prst="triangle">
+                <a:avLst/>
+              </a:prstGeom>
+              <a:solidFill>
+                <a:schemeClr val="bg1">
+                  <a:lumMod val="95000"/>
+                </a:schemeClr>
+              </a:solidFill>
+              <a:ln>
+                <a:solidFill>
+                  <a:schemeClr val="tx1"/>
+                </a:solidFill>
+              </a:ln>
+            </p:spPr>
+            <p:style>
+              <a:lnRef idx="2">
+                <a:schemeClr val="accent1">
+                  <a:shade val="50000"/>
+                </a:schemeClr>
+              </a:lnRef>
+              <a:fillRef idx="1">
+                <a:schemeClr val="accent1"/>
+              </a:fillRef>
+              <a:effectRef idx="0">
+                <a:schemeClr val="accent1"/>
+              </a:effectRef>
+              <a:fontRef idx="minor">
+                <a:schemeClr val="lt1"/>
+              </a:fontRef>
+            </p:style>
+            <p:txBody>
+              <a:bodyPr rtlCol="0" anchor="ctr"/>
+              <a:lstStyle/>
+              <a:p>
+                <a:pPr algn="ctr"/>
+                <a:endParaRPr lang="en-US" dirty="0"/>
+              </a:p>
+            </p:txBody>
+          </p:sp>
+          <p:pic>
+            <p:nvPicPr>
+              <p:cNvPr id="36" name="Picture 35"/>
+              <p:cNvPicPr>
+                <a:picLocks noChangeAspect="1"/>
+              </p:cNvPicPr>
+              <p:nvPr>
+                <p:custDataLst>
+                  <p:tags r:id="rId3"/>
+                </p:custDataLst>
+              </p:nvPr>
+            </p:nvPicPr>
+            <p:blipFill>
+              <a:blip r:embed="rId12" cstate="print">
+                <a:extLst>
+                  <a:ext uri="{28A0092B-C50C-407E-A947-70E740481C1C}">
+                    <a14:useLocalDpi xmlns:a14="http://schemas.microsoft.com/office/drawing/2010/main" val="0"/>
+                  </a:ext>
+                </a:extLst>
+              </a:blip>
+              <a:stretch>
+                <a:fillRect/>
+              </a:stretch>
+            </p:blipFill>
+            <p:spPr>
+              <a:xfrm>
+                <a:off x="5820071" y="2174210"/>
+                <a:ext cx="279680" cy="203136"/>
+              </a:xfrm>
+              <a:prstGeom prst="rect">
+                <a:avLst/>
+              </a:prstGeom>
+              <a:noFill/>
+            </p:spPr>
+          </p:pic>
+          <p:sp>
+            <p:nvSpPr>
+              <p:cNvPr id="17" name="Rectangle 16"/>
+              <p:cNvSpPr/>
+              <p:nvPr/>
+            </p:nvSpPr>
+            <p:spPr>
+              <a:xfrm>
+                <a:off x="3811741" y="1704278"/>
+                <a:ext cx="1143000" cy="1143000"/>
+              </a:xfrm>
+              <a:prstGeom prst="rect">
+                <a:avLst/>
+              </a:prstGeom>
+              <a:solidFill>
+                <a:schemeClr val="bg1">
+                  <a:lumMod val="95000"/>
+                </a:schemeClr>
+              </a:solidFill>
+              <a:ln>
+                <a:solidFill>
+                  <a:schemeClr val="tx1"/>
+                </a:solidFill>
+              </a:ln>
+            </p:spPr>
+            <p:style>
+              <a:lnRef idx="2">
+                <a:schemeClr val="accent1">
+                  <a:shade val="50000"/>
+                </a:schemeClr>
+              </a:lnRef>
+              <a:fillRef idx="1">
+                <a:schemeClr val="accent1"/>
+              </a:fillRef>
+              <a:effectRef idx="0">
+                <a:schemeClr val="accent1"/>
+              </a:effectRef>
+              <a:fontRef idx="minor">
+                <a:schemeClr val="lt1"/>
+              </a:fontRef>
+            </p:style>
+            <p:txBody>
+              <a:bodyPr rtlCol="0" anchor="ctr"/>
+              <a:lstStyle/>
+              <a:p>
+                <a:pPr algn="ctr"/>
+                <a:r>
+                  <a:rPr lang="en-US" dirty="0" smtClean="0">
+                    <a:ln w="0"/>
+                    <a:solidFill>
+                      <a:schemeClr val="tx1"/>
+                    </a:solidFill>
+                    <a:effectLst>
+                      <a:outerShdw blurRad="38100" dist="19050" dir="2700000" algn="tl" rotWithShape="0">
+                        <a:schemeClr val="dk1">
+                          <a:alpha val="40000"/>
+                        </a:schemeClr>
+                      </a:outerShdw>
+                    </a:effectLst>
+                    <a:latin typeface="Times New Roman" panose="02020603050405020304" pitchFamily="18" charset="0"/>
+                    <a:cs typeface="Times New Roman" panose="02020603050405020304" pitchFamily="18" charset="0"/>
+                  </a:rPr>
+                  <a:t>DDS</a:t>
+                </a:r>
+                <a:endParaRPr lang="en-US" dirty="0">
+                  <a:latin typeface="Times New Roman" panose="02020603050405020304" pitchFamily="18" charset="0"/>
+                  <a:cs typeface="Times New Roman" panose="02020603050405020304" pitchFamily="18" charset="0"/>
+                </a:endParaRPr>
+              </a:p>
+            </p:txBody>
+          </p:sp>
+          <p:cxnSp>
+            <p:nvCxnSpPr>
+              <p:cNvPr id="18" name="Straight Arrow Connector 17"/>
+              <p:cNvCxnSpPr>
+                <a:stCxn id="35" idx="3"/>
+                <a:endCxn id="15" idx="1"/>
+              </p:cNvCxnSpPr>
+              <p:nvPr/>
+            </p:nvCxnSpPr>
+            <p:spPr>
+              <a:xfrm>
+                <a:off x="6153065" y="2275778"/>
+                <a:ext cx="565755" cy="0"/>
+              </a:xfrm>
+              <a:prstGeom prst="straightConnector1">
+                <a:avLst/>
+              </a:prstGeom>
+              <a:ln w="12700">
+                <a:solidFill>
+                  <a:schemeClr val="tx1"/>
+                </a:solidFill>
+                <a:headEnd type="triangle" w="med" len="med"/>
+                <a:tailEnd type="none" w="med" len="med"/>
+              </a:ln>
+            </p:spPr>
+            <p:style>
+              <a:lnRef idx="1">
+                <a:schemeClr val="accent1"/>
+              </a:lnRef>
+              <a:fillRef idx="0">
+                <a:schemeClr val="accent1"/>
+              </a:fillRef>
+              <a:effectRef idx="0">
+                <a:schemeClr val="accent1"/>
+              </a:effectRef>
+              <a:fontRef idx="minor">
                 <a:schemeClr val="tx1"/>
-              </a:solidFill>
-            </a:ln>
-          </p:spPr>
-          <p:style>
-            <a:lnRef idx="2">
-              <a:schemeClr val="accent1">
-                <a:shade val="50000"/>
-              </a:schemeClr>
-            </a:lnRef>
-            <a:fillRef idx="1">
-              <a:schemeClr val="accent1"/>
-            </a:fillRef>
-            <a:effectRef idx="0">
-              <a:schemeClr val="accent1"/>
-            </a:effectRef>
-            <a:fontRef idx="minor">
-              <a:schemeClr val="lt1"/>
-            </a:fontRef>
-          </p:style>
-          <p:txBody>
-            <a:bodyPr rtlCol="0" anchor="ctr"/>
-            <a:lstStyle/>
-            <a:p>
-              <a:pPr algn="ctr"/>
-              <a:r>
-                <a:rPr lang="en-US" dirty="0" smtClean="0">
-                  <a:ln w="0"/>
+              </a:fontRef>
+            </p:style>
+          </p:cxnSp>
+          <p:cxnSp>
+            <p:nvCxnSpPr>
+              <p:cNvPr id="19" name="Straight Arrow Connector 18"/>
+              <p:cNvCxnSpPr>
+                <a:stCxn id="17" idx="3"/>
+                <a:endCxn id="35" idx="0"/>
+              </p:cNvCxnSpPr>
+              <p:nvPr/>
+            </p:nvCxnSpPr>
+            <p:spPr>
+              <a:xfrm>
+                <a:off x="4954741" y="2275778"/>
+                <a:ext cx="567388" cy="0"/>
+              </a:xfrm>
+              <a:prstGeom prst="straightConnector1">
+                <a:avLst/>
+              </a:prstGeom>
+              <a:ln w="12700">
+                <a:solidFill>
+                  <a:schemeClr val="tx1"/>
+                </a:solidFill>
+                <a:headEnd type="triangle" w="med" len="med"/>
+                <a:tailEnd type="none" w="med" len="med"/>
+              </a:ln>
+            </p:spPr>
+            <p:style>
+              <a:lnRef idx="1">
+                <a:schemeClr val="accent1"/>
+              </a:lnRef>
+              <a:fillRef idx="0">
+                <a:schemeClr val="accent1"/>
+              </a:fillRef>
+              <a:effectRef idx="0">
+                <a:schemeClr val="accent1"/>
+              </a:effectRef>
+              <a:fontRef idx="minor">
+                <a:schemeClr val="tx1"/>
+              </a:fontRef>
+            </p:style>
+          </p:cxnSp>
+          <p:pic>
+            <p:nvPicPr>
+              <p:cNvPr id="20" name="Picture 19"/>
+              <p:cNvPicPr>
+                <a:picLocks noChangeAspect="1"/>
+              </p:cNvPicPr>
+              <p:nvPr>
+                <p:custDataLst>
+                  <p:tags r:id="rId4"/>
+                </p:custDataLst>
+              </p:nvPr>
+            </p:nvPicPr>
+            <p:blipFill>
+              <a:blip r:embed="rId13" cstate="print">
+                <a:extLst>
+                  <a:ext uri="{28A0092B-C50C-407E-A947-70E740481C1C}">
+                    <a14:useLocalDpi xmlns:a14="http://schemas.microsoft.com/office/drawing/2010/main" val="0"/>
+                  </a:ext>
+                </a:extLst>
+              </a:blip>
+              <a:stretch>
+                <a:fillRect/>
+              </a:stretch>
+            </p:blipFill>
+            <p:spPr>
+              <a:xfrm>
+                <a:off x="6234847" y="1931686"/>
+                <a:ext cx="419048" cy="251429"/>
+              </a:xfrm>
+              <a:prstGeom prst="rect">
+                <a:avLst/>
+              </a:prstGeom>
+            </p:spPr>
+          </p:pic>
+          <p:pic>
+            <p:nvPicPr>
+              <p:cNvPr id="21" name="Picture 20"/>
+              <p:cNvPicPr>
+                <a:picLocks noChangeAspect="1"/>
+              </p:cNvPicPr>
+              <p:nvPr>
+                <p:custDataLst>
+                  <p:tags r:id="rId5"/>
+                </p:custDataLst>
+              </p:nvPr>
+            </p:nvPicPr>
+            <p:blipFill>
+              <a:blip r:embed="rId14" cstate="print">
+                <a:extLst>
+                  <a:ext uri="{28A0092B-C50C-407E-A947-70E740481C1C}">
+                    <a14:useLocalDpi xmlns:a14="http://schemas.microsoft.com/office/drawing/2010/main" val="0"/>
+                  </a:ext>
+                </a:extLst>
+              </a:blip>
+              <a:stretch>
+                <a:fillRect/>
+              </a:stretch>
+            </p:blipFill>
+            <p:spPr>
+              <a:xfrm>
+                <a:off x="2819241" y="1773299"/>
+                <a:ext cx="621713" cy="265143"/>
+              </a:xfrm>
+              <a:prstGeom prst="rect">
+                <a:avLst/>
+              </a:prstGeom>
+            </p:spPr>
+          </p:pic>
+          <p:grpSp>
+            <p:nvGrpSpPr>
+              <p:cNvPr id="2" name="Group 1"/>
+              <p:cNvGrpSpPr/>
+              <p:nvPr/>
+            </p:nvGrpSpPr>
+            <p:grpSpPr>
+              <a:xfrm>
+                <a:off x="1905000" y="304800"/>
+                <a:ext cx="8331956" cy="1143000"/>
+                <a:chOff x="1905000" y="803894"/>
+                <a:chExt cx="8331956" cy="1143000"/>
+              </a:xfrm>
+            </p:grpSpPr>
+            <p:sp>
+              <p:nvSpPr>
+                <p:cNvPr id="8" name="Flowchart: Summing Junction 7"/>
+                <p:cNvSpPr/>
+                <p:nvPr/>
+              </p:nvSpPr>
+              <p:spPr>
+                <a:xfrm>
+                  <a:off x="3250480" y="1108694"/>
+                  <a:ext cx="533400" cy="533400"/>
+                </a:xfrm>
+                <a:prstGeom prst="flowChartSummingJunction">
+                  <a:avLst/>
+                </a:prstGeom>
+                <a:solidFill>
+                  <a:schemeClr val="bg1">
+                    <a:lumMod val="95000"/>
+                  </a:schemeClr>
+                </a:solidFill>
+                <a:ln>
                   <a:solidFill>
                     <a:schemeClr val="tx1"/>
                   </a:solidFill>
-                  <a:effectLst>
-                    <a:outerShdw blurRad="38100" dist="19050" dir="2700000" algn="tl" rotWithShape="0">
-                      <a:schemeClr val="dk1">
-                        <a:alpha val="40000"/>
-                      </a:schemeClr>
-                    </a:outerShdw>
-                  </a:effectLst>
-                  <a:latin typeface="Times New Roman" panose="02020603050405020304" pitchFamily="18" charset="0"/>
-                  <a:cs typeface="Times New Roman" panose="02020603050405020304" pitchFamily="18" charset="0"/>
-                </a:rPr>
-                <a:t>PED</a:t>
-              </a:r>
-              <a:endParaRPr lang="en-US" dirty="0">
-                <a:latin typeface="Times New Roman" panose="02020603050405020304" pitchFamily="18" charset="0"/>
-                <a:cs typeface="Times New Roman" panose="02020603050405020304" pitchFamily="18" charset="0"/>
-              </a:endParaRPr>
-            </a:p>
-          </p:txBody>
-        </p:sp>
-        <p:sp>
-          <p:nvSpPr>
-            <p:cNvPr id="35" name="Isosceles Triangle 34"/>
-            <p:cNvSpPr/>
-            <p:nvPr/>
-          </p:nvSpPr>
-          <p:spPr>
-            <a:xfrm rot="16200000">
-              <a:off x="5522129" y="2770632"/>
-              <a:ext cx="630936" cy="630936"/>
-            </a:xfrm>
-            <a:prstGeom prst="triangle">
-              <a:avLst/>
-            </a:prstGeom>
-            <a:solidFill>
-              <a:schemeClr val="bg1">
-                <a:lumMod val="95000"/>
-              </a:schemeClr>
-            </a:solidFill>
-            <a:ln>
-              <a:solidFill>
-                <a:schemeClr val="tx1"/>
-              </a:solidFill>
-            </a:ln>
-          </p:spPr>
-          <p:style>
-            <a:lnRef idx="2">
-              <a:schemeClr val="accent1">
-                <a:shade val="50000"/>
-              </a:schemeClr>
-            </a:lnRef>
-            <a:fillRef idx="1">
-              <a:schemeClr val="accent1"/>
-            </a:fillRef>
-            <a:effectRef idx="0">
-              <a:schemeClr val="accent1"/>
-            </a:effectRef>
-            <a:fontRef idx="minor">
-              <a:schemeClr val="lt1"/>
-            </a:fontRef>
-          </p:style>
-          <p:txBody>
-            <a:bodyPr rtlCol="0" anchor="ctr"/>
-            <a:lstStyle/>
-            <a:p>
-              <a:pPr algn="ctr"/>
-              <a:endParaRPr lang="en-US" dirty="0"/>
-            </a:p>
-          </p:txBody>
-        </p:sp>
-        <p:pic>
-          <p:nvPicPr>
-            <p:cNvPr id="36" name="Picture 35"/>
-            <p:cNvPicPr>
-              <a:picLocks noChangeAspect="1"/>
-            </p:cNvPicPr>
-            <p:nvPr>
-              <p:custDataLst>
-                <p:tags r:id="rId6"/>
-              </p:custDataLst>
-            </p:nvPr>
-          </p:nvPicPr>
-          <p:blipFill>
-            <a:blip r:embed="rId12" cstate="print">
-              <a:extLst>
-                <a:ext uri="{28A0092B-C50C-407E-A947-70E740481C1C}">
-                  <a14:useLocalDpi xmlns:a14="http://schemas.microsoft.com/office/drawing/2010/main" val="0"/>
-                </a:ext>
-              </a:extLst>
-            </a:blip>
-            <a:stretch>
-              <a:fillRect/>
-            </a:stretch>
-          </p:blipFill>
-          <p:spPr>
-            <a:xfrm>
-              <a:off x="5820071" y="2984532"/>
-              <a:ext cx="279680" cy="203136"/>
-            </a:xfrm>
-            <a:prstGeom prst="rect">
-              <a:avLst/>
-            </a:prstGeom>
-            <a:noFill/>
-          </p:spPr>
-        </p:pic>
-        <p:sp>
-          <p:nvSpPr>
-            <p:cNvPr id="17" name="Rectangle 16"/>
-            <p:cNvSpPr/>
-            <p:nvPr/>
-          </p:nvSpPr>
-          <p:spPr>
-            <a:xfrm>
-              <a:off x="3811741" y="2514600"/>
-              <a:ext cx="1143000" cy="1143000"/>
-            </a:xfrm>
-            <a:prstGeom prst="rect">
-              <a:avLst/>
-            </a:prstGeom>
-            <a:solidFill>
-              <a:schemeClr val="bg1">
-                <a:lumMod val="95000"/>
-              </a:schemeClr>
-            </a:solidFill>
-            <a:ln>
-              <a:solidFill>
-                <a:schemeClr val="tx1"/>
-              </a:solidFill>
-            </a:ln>
-          </p:spPr>
-          <p:style>
-            <a:lnRef idx="2">
-              <a:schemeClr val="accent1">
-                <a:shade val="50000"/>
-              </a:schemeClr>
-            </a:lnRef>
-            <a:fillRef idx="1">
-              <a:schemeClr val="accent1"/>
-            </a:fillRef>
-            <a:effectRef idx="0">
-              <a:schemeClr val="accent1"/>
-            </a:effectRef>
-            <a:fontRef idx="minor">
-              <a:schemeClr val="lt1"/>
-            </a:fontRef>
-          </p:style>
-          <p:txBody>
-            <a:bodyPr rtlCol="0" anchor="ctr"/>
-            <a:lstStyle/>
-            <a:p>
-              <a:pPr algn="ctr"/>
-              <a:r>
-                <a:rPr lang="en-US" dirty="0" smtClean="0">
-                  <a:ln w="0"/>
+                </a:ln>
+              </p:spPr>
+              <p:style>
+                <a:lnRef idx="2">
+                  <a:schemeClr val="accent1">
+                    <a:shade val="50000"/>
+                  </a:schemeClr>
+                </a:lnRef>
+                <a:fillRef idx="1">
+                  <a:schemeClr val="accent1"/>
+                </a:fillRef>
+                <a:effectRef idx="0">
+                  <a:schemeClr val="accent1"/>
+                </a:effectRef>
+                <a:fontRef idx="minor">
+                  <a:schemeClr val="lt1"/>
+                </a:fontRef>
+              </p:style>
+              <p:txBody>
+                <a:bodyPr rtlCol="0" anchor="ctr"/>
+                <a:lstStyle/>
+                <a:p>
+                  <a:pPr algn="ctr"/>
+                  <a:endParaRPr lang="en-US">
+                    <a:latin typeface="Times New Roman" panose="02020603050405020304" pitchFamily="18" charset="0"/>
+                    <a:cs typeface="Times New Roman" panose="02020603050405020304" pitchFamily="18" charset="0"/>
+                  </a:endParaRPr>
+                </a:p>
+              </p:txBody>
+            </p:sp>
+            <p:sp>
+              <p:nvSpPr>
+                <p:cNvPr id="9" name="Rectangle 8"/>
+                <p:cNvSpPr/>
+                <p:nvPr/>
+              </p:nvSpPr>
+              <p:spPr>
+                <a:xfrm>
+                  <a:off x="7891313" y="803894"/>
+                  <a:ext cx="1143000" cy="1143000"/>
+                </a:xfrm>
+                <a:prstGeom prst="rect">
+                  <a:avLst/>
+                </a:prstGeom>
+                <a:solidFill>
+                  <a:schemeClr val="bg1">
+                    <a:lumMod val="95000"/>
+                  </a:schemeClr>
+                </a:solidFill>
+                <a:ln>
                   <a:solidFill>
                     <a:schemeClr val="tx1"/>
                   </a:solidFill>
-                  <a:effectLst>
-                    <a:outerShdw blurRad="38100" dist="19050" dir="2700000" algn="tl" rotWithShape="0">
-                      <a:schemeClr val="dk1">
-                        <a:alpha val="40000"/>
-                      </a:schemeClr>
-                    </a:outerShdw>
-                  </a:effectLst>
-                  <a:latin typeface="Times New Roman" panose="02020603050405020304" pitchFamily="18" charset="0"/>
-                  <a:cs typeface="Times New Roman" panose="02020603050405020304" pitchFamily="18" charset="0"/>
-                </a:rPr>
-                <a:t>DDS</a:t>
-              </a:r>
-              <a:endParaRPr lang="en-US" dirty="0">
-                <a:latin typeface="Times New Roman" panose="02020603050405020304" pitchFamily="18" charset="0"/>
-                <a:cs typeface="Times New Roman" panose="02020603050405020304" pitchFamily="18" charset="0"/>
-              </a:endParaRPr>
-            </a:p>
-          </p:txBody>
-        </p:sp>
-        <p:cxnSp>
-          <p:nvCxnSpPr>
-            <p:cNvPr id="18" name="Straight Arrow Connector 17"/>
-            <p:cNvCxnSpPr>
-              <a:stCxn id="35" idx="3"/>
-              <a:endCxn id="15" idx="1"/>
-            </p:cNvCxnSpPr>
-            <p:nvPr/>
-          </p:nvCxnSpPr>
-          <p:spPr>
-            <a:xfrm>
-              <a:off x="6153065" y="3086100"/>
-              <a:ext cx="565755" cy="0"/>
-            </a:xfrm>
-            <a:prstGeom prst="straightConnector1">
-              <a:avLst/>
-            </a:prstGeom>
-            <a:ln w="12700">
-              <a:solidFill>
-                <a:schemeClr val="tx1"/>
-              </a:solidFill>
-              <a:headEnd type="triangle" w="med" len="med"/>
-              <a:tailEnd type="none" w="med" len="med"/>
-            </a:ln>
-          </p:spPr>
-          <p:style>
-            <a:lnRef idx="1">
-              <a:schemeClr val="accent1"/>
-            </a:lnRef>
-            <a:fillRef idx="0">
-              <a:schemeClr val="accent1"/>
-            </a:fillRef>
-            <a:effectRef idx="0">
-              <a:schemeClr val="accent1"/>
-            </a:effectRef>
-            <a:fontRef idx="minor">
-              <a:schemeClr val="tx1"/>
-            </a:fontRef>
-          </p:style>
-        </p:cxnSp>
-        <p:cxnSp>
-          <p:nvCxnSpPr>
-            <p:cNvPr id="19" name="Straight Arrow Connector 18"/>
-            <p:cNvCxnSpPr>
-              <a:stCxn id="17" idx="3"/>
-              <a:endCxn id="35" idx="0"/>
-            </p:cNvCxnSpPr>
-            <p:nvPr/>
-          </p:nvCxnSpPr>
-          <p:spPr>
-            <a:xfrm>
-              <a:off x="4954741" y="3086100"/>
-              <a:ext cx="567388" cy="0"/>
-            </a:xfrm>
-            <a:prstGeom prst="straightConnector1">
-              <a:avLst/>
-            </a:prstGeom>
-            <a:ln w="12700">
-              <a:solidFill>
-                <a:schemeClr val="tx1"/>
-              </a:solidFill>
-              <a:headEnd type="triangle" w="med" len="med"/>
-              <a:tailEnd type="none" w="med" len="med"/>
-            </a:ln>
-          </p:spPr>
-          <p:style>
-            <a:lnRef idx="1">
-              <a:schemeClr val="accent1"/>
-            </a:lnRef>
-            <a:fillRef idx="0">
-              <a:schemeClr val="accent1"/>
-            </a:fillRef>
-            <a:effectRef idx="0">
-              <a:schemeClr val="accent1"/>
-            </a:effectRef>
-            <a:fontRef idx="minor">
-              <a:schemeClr val="tx1"/>
-            </a:fontRef>
-          </p:style>
-        </p:cxnSp>
-        <p:pic>
-          <p:nvPicPr>
-            <p:cNvPr id="20" name="Picture 19"/>
-            <p:cNvPicPr>
-              <a:picLocks noChangeAspect="1"/>
-            </p:cNvPicPr>
-            <p:nvPr>
-              <p:custDataLst>
-                <p:tags r:id="rId7"/>
-              </p:custDataLst>
-            </p:nvPr>
-          </p:nvPicPr>
-          <p:blipFill>
-            <a:blip r:embed="rId13" cstate="print">
-              <a:extLst>
-                <a:ext uri="{28A0092B-C50C-407E-A947-70E740481C1C}">
-                  <a14:useLocalDpi xmlns:a14="http://schemas.microsoft.com/office/drawing/2010/main" val="0"/>
-                </a:ext>
-              </a:extLst>
-            </a:blip>
-            <a:stretch>
-              <a:fillRect/>
-            </a:stretch>
-          </p:blipFill>
-          <p:spPr>
-            <a:xfrm>
-              <a:off x="6234847" y="2742008"/>
-              <a:ext cx="419048" cy="251429"/>
-            </a:xfrm>
-            <a:prstGeom prst="rect">
-              <a:avLst/>
-            </a:prstGeom>
-          </p:spPr>
-        </p:pic>
-        <p:pic>
-          <p:nvPicPr>
-            <p:cNvPr id="21" name="Picture 20"/>
-            <p:cNvPicPr>
-              <a:picLocks noChangeAspect="1"/>
-            </p:cNvPicPr>
-            <p:nvPr>
-              <p:custDataLst>
-                <p:tags r:id="rId8"/>
-              </p:custDataLst>
-            </p:nvPr>
-          </p:nvPicPr>
-          <p:blipFill>
-            <a:blip r:embed="rId14" cstate="print">
-              <a:extLst>
-                <a:ext uri="{28A0092B-C50C-407E-A947-70E740481C1C}">
-                  <a14:useLocalDpi xmlns:a14="http://schemas.microsoft.com/office/drawing/2010/main" val="0"/>
-                </a:ext>
-              </a:extLst>
-            </a:blip>
-            <a:stretch>
-              <a:fillRect/>
-            </a:stretch>
-          </p:blipFill>
-          <p:spPr>
-            <a:xfrm>
-              <a:off x="2819241" y="2583621"/>
-              <a:ext cx="621713" cy="265143"/>
-            </a:xfrm>
-            <a:prstGeom prst="rect">
-              <a:avLst/>
-            </a:prstGeom>
-          </p:spPr>
-        </p:pic>
-      </p:grpSp>
-      <p:grpSp>
-        <p:nvGrpSpPr>
-          <p:cNvPr id="2" name="Group 1"/>
-          <p:cNvGrpSpPr/>
-          <p:nvPr/>
-        </p:nvGrpSpPr>
-        <p:grpSpPr>
-          <a:xfrm>
-            <a:off x="1905000" y="304800"/>
-            <a:ext cx="8331956" cy="1143000"/>
-            <a:chOff x="1905000" y="803894"/>
-            <a:chExt cx="8331956" cy="1143000"/>
-          </a:xfrm>
-        </p:grpSpPr>
-        <p:sp>
-          <p:nvSpPr>
-            <p:cNvPr id="8" name="Flowchart: Summing Junction 7"/>
-            <p:cNvSpPr/>
-            <p:nvPr/>
-          </p:nvSpPr>
-          <p:spPr>
-            <a:xfrm>
-              <a:off x="3250480" y="1108694"/>
-              <a:ext cx="533400" cy="533400"/>
-            </a:xfrm>
-            <a:prstGeom prst="flowChartSummingJunction">
-              <a:avLst/>
-            </a:prstGeom>
-            <a:solidFill>
-              <a:schemeClr val="bg1">
-                <a:lumMod val="95000"/>
-              </a:schemeClr>
-            </a:solidFill>
-            <a:ln>
-              <a:solidFill>
-                <a:schemeClr val="tx1"/>
-              </a:solidFill>
-            </a:ln>
-          </p:spPr>
-          <p:style>
-            <a:lnRef idx="2">
-              <a:schemeClr val="accent1">
-                <a:shade val="50000"/>
-              </a:schemeClr>
-            </a:lnRef>
-            <a:fillRef idx="1">
-              <a:schemeClr val="accent1"/>
-            </a:fillRef>
-            <a:effectRef idx="0">
-              <a:schemeClr val="accent1"/>
-            </a:effectRef>
-            <a:fontRef idx="minor">
-              <a:schemeClr val="lt1"/>
-            </a:fontRef>
-          </p:style>
-          <p:txBody>
-            <a:bodyPr rtlCol="0" anchor="ctr"/>
-            <a:lstStyle/>
-            <a:p>
-              <a:pPr algn="ctr"/>
-              <a:endParaRPr lang="en-US">
-                <a:latin typeface="Times New Roman" panose="02020603050405020304" pitchFamily="18" charset="0"/>
-                <a:cs typeface="Times New Roman" panose="02020603050405020304" pitchFamily="18" charset="0"/>
-              </a:endParaRPr>
-            </a:p>
-          </p:txBody>
-        </p:sp>
-        <p:sp>
-          <p:nvSpPr>
-            <p:cNvPr id="9" name="Rectangle 8"/>
-            <p:cNvSpPr/>
-            <p:nvPr/>
-          </p:nvSpPr>
-          <p:spPr>
-            <a:xfrm>
-              <a:off x="7891313" y="803894"/>
-              <a:ext cx="1143000" cy="1143000"/>
-            </a:xfrm>
-            <a:prstGeom prst="rect">
-              <a:avLst/>
-            </a:prstGeom>
-            <a:solidFill>
-              <a:schemeClr val="bg1">
-                <a:lumMod val="95000"/>
-              </a:schemeClr>
-            </a:solidFill>
-            <a:ln>
-              <a:solidFill>
-                <a:schemeClr val="tx1"/>
-              </a:solidFill>
-            </a:ln>
-          </p:spPr>
-          <p:style>
-            <a:lnRef idx="2">
-              <a:schemeClr val="accent1">
-                <a:shade val="50000"/>
-              </a:schemeClr>
-            </a:lnRef>
-            <a:fillRef idx="1">
-              <a:schemeClr val="accent1"/>
-            </a:fillRef>
-            <a:effectRef idx="0">
-              <a:schemeClr val="accent1"/>
-            </a:effectRef>
-            <a:fontRef idx="minor">
-              <a:schemeClr val="lt1"/>
-            </a:fontRef>
-          </p:style>
-          <p:txBody>
-            <a:bodyPr rtlCol="0" anchor="ctr"/>
-            <a:lstStyle/>
-            <a:p>
-              <a:pPr algn="ctr"/>
-              <a:endParaRPr lang="en-US" dirty="0">
-                <a:latin typeface="Times New Roman" panose="02020603050405020304" pitchFamily="18" charset="0"/>
-                <a:cs typeface="Times New Roman" panose="02020603050405020304" pitchFamily="18" charset="0"/>
-              </a:endParaRPr>
-            </a:p>
-          </p:txBody>
-        </p:sp>
-        <p:cxnSp>
-          <p:nvCxnSpPr>
-            <p:cNvPr id="10" name="Straight Arrow Connector 9"/>
-            <p:cNvCxnSpPr/>
-            <p:nvPr/>
-          </p:nvCxnSpPr>
-          <p:spPr>
-            <a:xfrm>
-              <a:off x="3783880" y="1375394"/>
-              <a:ext cx="4107433" cy="0"/>
-            </a:xfrm>
-            <a:prstGeom prst="straightConnector1">
-              <a:avLst/>
-            </a:prstGeom>
-            <a:ln w="12700" cmpd="sng">
-              <a:solidFill>
-                <a:schemeClr val="tx1"/>
-              </a:solidFill>
-              <a:tailEnd type="triangle"/>
-            </a:ln>
-            <a:effectLst/>
-          </p:spPr>
-          <p:style>
-            <a:lnRef idx="2">
-              <a:schemeClr val="accent1"/>
-            </a:lnRef>
-            <a:fillRef idx="0">
-              <a:schemeClr val="accent1"/>
-            </a:fillRef>
-            <a:effectRef idx="1">
-              <a:schemeClr val="accent1"/>
-            </a:effectRef>
-            <a:fontRef idx="minor">
-              <a:schemeClr val="tx1"/>
-            </a:fontRef>
-          </p:style>
-        </p:cxnSp>
-        <p:cxnSp>
-          <p:nvCxnSpPr>
-            <p:cNvPr id="12" name="Straight Arrow Connector 11"/>
-            <p:cNvCxnSpPr/>
-            <p:nvPr/>
-          </p:nvCxnSpPr>
-          <p:spPr>
-            <a:xfrm>
-              <a:off x="2566157" y="1375394"/>
-              <a:ext cx="684323" cy="0"/>
-            </a:xfrm>
-            <a:prstGeom prst="straightConnector1">
-              <a:avLst/>
-            </a:prstGeom>
-            <a:ln w="12700">
-              <a:solidFill>
-                <a:schemeClr val="tx1"/>
-              </a:solidFill>
-              <a:tailEnd type="triangle"/>
-            </a:ln>
-          </p:spPr>
-          <p:style>
-            <a:lnRef idx="1">
-              <a:schemeClr val="accent1"/>
-            </a:lnRef>
-            <a:fillRef idx="0">
-              <a:schemeClr val="accent1"/>
-            </a:fillRef>
-            <a:effectRef idx="0">
-              <a:schemeClr val="accent1"/>
-            </a:effectRef>
-            <a:fontRef idx="minor">
-              <a:schemeClr val="tx1"/>
-            </a:fontRef>
-          </p:style>
-        </p:cxnSp>
-        <p:cxnSp>
-          <p:nvCxnSpPr>
-            <p:cNvPr id="22" name="Straight Arrow Connector 21"/>
-            <p:cNvCxnSpPr/>
-            <p:nvPr/>
-          </p:nvCxnSpPr>
-          <p:spPr>
-            <a:xfrm>
-              <a:off x="9034313" y="1375394"/>
-              <a:ext cx="684323" cy="0"/>
-            </a:xfrm>
-            <a:prstGeom prst="straightConnector1">
-              <a:avLst/>
-            </a:prstGeom>
-            <a:ln w="12700">
-              <a:solidFill>
-                <a:schemeClr val="tx1"/>
-              </a:solidFill>
-              <a:tailEnd type="triangle"/>
-            </a:ln>
-          </p:spPr>
-          <p:style>
-            <a:lnRef idx="1">
-              <a:schemeClr val="accent1"/>
-            </a:lnRef>
-            <a:fillRef idx="0">
-              <a:schemeClr val="accent1"/>
-            </a:fillRef>
-            <a:effectRef idx="0">
-              <a:schemeClr val="accent1"/>
-            </a:effectRef>
-            <a:fontRef idx="minor">
-              <a:schemeClr val="tx1"/>
-            </a:fontRef>
-          </p:style>
-        </p:cxnSp>
-        <p:pic>
-          <p:nvPicPr>
-            <p:cNvPr id="23" name="Picture 22"/>
-            <p:cNvPicPr>
-              <a:picLocks noChangeAspect="1"/>
-            </p:cNvPicPr>
-            <p:nvPr>
-              <p:custDataLst>
-                <p:tags r:id="rId1"/>
-              </p:custDataLst>
-            </p:nvPr>
-          </p:nvPicPr>
-          <p:blipFill>
-            <a:blip r:embed="rId15" cstate="print">
-              <a:extLst>
-                <a:ext uri="{28A0092B-C50C-407E-A947-70E740481C1C}">
-                  <a14:useLocalDpi xmlns:a14="http://schemas.microsoft.com/office/drawing/2010/main" val="0"/>
-                </a:ext>
-              </a:extLst>
-            </a:blip>
-            <a:stretch>
-              <a:fillRect/>
-            </a:stretch>
-          </p:blipFill>
-          <p:spPr>
-            <a:xfrm>
-              <a:off x="9801147" y="1249680"/>
-              <a:ext cx="435809" cy="251429"/>
-            </a:xfrm>
-            <a:prstGeom prst="rect">
-              <a:avLst/>
-            </a:prstGeom>
-          </p:spPr>
-        </p:pic>
-        <p:pic>
-          <p:nvPicPr>
-            <p:cNvPr id="24" name="Picture 23"/>
-            <p:cNvPicPr>
-              <a:picLocks noChangeAspect="1"/>
-            </p:cNvPicPr>
-            <p:nvPr>
-              <p:custDataLst>
-                <p:tags r:id="rId2"/>
-              </p:custDataLst>
-            </p:nvPr>
-          </p:nvPicPr>
-          <p:blipFill>
-            <a:blip r:embed="rId16" cstate="print">
-              <a:extLst>
-                <a:ext uri="{28A0092B-C50C-407E-A947-70E740481C1C}">
-                  <a14:useLocalDpi xmlns:a14="http://schemas.microsoft.com/office/drawing/2010/main" val="0"/>
-                </a:ext>
-              </a:extLst>
-            </a:blip>
-            <a:stretch>
-              <a:fillRect/>
-            </a:stretch>
-          </p:blipFill>
-          <p:spPr>
-            <a:xfrm>
-              <a:off x="1905000" y="1249680"/>
-              <a:ext cx="557714" cy="251429"/>
-            </a:xfrm>
-            <a:prstGeom prst="rect">
-              <a:avLst/>
-            </a:prstGeom>
-            <a:ln w="12700">
-              <a:noFill/>
-            </a:ln>
-          </p:spPr>
-        </p:pic>
-        <p:pic>
-          <p:nvPicPr>
-            <p:cNvPr id="25" name="Picture 24"/>
-            <p:cNvPicPr>
-              <a:picLocks noChangeAspect="1"/>
-            </p:cNvPicPr>
-            <p:nvPr>
-              <p:custDataLst>
-                <p:tags r:id="rId3"/>
-              </p:custDataLst>
-            </p:nvPr>
-          </p:nvPicPr>
-          <p:blipFill>
-            <a:blip r:embed="rId17" cstate="print">
-              <a:extLst>
-                <a:ext uri="{28A0092B-C50C-407E-A947-70E740481C1C}">
-                  <a14:useLocalDpi xmlns:a14="http://schemas.microsoft.com/office/drawing/2010/main" val="0"/>
-                </a:ext>
-              </a:extLst>
-            </a:blip>
-            <a:stretch>
-              <a:fillRect/>
-            </a:stretch>
-          </p:blipFill>
-          <p:spPr>
-            <a:xfrm>
-              <a:off x="4020188" y="1066800"/>
-              <a:ext cx="524190" cy="251429"/>
-            </a:xfrm>
-            <a:prstGeom prst="rect">
-              <a:avLst/>
-            </a:prstGeom>
-            <a:ln w="12700">
-              <a:noFill/>
-            </a:ln>
-          </p:spPr>
-        </p:pic>
-        <p:cxnSp>
-          <p:nvCxnSpPr>
-            <p:cNvPr id="28" name="Straight Connector 27"/>
-            <p:cNvCxnSpPr/>
-            <p:nvPr/>
-          </p:nvCxnSpPr>
-          <p:spPr>
-            <a:xfrm>
-              <a:off x="8125856" y="1375394"/>
-              <a:ext cx="673915" cy="1"/>
-            </a:xfrm>
-            <a:prstGeom prst="line">
-              <a:avLst/>
-            </a:prstGeom>
-            <a:ln w="12700">
-              <a:solidFill>
-                <a:schemeClr val="tx1"/>
-              </a:solidFill>
-            </a:ln>
-          </p:spPr>
-          <p:style>
-            <a:lnRef idx="1">
-              <a:schemeClr val="accent1"/>
-            </a:lnRef>
-            <a:fillRef idx="0">
-              <a:schemeClr val="accent1"/>
-            </a:fillRef>
-            <a:effectRef idx="0">
-              <a:schemeClr val="accent1"/>
-            </a:effectRef>
-            <a:fontRef idx="minor">
-              <a:schemeClr val="tx1"/>
-            </a:fontRef>
-          </p:style>
-        </p:cxnSp>
-        <p:cxnSp>
-          <p:nvCxnSpPr>
-            <p:cNvPr id="29" name="Straight Connector 28"/>
-            <p:cNvCxnSpPr/>
-            <p:nvPr/>
-          </p:nvCxnSpPr>
-          <p:spPr>
-            <a:xfrm>
-              <a:off x="8462813" y="1143597"/>
-              <a:ext cx="0" cy="463595"/>
-            </a:xfrm>
-            <a:prstGeom prst="line">
-              <a:avLst/>
-            </a:prstGeom>
-            <a:ln w="19050">
-              <a:solidFill>
-                <a:schemeClr val="tx1"/>
-              </a:solidFill>
-            </a:ln>
-          </p:spPr>
-          <p:style>
-            <a:lnRef idx="1">
-              <a:schemeClr val="accent1"/>
-            </a:lnRef>
-            <a:fillRef idx="0">
-              <a:schemeClr val="accent1"/>
-            </a:fillRef>
-            <a:effectRef idx="0">
-              <a:schemeClr val="accent1"/>
-            </a:effectRef>
-            <a:fontRef idx="minor">
-              <a:schemeClr val="tx1"/>
-            </a:fontRef>
-          </p:style>
-        </p:cxnSp>
-        <p:cxnSp>
-          <p:nvCxnSpPr>
-            <p:cNvPr id="33" name="Straight Connector 32"/>
-            <p:cNvCxnSpPr/>
-            <p:nvPr/>
-          </p:nvCxnSpPr>
-          <p:spPr>
-            <a:xfrm rot="10800000" flipH="1">
-              <a:off x="8461176" y="1150047"/>
-              <a:ext cx="310196" cy="0"/>
-            </a:xfrm>
-            <a:prstGeom prst="line">
-              <a:avLst/>
-            </a:prstGeom>
-            <a:ln w="19050">
-              <a:solidFill>
-                <a:schemeClr val="tx1"/>
-              </a:solidFill>
-            </a:ln>
-          </p:spPr>
-          <p:style>
-            <a:lnRef idx="1">
-              <a:schemeClr val="accent1"/>
-            </a:lnRef>
-            <a:fillRef idx="0">
-              <a:schemeClr val="accent1"/>
-            </a:fillRef>
-            <a:effectRef idx="0">
-              <a:schemeClr val="accent1"/>
-            </a:effectRef>
-            <a:fontRef idx="minor">
-              <a:schemeClr val="tx1"/>
-            </a:fontRef>
-          </p:style>
-        </p:cxnSp>
-        <p:cxnSp>
-          <p:nvCxnSpPr>
-            <p:cNvPr id="34" name="Straight Connector 33"/>
-            <p:cNvCxnSpPr/>
-            <p:nvPr/>
-          </p:nvCxnSpPr>
-          <p:spPr>
-            <a:xfrm flipH="1">
-              <a:off x="8154254" y="1600742"/>
-              <a:ext cx="310196" cy="0"/>
-            </a:xfrm>
-            <a:prstGeom prst="line">
-              <a:avLst/>
-            </a:prstGeom>
-            <a:ln w="19050">
-              <a:solidFill>
-                <a:schemeClr val="tx1"/>
-              </a:solidFill>
-            </a:ln>
-          </p:spPr>
-          <p:style>
-            <a:lnRef idx="1">
-              <a:schemeClr val="accent1"/>
-            </a:lnRef>
-            <a:fillRef idx="0">
-              <a:schemeClr val="accent1"/>
-            </a:fillRef>
-            <a:effectRef idx="0">
-              <a:schemeClr val="accent1"/>
-            </a:effectRef>
-            <a:fontRef idx="minor">
-              <a:schemeClr val="tx1"/>
-            </a:fontRef>
-          </p:style>
-        </p:cxnSp>
-        <p:cxnSp>
-          <p:nvCxnSpPr>
-            <p:cNvPr id="31" name="Straight Connector 30"/>
-            <p:cNvCxnSpPr/>
-            <p:nvPr/>
-          </p:nvCxnSpPr>
-          <p:spPr>
-            <a:xfrm rot="10800000">
-              <a:off x="8462813" y="1143597"/>
-              <a:ext cx="0" cy="463595"/>
-            </a:xfrm>
-            <a:prstGeom prst="line">
-              <a:avLst/>
-            </a:prstGeom>
-            <a:ln w="19050">
-              <a:solidFill>
-                <a:schemeClr val="tx1"/>
-              </a:solidFill>
-            </a:ln>
-          </p:spPr>
-          <p:style>
-            <a:lnRef idx="1">
-              <a:schemeClr val="accent1"/>
-            </a:lnRef>
-            <a:fillRef idx="0">
-              <a:schemeClr val="accent1"/>
-            </a:fillRef>
-            <a:effectRef idx="0">
-              <a:schemeClr val="accent1"/>
-            </a:effectRef>
-            <a:fontRef idx="minor">
-              <a:schemeClr val="tx1"/>
-            </a:fontRef>
-          </p:style>
-        </p:cxnSp>
-        <p:cxnSp>
-          <p:nvCxnSpPr>
-            <p:cNvPr id="32" name="Straight Connector 31"/>
-            <p:cNvCxnSpPr/>
-            <p:nvPr/>
-          </p:nvCxnSpPr>
-          <p:spPr>
-            <a:xfrm rot="16200000">
-              <a:off x="8125856" y="1375394"/>
-              <a:ext cx="673915" cy="1"/>
-            </a:xfrm>
-            <a:prstGeom prst="line">
-              <a:avLst/>
-            </a:prstGeom>
-            <a:ln w="12700">
-              <a:solidFill>
-                <a:schemeClr val="tx1"/>
-              </a:solidFill>
-            </a:ln>
-          </p:spPr>
-          <p:style>
-            <a:lnRef idx="1">
-              <a:schemeClr val="accent1"/>
-            </a:lnRef>
-            <a:fillRef idx="0">
-              <a:schemeClr val="accent1"/>
-            </a:fillRef>
-            <a:effectRef idx="0">
-              <a:schemeClr val="accent1"/>
-            </a:effectRef>
-            <a:fontRef idx="minor">
-              <a:schemeClr val="tx1"/>
-            </a:fontRef>
-          </p:style>
-        </p:cxnSp>
-        <p:sp>
-          <p:nvSpPr>
-            <p:cNvPr id="27" name="Rectangle 26"/>
-            <p:cNvSpPr/>
-            <p:nvPr/>
-          </p:nvSpPr>
-          <p:spPr>
-            <a:xfrm>
-              <a:off x="6718820" y="1086310"/>
-              <a:ext cx="1143000" cy="285290"/>
-            </a:xfrm>
-            <a:prstGeom prst="rect">
-              <a:avLst/>
-            </a:prstGeom>
-            <a:noFill/>
-            <a:ln>
-              <a:noFill/>
-            </a:ln>
-          </p:spPr>
-          <p:style>
-            <a:lnRef idx="2">
-              <a:schemeClr val="accent1">
-                <a:shade val="50000"/>
-              </a:schemeClr>
-            </a:lnRef>
-            <a:fillRef idx="1">
-              <a:schemeClr val="accent1"/>
-            </a:fillRef>
-            <a:effectRef idx="0">
-              <a:schemeClr val="accent1"/>
-            </a:effectRef>
-            <a:fontRef idx="minor">
-              <a:schemeClr val="lt1"/>
-            </a:fontRef>
-          </p:style>
-          <p:txBody>
-            <a:bodyPr rtlCol="0" anchor="ctr"/>
-            <a:lstStyle/>
-            <a:p>
-              <a:pPr algn="ctr"/>
-              <a:endParaRPr lang="en-US" dirty="0">
-                <a:latin typeface="Times New Roman" panose="02020603050405020304" pitchFamily="18" charset="0"/>
-                <a:cs typeface="Times New Roman" panose="02020603050405020304" pitchFamily="18" charset="0"/>
-              </a:endParaRPr>
-            </a:p>
-          </p:txBody>
-        </p:sp>
+                </a:ln>
+              </p:spPr>
+              <p:style>
+                <a:lnRef idx="2">
+                  <a:schemeClr val="accent1">
+                    <a:shade val="50000"/>
+                  </a:schemeClr>
+                </a:lnRef>
+                <a:fillRef idx="1">
+                  <a:schemeClr val="accent1"/>
+                </a:fillRef>
+                <a:effectRef idx="0">
+                  <a:schemeClr val="accent1"/>
+                </a:effectRef>
+                <a:fontRef idx="minor">
+                  <a:schemeClr val="lt1"/>
+                </a:fontRef>
+              </p:style>
+              <p:txBody>
+                <a:bodyPr rtlCol="0" anchor="ctr"/>
+                <a:lstStyle/>
+                <a:p>
+                  <a:pPr algn="ctr"/>
+                  <a:endParaRPr lang="en-US" dirty="0">
+                    <a:latin typeface="Times New Roman" panose="02020603050405020304" pitchFamily="18" charset="0"/>
+                    <a:cs typeface="Times New Roman" panose="02020603050405020304" pitchFamily="18" charset="0"/>
+                  </a:endParaRPr>
+                </a:p>
+              </p:txBody>
+            </p:sp>
+            <p:cxnSp>
+              <p:nvCxnSpPr>
+                <p:cNvPr id="10" name="Straight Arrow Connector 9"/>
+                <p:cNvCxnSpPr/>
+                <p:nvPr/>
+              </p:nvCxnSpPr>
+              <p:spPr>
+                <a:xfrm>
+                  <a:off x="3783880" y="1375394"/>
+                  <a:ext cx="4107433" cy="0"/>
+                </a:xfrm>
+                <a:prstGeom prst="straightConnector1">
+                  <a:avLst/>
+                </a:prstGeom>
+                <a:ln w="12700" cmpd="sng">
+                  <a:solidFill>
+                    <a:schemeClr val="tx1"/>
+                  </a:solidFill>
+                  <a:tailEnd type="triangle"/>
+                </a:ln>
+                <a:effectLst/>
+              </p:spPr>
+              <p:style>
+                <a:lnRef idx="2">
+                  <a:schemeClr val="accent1"/>
+                </a:lnRef>
+                <a:fillRef idx="0">
+                  <a:schemeClr val="accent1"/>
+                </a:fillRef>
+                <a:effectRef idx="1">
+                  <a:schemeClr val="accent1"/>
+                </a:effectRef>
+                <a:fontRef idx="minor">
+                  <a:schemeClr val="tx1"/>
+                </a:fontRef>
+              </p:style>
+            </p:cxnSp>
+            <p:cxnSp>
+              <p:nvCxnSpPr>
+                <p:cNvPr id="12" name="Straight Arrow Connector 11"/>
+                <p:cNvCxnSpPr/>
+                <p:nvPr/>
+              </p:nvCxnSpPr>
+              <p:spPr>
+                <a:xfrm>
+                  <a:off x="2566157" y="1375394"/>
+                  <a:ext cx="684323" cy="0"/>
+                </a:xfrm>
+                <a:prstGeom prst="straightConnector1">
+                  <a:avLst/>
+                </a:prstGeom>
+                <a:ln w="12700">
+                  <a:solidFill>
+                    <a:schemeClr val="tx1"/>
+                  </a:solidFill>
+                  <a:tailEnd type="triangle"/>
+                </a:ln>
+              </p:spPr>
+              <p:style>
+                <a:lnRef idx="1">
+                  <a:schemeClr val="accent1"/>
+                </a:lnRef>
+                <a:fillRef idx="0">
+                  <a:schemeClr val="accent1"/>
+                </a:fillRef>
+                <a:effectRef idx="0">
+                  <a:schemeClr val="accent1"/>
+                </a:effectRef>
+                <a:fontRef idx="minor">
+                  <a:schemeClr val="tx1"/>
+                </a:fontRef>
+              </p:style>
+            </p:cxnSp>
+            <p:cxnSp>
+              <p:nvCxnSpPr>
+                <p:cNvPr id="22" name="Straight Arrow Connector 21"/>
+                <p:cNvCxnSpPr/>
+                <p:nvPr/>
+              </p:nvCxnSpPr>
+              <p:spPr>
+                <a:xfrm>
+                  <a:off x="9034313" y="1375394"/>
+                  <a:ext cx="684323" cy="0"/>
+                </a:xfrm>
+                <a:prstGeom prst="straightConnector1">
+                  <a:avLst/>
+                </a:prstGeom>
+                <a:ln w="12700">
+                  <a:solidFill>
+                    <a:schemeClr val="tx1"/>
+                  </a:solidFill>
+                  <a:tailEnd type="triangle"/>
+                </a:ln>
+              </p:spPr>
+              <p:style>
+                <a:lnRef idx="1">
+                  <a:schemeClr val="accent1"/>
+                </a:lnRef>
+                <a:fillRef idx="0">
+                  <a:schemeClr val="accent1"/>
+                </a:fillRef>
+                <a:effectRef idx="0">
+                  <a:schemeClr val="accent1"/>
+                </a:effectRef>
+                <a:fontRef idx="minor">
+                  <a:schemeClr val="tx1"/>
+                </a:fontRef>
+              </p:style>
+            </p:cxnSp>
+            <p:pic>
+              <p:nvPicPr>
+                <p:cNvPr id="23" name="Picture 22"/>
+                <p:cNvPicPr>
+                  <a:picLocks noChangeAspect="1"/>
+                </p:cNvPicPr>
+                <p:nvPr>
+                  <p:custDataLst>
+                    <p:tags r:id="rId6"/>
+                  </p:custDataLst>
+                </p:nvPr>
+              </p:nvPicPr>
+              <p:blipFill>
+                <a:blip r:embed="rId15" cstate="print">
+                  <a:extLst>
+                    <a:ext uri="{28A0092B-C50C-407E-A947-70E740481C1C}">
+                      <a14:useLocalDpi xmlns:a14="http://schemas.microsoft.com/office/drawing/2010/main" val="0"/>
+                    </a:ext>
+                  </a:extLst>
+                </a:blip>
+                <a:stretch>
+                  <a:fillRect/>
+                </a:stretch>
+              </p:blipFill>
+              <p:spPr>
+                <a:xfrm>
+                  <a:off x="9801147" y="1249680"/>
+                  <a:ext cx="435809" cy="251429"/>
+                </a:xfrm>
+                <a:prstGeom prst="rect">
+                  <a:avLst/>
+                </a:prstGeom>
+              </p:spPr>
+            </p:pic>
+            <p:pic>
+              <p:nvPicPr>
+                <p:cNvPr id="24" name="Picture 23"/>
+                <p:cNvPicPr>
+                  <a:picLocks noChangeAspect="1"/>
+                </p:cNvPicPr>
+                <p:nvPr>
+                  <p:custDataLst>
+                    <p:tags r:id="rId7"/>
+                  </p:custDataLst>
+                </p:nvPr>
+              </p:nvPicPr>
+              <p:blipFill>
+                <a:blip r:embed="rId16" cstate="print">
+                  <a:extLst>
+                    <a:ext uri="{28A0092B-C50C-407E-A947-70E740481C1C}">
+                      <a14:useLocalDpi xmlns:a14="http://schemas.microsoft.com/office/drawing/2010/main" val="0"/>
+                    </a:ext>
+                  </a:extLst>
+                </a:blip>
+                <a:stretch>
+                  <a:fillRect/>
+                </a:stretch>
+              </p:blipFill>
+              <p:spPr>
+                <a:xfrm>
+                  <a:off x="1905000" y="1249680"/>
+                  <a:ext cx="557714" cy="251429"/>
+                </a:xfrm>
+                <a:prstGeom prst="rect">
+                  <a:avLst/>
+                </a:prstGeom>
+                <a:ln w="12700">
+                  <a:noFill/>
+                </a:ln>
+              </p:spPr>
+            </p:pic>
+            <p:pic>
+              <p:nvPicPr>
+                <p:cNvPr id="25" name="Picture 24"/>
+                <p:cNvPicPr>
+                  <a:picLocks noChangeAspect="1"/>
+                </p:cNvPicPr>
+                <p:nvPr>
+                  <p:custDataLst>
+                    <p:tags r:id="rId8"/>
+                  </p:custDataLst>
+                </p:nvPr>
+              </p:nvPicPr>
+              <p:blipFill>
+                <a:blip r:embed="rId17" cstate="print">
+                  <a:extLst>
+                    <a:ext uri="{28A0092B-C50C-407E-A947-70E740481C1C}">
+                      <a14:useLocalDpi xmlns:a14="http://schemas.microsoft.com/office/drawing/2010/main" val="0"/>
+                    </a:ext>
+                  </a:extLst>
+                </a:blip>
+                <a:stretch>
+                  <a:fillRect/>
+                </a:stretch>
+              </p:blipFill>
+              <p:spPr>
+                <a:xfrm>
+                  <a:off x="4020188" y="1066800"/>
+                  <a:ext cx="524190" cy="251429"/>
+                </a:xfrm>
+                <a:prstGeom prst="rect">
+                  <a:avLst/>
+                </a:prstGeom>
+                <a:ln w="12700">
+                  <a:noFill/>
+                </a:ln>
+              </p:spPr>
+            </p:pic>
+            <p:cxnSp>
+              <p:nvCxnSpPr>
+                <p:cNvPr id="28" name="Straight Connector 27"/>
+                <p:cNvCxnSpPr/>
+                <p:nvPr/>
+              </p:nvCxnSpPr>
+              <p:spPr>
+                <a:xfrm>
+                  <a:off x="8125856" y="1375394"/>
+                  <a:ext cx="673915" cy="1"/>
+                </a:xfrm>
+                <a:prstGeom prst="line">
+                  <a:avLst/>
+                </a:prstGeom>
+                <a:ln w="12700">
+                  <a:solidFill>
+                    <a:schemeClr val="tx1"/>
+                  </a:solidFill>
+                </a:ln>
+              </p:spPr>
+              <p:style>
+                <a:lnRef idx="1">
+                  <a:schemeClr val="accent1"/>
+                </a:lnRef>
+                <a:fillRef idx="0">
+                  <a:schemeClr val="accent1"/>
+                </a:fillRef>
+                <a:effectRef idx="0">
+                  <a:schemeClr val="accent1"/>
+                </a:effectRef>
+                <a:fontRef idx="minor">
+                  <a:schemeClr val="tx1"/>
+                </a:fontRef>
+              </p:style>
+            </p:cxnSp>
+            <p:cxnSp>
+              <p:nvCxnSpPr>
+                <p:cNvPr id="29" name="Straight Connector 28"/>
+                <p:cNvCxnSpPr/>
+                <p:nvPr/>
+              </p:nvCxnSpPr>
+              <p:spPr>
+                <a:xfrm>
+                  <a:off x="8462813" y="1143597"/>
+                  <a:ext cx="0" cy="463595"/>
+                </a:xfrm>
+                <a:prstGeom prst="line">
+                  <a:avLst/>
+                </a:prstGeom>
+                <a:ln w="19050">
+                  <a:solidFill>
+                    <a:schemeClr val="tx1"/>
+                  </a:solidFill>
+                </a:ln>
+              </p:spPr>
+              <p:style>
+                <a:lnRef idx="1">
+                  <a:schemeClr val="accent1"/>
+                </a:lnRef>
+                <a:fillRef idx="0">
+                  <a:schemeClr val="accent1"/>
+                </a:fillRef>
+                <a:effectRef idx="0">
+                  <a:schemeClr val="accent1"/>
+                </a:effectRef>
+                <a:fontRef idx="minor">
+                  <a:schemeClr val="tx1"/>
+                </a:fontRef>
+              </p:style>
+            </p:cxnSp>
+            <p:cxnSp>
+              <p:nvCxnSpPr>
+                <p:cNvPr id="33" name="Straight Connector 32"/>
+                <p:cNvCxnSpPr/>
+                <p:nvPr/>
+              </p:nvCxnSpPr>
+              <p:spPr>
+                <a:xfrm rot="10800000" flipH="1">
+                  <a:off x="8461176" y="1150047"/>
+                  <a:ext cx="310196" cy="0"/>
+                </a:xfrm>
+                <a:prstGeom prst="line">
+                  <a:avLst/>
+                </a:prstGeom>
+                <a:ln w="19050">
+                  <a:solidFill>
+                    <a:schemeClr val="tx1"/>
+                  </a:solidFill>
+                </a:ln>
+              </p:spPr>
+              <p:style>
+                <a:lnRef idx="1">
+                  <a:schemeClr val="accent1"/>
+                </a:lnRef>
+                <a:fillRef idx="0">
+                  <a:schemeClr val="accent1"/>
+                </a:fillRef>
+                <a:effectRef idx="0">
+                  <a:schemeClr val="accent1"/>
+                </a:effectRef>
+                <a:fontRef idx="minor">
+                  <a:schemeClr val="tx1"/>
+                </a:fontRef>
+              </p:style>
+            </p:cxnSp>
+            <p:cxnSp>
+              <p:nvCxnSpPr>
+                <p:cNvPr id="34" name="Straight Connector 33"/>
+                <p:cNvCxnSpPr/>
+                <p:nvPr/>
+              </p:nvCxnSpPr>
+              <p:spPr>
+                <a:xfrm flipH="1">
+                  <a:off x="8154254" y="1600742"/>
+                  <a:ext cx="310196" cy="0"/>
+                </a:xfrm>
+                <a:prstGeom prst="line">
+                  <a:avLst/>
+                </a:prstGeom>
+                <a:ln w="19050">
+                  <a:solidFill>
+                    <a:schemeClr val="tx1"/>
+                  </a:solidFill>
+                </a:ln>
+              </p:spPr>
+              <p:style>
+                <a:lnRef idx="1">
+                  <a:schemeClr val="accent1"/>
+                </a:lnRef>
+                <a:fillRef idx="0">
+                  <a:schemeClr val="accent1"/>
+                </a:fillRef>
+                <a:effectRef idx="0">
+                  <a:schemeClr val="accent1"/>
+                </a:effectRef>
+                <a:fontRef idx="minor">
+                  <a:schemeClr val="tx1"/>
+                </a:fontRef>
+              </p:style>
+            </p:cxnSp>
+            <p:cxnSp>
+              <p:nvCxnSpPr>
+                <p:cNvPr id="31" name="Straight Connector 30"/>
+                <p:cNvCxnSpPr/>
+                <p:nvPr/>
+              </p:nvCxnSpPr>
+              <p:spPr>
+                <a:xfrm rot="10800000">
+                  <a:off x="8462813" y="1143597"/>
+                  <a:ext cx="0" cy="463595"/>
+                </a:xfrm>
+                <a:prstGeom prst="line">
+                  <a:avLst/>
+                </a:prstGeom>
+                <a:ln w="19050">
+                  <a:solidFill>
+                    <a:schemeClr val="tx1"/>
+                  </a:solidFill>
+                </a:ln>
+              </p:spPr>
+              <p:style>
+                <a:lnRef idx="1">
+                  <a:schemeClr val="accent1"/>
+                </a:lnRef>
+                <a:fillRef idx="0">
+                  <a:schemeClr val="accent1"/>
+                </a:fillRef>
+                <a:effectRef idx="0">
+                  <a:schemeClr val="accent1"/>
+                </a:effectRef>
+                <a:fontRef idx="minor">
+                  <a:schemeClr val="tx1"/>
+                </a:fontRef>
+              </p:style>
+            </p:cxnSp>
+            <p:cxnSp>
+              <p:nvCxnSpPr>
+                <p:cNvPr id="32" name="Straight Connector 31"/>
+                <p:cNvCxnSpPr/>
+                <p:nvPr/>
+              </p:nvCxnSpPr>
+              <p:spPr>
+                <a:xfrm rot="16200000">
+                  <a:off x="8125856" y="1375394"/>
+                  <a:ext cx="673915" cy="1"/>
+                </a:xfrm>
+                <a:prstGeom prst="line">
+                  <a:avLst/>
+                </a:prstGeom>
+                <a:ln w="12700">
+                  <a:solidFill>
+                    <a:schemeClr val="tx1"/>
+                  </a:solidFill>
+                </a:ln>
+              </p:spPr>
+              <p:style>
+                <a:lnRef idx="1">
+                  <a:schemeClr val="accent1"/>
+                </a:lnRef>
+                <a:fillRef idx="0">
+                  <a:schemeClr val="accent1"/>
+                </a:fillRef>
+                <a:effectRef idx="0">
+                  <a:schemeClr val="accent1"/>
+                </a:effectRef>
+                <a:fontRef idx="minor">
+                  <a:schemeClr val="tx1"/>
+                </a:fontRef>
+              </p:style>
+            </p:cxnSp>
+            <p:sp>
+              <p:nvSpPr>
+                <p:cNvPr id="27" name="Rectangle 26"/>
+                <p:cNvSpPr/>
+                <p:nvPr/>
+              </p:nvSpPr>
+              <p:spPr>
+                <a:xfrm>
+                  <a:off x="6718820" y="1086310"/>
+                  <a:ext cx="1143000" cy="285290"/>
+                </a:xfrm>
+                <a:prstGeom prst="rect">
+                  <a:avLst/>
+                </a:prstGeom>
+                <a:noFill/>
+                <a:ln>
+                  <a:noFill/>
+                </a:ln>
+              </p:spPr>
+              <p:style>
+                <a:lnRef idx="2">
+                  <a:schemeClr val="accent1">
+                    <a:shade val="50000"/>
+                  </a:schemeClr>
+                </a:lnRef>
+                <a:fillRef idx="1">
+                  <a:schemeClr val="accent1"/>
+                </a:fillRef>
+                <a:effectRef idx="0">
+                  <a:schemeClr val="accent1"/>
+                </a:effectRef>
+                <a:fontRef idx="minor">
+                  <a:schemeClr val="lt1"/>
+                </a:fontRef>
+              </p:style>
+              <p:txBody>
+                <a:bodyPr rtlCol="0" anchor="ctr"/>
+                <a:lstStyle/>
+                <a:p>
+                  <a:pPr algn="ctr"/>
+                  <a:endParaRPr lang="en-US" dirty="0">
+                    <a:latin typeface="Times New Roman" panose="02020603050405020304" pitchFamily="18" charset="0"/>
+                    <a:cs typeface="Times New Roman" panose="02020603050405020304" pitchFamily="18" charset="0"/>
+                  </a:endParaRPr>
+                </a:p>
+              </p:txBody>
+            </p:sp>
+          </p:grpSp>
+        </p:grpSp>
       </p:grpSp>
     </p:spTree>
     <p:extLst>
@@ -11177,12 +11192,12 @@
 
 <file path=ppt/tags/tag16.xml><?xml version="1.0" encoding="utf-8"?>
 <p:tagLst xmlns:a="http://schemas.openxmlformats.org/drawingml/2006/main" xmlns:r="http://schemas.openxmlformats.org/officeDocument/2006/relationships" xmlns:p="http://schemas.openxmlformats.org/presentationml/2006/main">
-  <p:tag name="ORIGINALHEIGHT" val="123.7346"/>
-  <p:tag name="ORIGINALWIDTH" val="214.4731"/>
+  <p:tag name="ORIGINALHEIGHT" val="373.4533"/>
+  <p:tag name="ORIGINALWIDTH" val="3080.615"/>
   <p:tag name="OUTPUTDPI" val="1200"/>
-  <p:tag name="LATEXADDIN" val="\documentclass{article}&#10;\usepackage{amsmath}&#10;\pagestyle{empty}&#10;\begin{document}&#10;&#10;$\hat{a}(k)$&#10;&#10;&#10;\end{document}&#10;"/>
+  <p:tag name="LATEXADDIN" val="\documentclass{article}&#10;\usepackage{amsmath}&#10;\usepackage{amssymb}&#10;\pagestyle{empty}&#10;\begin{document}&#10;&#10;\begin{equation*}&#10;e(k)&#10;= &#10;\begin{cases}&#10;0 &amp;\text{$k$ even} \\&#10;\hat{a}(k-1)\text{Im}\{r_\text{r}(k-1)\} -  \hat{a}(k)\text{Re}\{r_\text{r}(k)\}  &amp;\text{$k$ odd}\\&#10;\end{cases}&#10;\end{equation*}&#10;&#10;&#10;&#10;\end{document}"/>
   <p:tag name="IGUANATEXSIZE" val="20"/>
-  <p:tag name="IGUANATEXCURSOR" val="111"/>
+  <p:tag name="IGUANATEXCURSOR" val="184"/>
   <p:tag name="TRANSPARENCY" val="True"/>
   <p:tag name="FILENAME" val=""/>
   <p:tag name="INPUTTYPE" val="0"/>
@@ -11193,12 +11208,12 @@
 
 <file path=ppt/tags/tag17.xml><?xml version="1.0" encoding="utf-8"?>
 <p:tagLst xmlns:a="http://schemas.openxmlformats.org/drawingml/2006/main" xmlns:r="http://schemas.openxmlformats.org/officeDocument/2006/relationships" xmlns:p="http://schemas.openxmlformats.org/presentationml/2006/main">
-  <p:tag name="ORIGINALHEIGHT" val="123.7346"/>
-  <p:tag name="ORIGINALWIDTH" val="274.4657"/>
+  <p:tag name="ORIGINALHEIGHT" val="523.4346"/>
+  <p:tag name="ORIGINALWIDTH" val="2932.134"/>
   <p:tag name="OUTPUTDPI" val="1200"/>
-  <p:tag name="LATEXADDIN" val="\documentclass{article}&#10;\usepackage{amsmath}&#10;\pagestyle{empty}&#10;\begin{document}&#10;&#10;$r_\text{d}(n)$&#10;&#10;&#10;\end{document}"/>
+  <p:tag name="LATEXADDIN" val="\documentclass{article}&#10;\usepackage{amsmath}&#10;\usepackage{amssymb}&#10;\pagestyle{empty}&#10;\begin{document}&#10;&#10;\begin{equation*}&#10;\hat{a}(k)= \begin{cases}&#10;p(k) &amp;k&lt;L_p+L_\text{asm} \\&#10;\text{sgn}(\text{Re}\{r_\text{r}(k)\})&amp;k\geq L_p+L_\text{asm} \quad \&amp; \quad \text{$k$ even}\\&#10;\text{sgn}(\text{Im}\{r_\text{r}(k)\})&amp;k\geq L_p+L_\text{asm} \quad \&amp; \quad \text{$k$ odd}\\&#10;\end{cases}&#10;\end{equation*}&#10;&#10;&#10;&#10;\end{document}"/>
   <p:tag name="IGUANATEXSIZE" val="20"/>
-  <p:tag name="IGUANATEXCURSOR" val="92"/>
+  <p:tag name="IGUANATEXCURSOR" val="288"/>
   <p:tag name="TRANSPARENCY" val="True"/>
   <p:tag name="FILENAME" val=""/>
   <p:tag name="INPUTTYPE" val="0"/>
@@ -11209,12 +11224,12 @@
 
 <file path=ppt/tags/tag18.xml><?xml version="1.0" encoding="utf-8"?>
 <p:tagLst xmlns:a="http://schemas.openxmlformats.org/drawingml/2006/main" xmlns:r="http://schemas.openxmlformats.org/officeDocument/2006/relationships" xmlns:p="http://schemas.openxmlformats.org/presentationml/2006/main">
-  <p:tag name="ORIGINALHEIGHT" val="123.7346"/>
-  <p:tag name="ORIGINALWIDTH" val="257.9677"/>
+  <p:tag name="ORIGINALHEIGHT" val="103.4871"/>
+  <p:tag name="ORIGINALWIDTH" val="142.4822"/>
   <p:tag name="OUTPUTDPI" val="1200"/>
-  <p:tag name="LATEXADDIN" val="\documentclass{article}&#10;\usepackage{amsmath}&#10;\pagestyle{empty}&#10;\begin{document}&#10;&#10;$r_\text{r}(n)$&#10;&#10;&#10;\end{document}"/>
-  <p:tag name="IGUANATEXSIZE" val="20"/>
-  <p:tag name="IGUANATEXCURSOR" val="91"/>
+  <p:tag name="LATEXADDIN" val="\documentclass{article}&#10;\usepackage{amsmath}&#10;\pagestyle{empty}&#10;\begin{document}&#10;\begin{equation*}&#10;K_1&#10;\end{equation*}&#10;&#10;&#10;&#10;\end{document}"/>
+  <p:tag name="IGUANATEXSIZE" val="14"/>
+  <p:tag name="IGUANATEXCURSOR" val="101"/>
   <p:tag name="TRANSPARENCY" val="True"/>
   <p:tag name="FILENAME" val=""/>
   <p:tag name="INPUTTYPE" val="0"/>
@@ -11225,12 +11240,12 @@
 
 <file path=ppt/tags/tag19.xml><?xml version="1.0" encoding="utf-8"?>
 <p:tagLst xmlns:a="http://schemas.openxmlformats.org/drawingml/2006/main" xmlns:r="http://schemas.openxmlformats.org/officeDocument/2006/relationships" xmlns:p="http://schemas.openxmlformats.org/presentationml/2006/main">
-  <p:tag name="ORIGINALHEIGHT" val="523.4346"/>
-  <p:tag name="ORIGINALWIDTH" val="2932.134"/>
+  <p:tag name="ORIGINALHEIGHT" val="123.7346"/>
+  <p:tag name="ORIGINALWIDTH" val="206.2243"/>
   <p:tag name="OUTPUTDPI" val="1200"/>
-  <p:tag name="LATEXADDIN" val="\documentclass{article}&#10;\usepackage{amsmath}&#10;\usepackage{amssymb}&#10;\pagestyle{empty}&#10;\begin{document}&#10;&#10;\begin{equation*}&#10;\hat{a}(k)= \begin{cases}&#10;p(k) &amp;k&lt;L_p+L_\text{asm} \\&#10;\text{sgn}(\text{Re}\{r_\text{r}(k)\})&amp;k\geq L_p+L_\text{asm} \quad \&amp; \quad \text{$k$ even}\\&#10;\text{sgn}(\text{Im}\{r_\text{r}(k)\})&amp;k\geq L_p+L_\text{asm} \quad \&amp; \quad \text{$k$ odd}\\&#10;\end{cases}&#10;\end{equation*}&#10;&#10;&#10;&#10;\end{document}"/>
+  <p:tag name="LATEXADDIN" val="\documentclass{article}&#10;\usepackage{amsmath}&#10;\pagestyle{empty}&#10;\begin{document}&#10;&#10;$e(k)$&#10;&#10;&#10;\end{document}"/>
   <p:tag name="IGUANATEXSIZE" val="20"/>
-  <p:tag name="IGUANATEXCURSOR" val="288"/>
+  <p:tag name="IGUANATEXCURSOR" val="83"/>
   <p:tag name="TRANSPARENCY" val="True"/>
   <p:tag name="FILENAME" val=""/>
   <p:tag name="INPUTTYPE" val="0"/>
@@ -11257,12 +11272,12 @@
 
 <file path=ppt/tags/tag20.xml><?xml version="1.0" encoding="utf-8"?>
 <p:tagLst xmlns:a="http://schemas.openxmlformats.org/drawingml/2006/main" xmlns:r="http://schemas.openxmlformats.org/officeDocument/2006/relationships" xmlns:p="http://schemas.openxmlformats.org/presentationml/2006/main">
-  <p:tag name="ORIGINALHEIGHT" val="373.4533"/>
-  <p:tag name="ORIGINALWIDTH" val="3080.615"/>
+  <p:tag name="ORIGINALHEIGHT" val="130.4837"/>
+  <p:tag name="ORIGINALWIDTH" val="305.9617"/>
   <p:tag name="OUTPUTDPI" val="1200"/>
-  <p:tag name="LATEXADDIN" val="\documentclass{article}&#10;\usepackage{amsmath}&#10;\usepackage{amssymb}&#10;\pagestyle{empty}&#10;\begin{document}&#10;&#10;\begin{equation*}&#10;e(k)&#10;= &#10;\begin{cases}&#10;0 &amp;\text{$k$ even} \\&#10;\hat{a}(k-1)\text{Im}\{r_\text{r}(k-1)\} -  \hat{a}(k)\text{Re}\{r_\text{r}(k)\}  &amp;\text{$k$ odd}\\&#10;\end{cases}&#10;\end{equation*}&#10;&#10;&#10;&#10;\end{document}"/>
+  <p:tag name="LATEXADDIN" val="\documentclass{article}&#10;\usepackage{amsmath}&#10;\pagestyle{empty}&#10;\begin{document}&#10;&#10;$e^{\text{-}j\hat{\theta}(k)}$&#10;&#10;&#10;\end{document}"/>
   <p:tag name="IGUANATEXSIZE" val="20"/>
-  <p:tag name="IGUANATEXCURSOR" val="184"/>
+  <p:tag name="IGUANATEXCURSOR" val="110"/>
   <p:tag name="TRANSPARENCY" val="True"/>
   <p:tag name="FILENAME" val=""/>
   <p:tag name="INPUTTYPE" val="0"/>
@@ -11273,12 +11288,12 @@
 
 <file path=ppt/tags/tag21.xml><?xml version="1.0" encoding="utf-8"?>
 <p:tagLst xmlns:a="http://schemas.openxmlformats.org/drawingml/2006/main" xmlns:r="http://schemas.openxmlformats.org/officeDocument/2006/relationships" xmlns:p="http://schemas.openxmlformats.org/presentationml/2006/main">
-  <p:tag name="ORIGINALHEIGHT" val="103.4871"/>
-  <p:tag name="ORIGINALWIDTH" val="142.4822"/>
+  <p:tag name="ORIGINALHEIGHT" val="123.7346"/>
+  <p:tag name="ORIGINALWIDTH" val="214.4731"/>
   <p:tag name="OUTPUTDPI" val="1200"/>
-  <p:tag name="LATEXADDIN" val="\documentclass{article}&#10;\usepackage{amsmath}&#10;\pagestyle{empty}&#10;\begin{document}&#10;\begin{equation*}&#10;K_1&#10;\end{equation*}&#10;&#10;&#10;&#10;\end{document}"/>
-  <p:tag name="IGUANATEXSIZE" val="14"/>
-  <p:tag name="IGUANATEXCURSOR" val="101"/>
+  <p:tag name="LATEXADDIN" val="\documentclass{article}&#10;\usepackage{amsmath}&#10;\pagestyle{empty}&#10;\begin{document}&#10;&#10;$\hat{a}(k)$&#10;&#10;&#10;\end{document}&#10;"/>
+  <p:tag name="IGUANATEXSIZE" val="20"/>
+  <p:tag name="IGUANATEXCURSOR" val="111"/>
   <p:tag name="TRANSPARENCY" val="True"/>
   <p:tag name="FILENAME" val=""/>
   <p:tag name="INPUTTYPE" val="0"/>
@@ -11290,11 +11305,11 @@
 <file path=ppt/tags/tag22.xml><?xml version="1.0" encoding="utf-8"?>
 <p:tagLst xmlns:a="http://schemas.openxmlformats.org/drawingml/2006/main" xmlns:r="http://schemas.openxmlformats.org/officeDocument/2006/relationships" xmlns:p="http://schemas.openxmlformats.org/presentationml/2006/main">
   <p:tag name="ORIGINALHEIGHT" val="123.7346"/>
-  <p:tag name="ORIGINALWIDTH" val="206.2243"/>
+  <p:tag name="ORIGINALWIDTH" val="274.4657"/>
   <p:tag name="OUTPUTDPI" val="1200"/>
-  <p:tag name="LATEXADDIN" val="\documentclass{article}&#10;\usepackage{amsmath}&#10;\pagestyle{empty}&#10;\begin{document}&#10;&#10;$e(k)$&#10;&#10;&#10;\end{document}"/>
+  <p:tag name="LATEXADDIN" val="\documentclass{article}&#10;\usepackage{amsmath}&#10;\pagestyle{empty}&#10;\begin{document}&#10;&#10;$r_\text{d}(n)$&#10;&#10;&#10;\end{document}"/>
   <p:tag name="IGUANATEXSIZE" val="20"/>
-  <p:tag name="IGUANATEXCURSOR" val="83"/>
+  <p:tag name="IGUANATEXCURSOR" val="92"/>
   <p:tag name="TRANSPARENCY" val="True"/>
   <p:tag name="FILENAME" val=""/>
   <p:tag name="INPUTTYPE" val="0"/>
@@ -11305,12 +11320,12 @@
 
 <file path=ppt/tags/tag23.xml><?xml version="1.0" encoding="utf-8"?>
 <p:tagLst xmlns:a="http://schemas.openxmlformats.org/drawingml/2006/main" xmlns:r="http://schemas.openxmlformats.org/officeDocument/2006/relationships" xmlns:p="http://schemas.openxmlformats.org/presentationml/2006/main">
-  <p:tag name="ORIGINALHEIGHT" val="130.4837"/>
-  <p:tag name="ORIGINALWIDTH" val="305.9617"/>
+  <p:tag name="ORIGINALHEIGHT" val="123.7346"/>
+  <p:tag name="ORIGINALWIDTH" val="257.9677"/>
   <p:tag name="OUTPUTDPI" val="1200"/>
-  <p:tag name="LATEXADDIN" val="\documentclass{article}&#10;\usepackage{amsmath}&#10;\pagestyle{empty}&#10;\begin{document}&#10;&#10;$e^{\text{-}j\hat{\theta}(k)}$&#10;&#10;&#10;\end{document}"/>
+  <p:tag name="LATEXADDIN" val="\documentclass{article}&#10;\usepackage{amsmath}&#10;\pagestyle{empty}&#10;\begin{document}&#10;&#10;$r_\text{r}(n)$&#10;&#10;&#10;\end{document}"/>
   <p:tag name="IGUANATEXSIZE" val="20"/>
-  <p:tag name="IGUANATEXCURSOR" val="110"/>
+  <p:tag name="IGUANATEXCURSOR" val="91"/>
   <p:tag name="TRANSPARENCY" val="True"/>
   <p:tag name="FILENAME" val=""/>
   <p:tag name="INPUTTYPE" val="0"/>

</xml_diff>

<commit_message>
Turned in 2nd draft to RICEgit add -A!
</commit_message>
<xml_diff>
--- a/figures/eq_equations/eq_equalizers.pptx
+++ b/figures/eq_equations/eq_equalizers.pptx
@@ -8,6 +8,7 @@
     <p:sldId id="256" r:id="rId2"/>
     <p:sldId id="257" r:id="rId3"/>
     <p:sldId id="258" r:id="rId4"/>
+    <p:sldId id="259" r:id="rId5"/>
   </p:sldIdLst>
   <p:sldSz cx="12192000" cy="6858000"/>
   <p:notesSz cx="6858000" cy="9144000"/>
@@ -256,7 +257,7 @@
           <a:p>
             <a:fld id="{EB58624E-6335-4896-8152-6B70D42582B1}" type="datetimeFigureOut">
               <a:rPr lang="en-US" smtClean="0"/>
-              <a:t>4/4/2017</a:t>
+              <a:t>4/11/2017</a:t>
             </a:fld>
             <a:endParaRPr lang="en-US"/>
           </a:p>
@@ -426,7 +427,7 @@
           <a:p>
             <a:fld id="{EB58624E-6335-4896-8152-6B70D42582B1}" type="datetimeFigureOut">
               <a:rPr lang="en-US" smtClean="0"/>
-              <a:t>4/4/2017</a:t>
+              <a:t>4/11/2017</a:t>
             </a:fld>
             <a:endParaRPr lang="en-US"/>
           </a:p>
@@ -606,7 +607,7 @@
           <a:p>
             <a:fld id="{EB58624E-6335-4896-8152-6B70D42582B1}" type="datetimeFigureOut">
               <a:rPr lang="en-US" smtClean="0"/>
-              <a:t>4/4/2017</a:t>
+              <a:t>4/11/2017</a:t>
             </a:fld>
             <a:endParaRPr lang="en-US"/>
           </a:p>
@@ -776,7 +777,7 @@
           <a:p>
             <a:fld id="{EB58624E-6335-4896-8152-6B70D42582B1}" type="datetimeFigureOut">
               <a:rPr lang="en-US" smtClean="0"/>
-              <a:t>4/4/2017</a:t>
+              <a:t>4/11/2017</a:t>
             </a:fld>
             <a:endParaRPr lang="en-US"/>
           </a:p>
@@ -1022,7 +1023,7 @@
           <a:p>
             <a:fld id="{EB58624E-6335-4896-8152-6B70D42582B1}" type="datetimeFigureOut">
               <a:rPr lang="en-US" smtClean="0"/>
-              <a:t>4/4/2017</a:t>
+              <a:t>4/11/2017</a:t>
             </a:fld>
             <a:endParaRPr lang="en-US"/>
           </a:p>
@@ -1254,7 +1255,7 @@
           <a:p>
             <a:fld id="{EB58624E-6335-4896-8152-6B70D42582B1}" type="datetimeFigureOut">
               <a:rPr lang="en-US" smtClean="0"/>
-              <a:t>4/4/2017</a:t>
+              <a:t>4/11/2017</a:t>
             </a:fld>
             <a:endParaRPr lang="en-US"/>
           </a:p>
@@ -1621,7 +1622,7 @@
           <a:p>
             <a:fld id="{EB58624E-6335-4896-8152-6B70D42582B1}" type="datetimeFigureOut">
               <a:rPr lang="en-US" smtClean="0"/>
-              <a:t>4/4/2017</a:t>
+              <a:t>4/11/2017</a:t>
             </a:fld>
             <a:endParaRPr lang="en-US"/>
           </a:p>
@@ -1739,7 +1740,7 @@
           <a:p>
             <a:fld id="{EB58624E-6335-4896-8152-6B70D42582B1}" type="datetimeFigureOut">
               <a:rPr lang="en-US" smtClean="0"/>
-              <a:t>4/4/2017</a:t>
+              <a:t>4/11/2017</a:t>
             </a:fld>
             <a:endParaRPr lang="en-US"/>
           </a:p>
@@ -1834,7 +1835,7 @@
           <a:p>
             <a:fld id="{EB58624E-6335-4896-8152-6B70D42582B1}" type="datetimeFigureOut">
               <a:rPr lang="en-US" smtClean="0"/>
-              <a:t>4/4/2017</a:t>
+              <a:t>4/11/2017</a:t>
             </a:fld>
             <a:endParaRPr lang="en-US"/>
           </a:p>
@@ -2111,7 +2112,7 @@
           <a:p>
             <a:fld id="{EB58624E-6335-4896-8152-6B70D42582B1}" type="datetimeFigureOut">
               <a:rPr lang="en-US" smtClean="0"/>
-              <a:t>4/4/2017</a:t>
+              <a:t>4/11/2017</a:t>
             </a:fld>
             <a:endParaRPr lang="en-US"/>
           </a:p>
@@ -2364,7 +2365,7 @@
           <a:p>
             <a:fld id="{EB58624E-6335-4896-8152-6B70D42582B1}" type="datetimeFigureOut">
               <a:rPr lang="en-US" smtClean="0"/>
-              <a:t>4/4/2017</a:t>
+              <a:t>4/11/2017</a:t>
             </a:fld>
             <a:endParaRPr lang="en-US"/>
           </a:p>
@@ -2577,7 +2578,7 @@
           <a:p>
             <a:fld id="{EB58624E-6335-4896-8152-6B70D42582B1}" type="datetimeFigureOut">
               <a:rPr lang="en-US" smtClean="0"/>
-              <a:t>4/4/2017</a:t>
+              <a:t>4/11/2017</a:t>
             </a:fld>
             <a:endParaRPr lang="en-US"/>
           </a:p>
@@ -8663,7 +8664,7 @@
       </p:grpSpPr>
       <p:grpSp>
         <p:nvGrpSpPr>
-          <p:cNvPr id="5" name="Group 4"/>
+          <p:cNvPr id="11" name="Group 10"/>
           <p:cNvGrpSpPr/>
           <p:nvPr/>
         </p:nvGrpSpPr>
@@ -9688,123 +9689,108 @@
             </a:p>
           </p:txBody>
         </p:sp>
-        <p:grpSp>
-          <p:nvGrpSpPr>
-            <p:cNvPr id="2" name="Group 1"/>
-            <p:cNvGrpSpPr/>
-            <p:nvPr/>
-          </p:nvGrpSpPr>
-          <p:grpSpPr>
+        <p:pic>
+          <p:nvPicPr>
+            <p:cNvPr id="73" name="Picture 72"/>
+            <p:cNvPicPr>
+              <a:picLocks noChangeAspect="1"/>
+            </p:cNvPicPr>
+            <p:nvPr>
+              <p:custDataLst>
+                <p:tags r:id="rId12"/>
+              </p:custDataLst>
+            </p:nvPr>
+          </p:nvPicPr>
+          <p:blipFill>
+            <a:blip r:embed="rId23" cstate="print">
+              <a:extLst>
+                <a:ext uri="{28A0092B-C50C-407E-A947-70E740481C1C}">
+                  <a14:useLocalDpi xmlns:a14="http://schemas.microsoft.com/office/drawing/2010/main" val="0"/>
+                </a:ext>
+              </a:extLst>
+            </a:blip>
+            <a:stretch>
+              <a:fillRect/>
+            </a:stretch>
+          </p:blipFill>
+          <p:spPr>
             <a:xfrm>
-              <a:off x="6179876" y="662971"/>
-              <a:ext cx="449524" cy="4747229"/>
-              <a:chOff x="5871238" y="533400"/>
-              <a:chExt cx="449524" cy="4747229"/>
+              <a:off x="6182924" y="662971"/>
+              <a:ext cx="443429" cy="251429"/>
             </a:xfrm>
-          </p:grpSpPr>
-          <p:pic>
-            <p:nvPicPr>
-              <p:cNvPr id="73" name="Picture 72"/>
-              <p:cNvPicPr>
-                <a:picLocks noChangeAspect="1"/>
-              </p:cNvPicPr>
-              <p:nvPr>
-                <p:custDataLst>
-                  <p:tags r:id="rId13"/>
-                </p:custDataLst>
-              </p:nvPr>
-            </p:nvPicPr>
-            <p:blipFill>
-              <a:blip r:embed="rId23" cstate="print">
-                <a:extLst>
-                  <a:ext uri="{28A0092B-C50C-407E-A947-70E740481C1C}">
-                    <a14:useLocalDpi xmlns:a14="http://schemas.microsoft.com/office/drawing/2010/main" val="0"/>
-                  </a:ext>
-                </a:extLst>
-              </a:blip>
-              <a:stretch>
-                <a:fillRect/>
-              </a:stretch>
-            </p:blipFill>
-            <p:spPr>
-              <a:xfrm>
-                <a:off x="5874286" y="533400"/>
-                <a:ext cx="443429" cy="251429"/>
-              </a:xfrm>
-              <a:prstGeom prst="rect">
-                <a:avLst/>
-              </a:prstGeom>
-            </p:spPr>
-          </p:pic>
-          <p:pic>
-            <p:nvPicPr>
-              <p:cNvPr id="74" name="Picture 73"/>
-              <p:cNvPicPr>
-                <a:picLocks noChangeAspect="1"/>
-              </p:cNvPicPr>
-              <p:nvPr>
-                <p:custDataLst>
-                  <p:tags r:id="rId14"/>
-                </p:custDataLst>
-              </p:nvPr>
-            </p:nvPicPr>
-            <p:blipFill>
-              <a:blip r:embed="rId24" cstate="print">
-                <a:extLst>
-                  <a:ext uri="{28A0092B-C50C-407E-A947-70E740481C1C}">
-                    <a14:useLocalDpi xmlns:a14="http://schemas.microsoft.com/office/drawing/2010/main" val="0"/>
-                  </a:ext>
-                </a:extLst>
-              </a:blip>
-              <a:stretch>
-                <a:fillRect/>
-              </a:stretch>
-            </p:blipFill>
-            <p:spPr>
-              <a:xfrm>
-                <a:off x="5871238" y="2743200"/>
-                <a:ext cx="449524" cy="251429"/>
-              </a:xfrm>
-              <a:prstGeom prst="rect">
-                <a:avLst/>
-              </a:prstGeom>
-            </p:spPr>
-          </p:pic>
-          <p:pic>
-            <p:nvPicPr>
-              <p:cNvPr id="76" name="Picture 75"/>
-              <p:cNvPicPr>
-                <a:picLocks noChangeAspect="1"/>
-              </p:cNvPicPr>
-              <p:nvPr>
-                <p:custDataLst>
-                  <p:tags r:id="rId15"/>
-                </p:custDataLst>
-              </p:nvPr>
-            </p:nvPicPr>
-            <p:blipFill>
-              <a:blip r:embed="rId25" cstate="print">
-                <a:extLst>
-                  <a:ext uri="{28A0092B-C50C-407E-A947-70E740481C1C}">
-                    <a14:useLocalDpi xmlns:a14="http://schemas.microsoft.com/office/drawing/2010/main" val="0"/>
-                  </a:ext>
-                </a:extLst>
-              </a:blip>
-              <a:stretch>
-                <a:fillRect/>
-              </a:stretch>
-            </p:blipFill>
-            <p:spPr>
-              <a:xfrm>
-                <a:off x="5884953" y="5029200"/>
-                <a:ext cx="422095" cy="251429"/>
-              </a:xfrm>
-              <a:prstGeom prst="rect">
-                <a:avLst/>
-              </a:prstGeom>
-            </p:spPr>
-          </p:pic>
-        </p:grpSp>
+            <a:prstGeom prst="rect">
+              <a:avLst/>
+            </a:prstGeom>
+          </p:spPr>
+        </p:pic>
+        <p:pic>
+          <p:nvPicPr>
+            <p:cNvPr id="74" name="Picture 73"/>
+            <p:cNvPicPr>
+              <a:picLocks noChangeAspect="1"/>
+            </p:cNvPicPr>
+            <p:nvPr>
+              <p:custDataLst>
+                <p:tags r:id="rId13"/>
+              </p:custDataLst>
+            </p:nvPr>
+          </p:nvPicPr>
+          <p:blipFill>
+            <a:blip r:embed="rId24" cstate="print">
+              <a:extLst>
+                <a:ext uri="{28A0092B-C50C-407E-A947-70E740481C1C}">
+                  <a14:useLocalDpi xmlns:a14="http://schemas.microsoft.com/office/drawing/2010/main" val="0"/>
+                </a:ext>
+              </a:extLst>
+            </a:blip>
+            <a:stretch>
+              <a:fillRect/>
+            </a:stretch>
+          </p:blipFill>
+          <p:spPr>
+            <a:xfrm>
+              <a:off x="6179876" y="2872771"/>
+              <a:ext cx="449524" cy="251429"/>
+            </a:xfrm>
+            <a:prstGeom prst="rect">
+              <a:avLst/>
+            </a:prstGeom>
+          </p:spPr>
+        </p:pic>
+        <p:pic>
+          <p:nvPicPr>
+            <p:cNvPr id="7" name="Picture 6"/>
+            <p:cNvPicPr>
+              <a:picLocks noChangeAspect="1"/>
+            </p:cNvPicPr>
+            <p:nvPr>
+              <p:custDataLst>
+                <p:tags r:id="rId14"/>
+              </p:custDataLst>
+            </p:nvPr>
+          </p:nvPicPr>
+          <p:blipFill>
+            <a:blip r:embed="rId25" cstate="print">
+              <a:extLst>
+                <a:ext uri="{28A0092B-C50C-407E-A947-70E740481C1C}">
+                  <a14:useLocalDpi xmlns:a14="http://schemas.microsoft.com/office/drawing/2010/main" val="0"/>
+                </a:ext>
+              </a:extLst>
+            </a:blip>
+            <a:stretch>
+              <a:fillRect/>
+            </a:stretch>
+          </p:blipFill>
+          <p:spPr>
+            <a:xfrm>
+              <a:off x="6134162" y="5167165"/>
+              <a:ext cx="540952" cy="251429"/>
+            </a:xfrm>
+            <a:prstGeom prst="rect">
+              <a:avLst/>
+            </a:prstGeom>
+          </p:spPr>
+        </p:pic>
         <p:pic>
           <p:nvPicPr>
             <p:cNvPr id="80" name="Picture 79"/>
@@ -9813,7 +9799,7 @@
             </p:cNvPicPr>
             <p:nvPr>
               <p:custDataLst>
-                <p:tags r:id="rId12"/>
+                <p:tags r:id="rId15"/>
               </p:custDataLst>
             </p:nvPr>
           </p:nvPicPr>
@@ -11078,6 +11064,3440 @@
 </p:sld>
 </file>
 
+<file path=ppt/slides/slide4.xml><?xml version="1.0" encoding="utf-8"?>
+<p:sld xmlns:a="http://schemas.openxmlformats.org/drawingml/2006/main" xmlns:r="http://schemas.openxmlformats.org/officeDocument/2006/relationships" xmlns:p="http://schemas.openxmlformats.org/presentationml/2006/main">
+  <p:cSld>
+    <p:spTree>
+      <p:nvGrpSpPr>
+        <p:cNvPr id="1" name=""/>
+        <p:cNvGrpSpPr/>
+        <p:nvPr/>
+      </p:nvGrpSpPr>
+      <p:grpSpPr>
+        <a:xfrm>
+          <a:off x="0" y="0"/>
+          <a:ext cx="0" cy="0"/>
+          <a:chOff x="0" y="0"/>
+          <a:chExt cx="0" cy="0"/>
+        </a:xfrm>
+      </p:grpSpPr>
+      <p:grpSp>
+        <p:nvGrpSpPr>
+          <p:cNvPr id="211" name="Group 210"/>
+          <p:cNvGrpSpPr/>
+          <p:nvPr/>
+        </p:nvGrpSpPr>
+        <p:grpSpPr>
+          <a:xfrm>
+            <a:off x="1234859" y="1161191"/>
+            <a:ext cx="9722283" cy="4782409"/>
+            <a:chOff x="1234859" y="1161191"/>
+            <a:chExt cx="9722283" cy="4782409"/>
+          </a:xfrm>
+        </p:grpSpPr>
+        <p:sp>
+          <p:nvSpPr>
+            <p:cNvPr id="22" name="Rectangle 21"/>
+            <p:cNvSpPr/>
+            <p:nvPr/>
+          </p:nvSpPr>
+          <p:spPr>
+            <a:xfrm>
+              <a:off x="1234859" y="1905000"/>
+              <a:ext cx="1219200" cy="593513"/>
+            </a:xfrm>
+            <a:prstGeom prst="rect">
+              <a:avLst/>
+            </a:prstGeom>
+            <a:solidFill>
+              <a:schemeClr val="bg1">
+                <a:lumMod val="95000"/>
+              </a:schemeClr>
+            </a:solidFill>
+            <a:ln>
+              <a:solidFill>
+                <a:schemeClr val="tx1"/>
+              </a:solidFill>
+            </a:ln>
+          </p:spPr>
+          <p:style>
+            <a:lnRef idx="2">
+              <a:schemeClr val="accent1">
+                <a:shade val="50000"/>
+              </a:schemeClr>
+            </a:lnRef>
+            <a:fillRef idx="1">
+              <a:schemeClr val="accent1"/>
+            </a:fillRef>
+            <a:effectRef idx="0">
+              <a:schemeClr val="accent1"/>
+            </a:effectRef>
+            <a:fontRef idx="minor">
+              <a:schemeClr val="lt1"/>
+            </a:fontRef>
+          </p:style>
+          <p:txBody>
+            <a:bodyPr rtlCol="0" anchor="ctr"/>
+            <a:lstStyle/>
+            <a:p>
+              <a:pPr algn="ctr"/>
+              <a:endParaRPr lang="en-US" dirty="0">
+                <a:solidFill>
+                  <a:schemeClr val="tx1"/>
+                </a:solidFill>
+                <a:latin typeface="Times New Roman"/>
+                <a:cs typeface="Times New Roman"/>
+              </a:endParaRPr>
+            </a:p>
+          </p:txBody>
+        </p:sp>
+        <p:pic>
+          <p:nvPicPr>
+            <p:cNvPr id="46" name="Picture 45"/>
+            <p:cNvPicPr>
+              <a:picLocks noChangeAspect="1"/>
+            </p:cNvPicPr>
+            <p:nvPr>
+              <p:custDataLst>
+                <p:tags r:id="rId1"/>
+              </p:custDataLst>
+            </p:nvPr>
+          </p:nvPicPr>
+          <p:blipFill>
+            <a:blip r:embed="rId12" cstate="print">
+              <a:extLst>
+                <a:ext uri="{28A0092B-C50C-407E-A947-70E740481C1C}">
+                  <a14:useLocalDpi xmlns:a14="http://schemas.microsoft.com/office/drawing/2010/main" val="0"/>
+                </a:ext>
+              </a:extLst>
+            </a:blip>
+            <a:stretch>
+              <a:fillRect/>
+            </a:stretch>
+          </p:blipFill>
+          <p:spPr>
+            <a:xfrm>
+              <a:off x="1385030" y="2092803"/>
+              <a:ext cx="918857" cy="217905"/>
+            </a:xfrm>
+            <a:prstGeom prst="rect">
+              <a:avLst/>
+            </a:prstGeom>
+          </p:spPr>
+        </p:pic>
+        <p:sp>
+          <p:nvSpPr>
+            <p:cNvPr id="49" name="Rectangle 48"/>
+            <p:cNvSpPr/>
+            <p:nvPr/>
+          </p:nvSpPr>
+          <p:spPr>
+            <a:xfrm>
+              <a:off x="2449586" y="1905000"/>
+              <a:ext cx="1219200" cy="593513"/>
+            </a:xfrm>
+            <a:prstGeom prst="rect">
+              <a:avLst/>
+            </a:prstGeom>
+            <a:solidFill>
+              <a:schemeClr val="bg1">
+                <a:lumMod val="95000"/>
+              </a:schemeClr>
+            </a:solidFill>
+            <a:ln>
+              <a:solidFill>
+                <a:schemeClr val="tx1"/>
+              </a:solidFill>
+            </a:ln>
+          </p:spPr>
+          <p:style>
+            <a:lnRef idx="2">
+              <a:schemeClr val="accent1">
+                <a:shade val="50000"/>
+              </a:schemeClr>
+            </a:lnRef>
+            <a:fillRef idx="1">
+              <a:schemeClr val="accent1"/>
+            </a:fillRef>
+            <a:effectRef idx="0">
+              <a:schemeClr val="accent1"/>
+            </a:effectRef>
+            <a:fontRef idx="minor">
+              <a:schemeClr val="lt1"/>
+            </a:fontRef>
+          </p:style>
+          <p:txBody>
+            <a:bodyPr rtlCol="0" anchor="ctr"/>
+            <a:lstStyle/>
+            <a:p>
+              <a:pPr algn="ctr"/>
+              <a:endParaRPr lang="en-US" dirty="0">
+                <a:solidFill>
+                  <a:schemeClr val="tx1"/>
+                </a:solidFill>
+                <a:latin typeface="Times New Roman"/>
+                <a:cs typeface="Times New Roman"/>
+              </a:endParaRPr>
+            </a:p>
+          </p:txBody>
+        </p:sp>
+        <p:pic>
+          <p:nvPicPr>
+            <p:cNvPr id="50" name="Picture 49"/>
+            <p:cNvPicPr>
+              <a:picLocks noChangeAspect="1"/>
+            </p:cNvPicPr>
+            <p:nvPr>
+              <p:custDataLst>
+                <p:tags r:id="rId2"/>
+              </p:custDataLst>
+            </p:nvPr>
+          </p:nvPicPr>
+          <p:blipFill>
+            <a:blip r:embed="rId12" cstate="print">
+              <a:extLst>
+                <a:ext uri="{28A0092B-C50C-407E-A947-70E740481C1C}">
+                  <a14:useLocalDpi xmlns:a14="http://schemas.microsoft.com/office/drawing/2010/main" val="0"/>
+                </a:ext>
+              </a:extLst>
+            </a:blip>
+            <a:stretch>
+              <a:fillRect/>
+            </a:stretch>
+          </p:blipFill>
+          <p:spPr>
+            <a:xfrm>
+              <a:off x="2599757" y="2092803"/>
+              <a:ext cx="918857" cy="217905"/>
+            </a:xfrm>
+            <a:prstGeom prst="rect">
+              <a:avLst/>
+            </a:prstGeom>
+          </p:spPr>
+        </p:pic>
+        <p:sp>
+          <p:nvSpPr>
+            <p:cNvPr id="52" name="Rectangle 51"/>
+            <p:cNvSpPr/>
+            <p:nvPr/>
+          </p:nvSpPr>
+          <p:spPr>
+            <a:xfrm>
+              <a:off x="3664312" y="1905000"/>
+              <a:ext cx="1219200" cy="593513"/>
+            </a:xfrm>
+            <a:prstGeom prst="rect">
+              <a:avLst/>
+            </a:prstGeom>
+            <a:solidFill>
+              <a:schemeClr val="bg1">
+                <a:lumMod val="95000"/>
+              </a:schemeClr>
+            </a:solidFill>
+            <a:ln>
+              <a:solidFill>
+                <a:schemeClr val="tx1"/>
+              </a:solidFill>
+            </a:ln>
+          </p:spPr>
+          <p:style>
+            <a:lnRef idx="2">
+              <a:schemeClr val="accent1">
+                <a:shade val="50000"/>
+              </a:schemeClr>
+            </a:lnRef>
+            <a:fillRef idx="1">
+              <a:schemeClr val="accent1"/>
+            </a:fillRef>
+            <a:effectRef idx="0">
+              <a:schemeClr val="accent1"/>
+            </a:effectRef>
+            <a:fontRef idx="minor">
+              <a:schemeClr val="lt1"/>
+            </a:fontRef>
+          </p:style>
+          <p:txBody>
+            <a:bodyPr rtlCol="0" anchor="ctr"/>
+            <a:lstStyle/>
+            <a:p>
+              <a:pPr algn="ctr"/>
+              <a:endParaRPr lang="en-US" dirty="0">
+                <a:solidFill>
+                  <a:schemeClr val="tx1"/>
+                </a:solidFill>
+                <a:latin typeface="Times New Roman"/>
+                <a:cs typeface="Times New Roman"/>
+              </a:endParaRPr>
+            </a:p>
+          </p:txBody>
+        </p:sp>
+        <p:pic>
+          <p:nvPicPr>
+            <p:cNvPr id="53" name="Picture 52"/>
+            <p:cNvPicPr>
+              <a:picLocks noChangeAspect="1"/>
+            </p:cNvPicPr>
+            <p:nvPr>
+              <p:custDataLst>
+                <p:tags r:id="rId3"/>
+              </p:custDataLst>
+            </p:nvPr>
+          </p:nvPicPr>
+          <p:blipFill>
+            <a:blip r:embed="rId12" cstate="print">
+              <a:extLst>
+                <a:ext uri="{28A0092B-C50C-407E-A947-70E740481C1C}">
+                  <a14:useLocalDpi xmlns:a14="http://schemas.microsoft.com/office/drawing/2010/main" val="0"/>
+                </a:ext>
+              </a:extLst>
+            </a:blip>
+            <a:stretch>
+              <a:fillRect/>
+            </a:stretch>
+          </p:blipFill>
+          <p:spPr>
+            <a:xfrm>
+              <a:off x="3814483" y="2092803"/>
+              <a:ext cx="918857" cy="217905"/>
+            </a:xfrm>
+            <a:prstGeom prst="rect">
+              <a:avLst/>
+            </a:prstGeom>
+          </p:spPr>
+        </p:pic>
+        <p:sp>
+          <p:nvSpPr>
+            <p:cNvPr id="73" name="Rectangle 72"/>
+            <p:cNvSpPr/>
+            <p:nvPr/>
+          </p:nvSpPr>
+          <p:spPr>
+            <a:xfrm>
+              <a:off x="4879037" y="1905000"/>
+              <a:ext cx="1219200" cy="593513"/>
+            </a:xfrm>
+            <a:prstGeom prst="rect">
+              <a:avLst/>
+            </a:prstGeom>
+            <a:solidFill>
+              <a:schemeClr val="bg1">
+                <a:lumMod val="95000"/>
+              </a:schemeClr>
+            </a:solidFill>
+            <a:ln>
+              <a:solidFill>
+                <a:schemeClr val="tx1"/>
+              </a:solidFill>
+            </a:ln>
+          </p:spPr>
+          <p:style>
+            <a:lnRef idx="2">
+              <a:schemeClr val="accent1">
+                <a:shade val="50000"/>
+              </a:schemeClr>
+            </a:lnRef>
+            <a:fillRef idx="1">
+              <a:schemeClr val="accent1"/>
+            </a:fillRef>
+            <a:effectRef idx="0">
+              <a:schemeClr val="accent1"/>
+            </a:effectRef>
+            <a:fontRef idx="minor">
+              <a:schemeClr val="lt1"/>
+            </a:fontRef>
+          </p:style>
+          <p:txBody>
+            <a:bodyPr rtlCol="0" anchor="ctr"/>
+            <a:lstStyle/>
+            <a:p>
+              <a:pPr algn="ctr"/>
+              <a:endParaRPr lang="en-US" dirty="0">
+                <a:solidFill>
+                  <a:schemeClr val="tx1"/>
+                </a:solidFill>
+                <a:latin typeface="Times New Roman"/>
+                <a:cs typeface="Times New Roman"/>
+              </a:endParaRPr>
+            </a:p>
+          </p:txBody>
+        </p:sp>
+        <p:pic>
+          <p:nvPicPr>
+            <p:cNvPr id="74" name="Picture 73"/>
+            <p:cNvPicPr>
+              <a:picLocks noChangeAspect="1"/>
+            </p:cNvPicPr>
+            <p:nvPr>
+              <p:custDataLst>
+                <p:tags r:id="rId4"/>
+              </p:custDataLst>
+            </p:nvPr>
+          </p:nvPicPr>
+          <p:blipFill>
+            <a:blip r:embed="rId12" cstate="print">
+              <a:extLst>
+                <a:ext uri="{28A0092B-C50C-407E-A947-70E740481C1C}">
+                  <a14:useLocalDpi xmlns:a14="http://schemas.microsoft.com/office/drawing/2010/main" val="0"/>
+                </a:ext>
+              </a:extLst>
+            </a:blip>
+            <a:stretch>
+              <a:fillRect/>
+            </a:stretch>
+          </p:blipFill>
+          <p:spPr>
+            <a:xfrm>
+              <a:off x="5029208" y="2092803"/>
+              <a:ext cx="918857" cy="217905"/>
+            </a:xfrm>
+            <a:prstGeom prst="rect">
+              <a:avLst/>
+            </a:prstGeom>
+          </p:spPr>
+        </p:pic>
+        <p:sp>
+          <p:nvSpPr>
+            <p:cNvPr id="76" name="Rectangle 75"/>
+            <p:cNvSpPr/>
+            <p:nvPr/>
+          </p:nvSpPr>
+          <p:spPr>
+            <a:xfrm>
+              <a:off x="6093764" y="1905000"/>
+              <a:ext cx="1219200" cy="593513"/>
+            </a:xfrm>
+            <a:prstGeom prst="rect">
+              <a:avLst/>
+            </a:prstGeom>
+            <a:solidFill>
+              <a:schemeClr val="bg1">
+                <a:lumMod val="95000"/>
+              </a:schemeClr>
+            </a:solidFill>
+            <a:ln>
+              <a:solidFill>
+                <a:schemeClr val="tx1"/>
+              </a:solidFill>
+            </a:ln>
+          </p:spPr>
+          <p:style>
+            <a:lnRef idx="2">
+              <a:schemeClr val="accent1">
+                <a:shade val="50000"/>
+              </a:schemeClr>
+            </a:lnRef>
+            <a:fillRef idx="1">
+              <a:schemeClr val="accent1"/>
+            </a:fillRef>
+            <a:effectRef idx="0">
+              <a:schemeClr val="accent1"/>
+            </a:effectRef>
+            <a:fontRef idx="minor">
+              <a:schemeClr val="lt1"/>
+            </a:fontRef>
+          </p:style>
+          <p:txBody>
+            <a:bodyPr rtlCol="0" anchor="ctr"/>
+            <a:lstStyle/>
+            <a:p>
+              <a:pPr algn="ctr"/>
+              <a:endParaRPr lang="en-US" dirty="0">
+                <a:solidFill>
+                  <a:schemeClr val="tx1"/>
+                </a:solidFill>
+                <a:latin typeface="Times New Roman"/>
+                <a:cs typeface="Times New Roman"/>
+              </a:endParaRPr>
+            </a:p>
+          </p:txBody>
+        </p:sp>
+        <p:pic>
+          <p:nvPicPr>
+            <p:cNvPr id="77" name="Picture 76"/>
+            <p:cNvPicPr>
+              <a:picLocks noChangeAspect="1"/>
+            </p:cNvPicPr>
+            <p:nvPr>
+              <p:custDataLst>
+                <p:tags r:id="rId5"/>
+              </p:custDataLst>
+            </p:nvPr>
+          </p:nvPicPr>
+          <p:blipFill>
+            <a:blip r:embed="rId12" cstate="print">
+              <a:extLst>
+                <a:ext uri="{28A0092B-C50C-407E-A947-70E740481C1C}">
+                  <a14:useLocalDpi xmlns:a14="http://schemas.microsoft.com/office/drawing/2010/main" val="0"/>
+                </a:ext>
+              </a:extLst>
+            </a:blip>
+            <a:stretch>
+              <a:fillRect/>
+            </a:stretch>
+          </p:blipFill>
+          <p:spPr>
+            <a:xfrm>
+              <a:off x="6243935" y="2092803"/>
+              <a:ext cx="918857" cy="217905"/>
+            </a:xfrm>
+            <a:prstGeom prst="rect">
+              <a:avLst/>
+            </a:prstGeom>
+          </p:spPr>
+        </p:pic>
+        <p:sp>
+          <p:nvSpPr>
+            <p:cNvPr id="79" name="Rectangle 78"/>
+            <p:cNvSpPr/>
+            <p:nvPr/>
+          </p:nvSpPr>
+          <p:spPr>
+            <a:xfrm>
+              <a:off x="7308490" y="1905000"/>
+              <a:ext cx="1219200" cy="593513"/>
+            </a:xfrm>
+            <a:prstGeom prst="rect">
+              <a:avLst/>
+            </a:prstGeom>
+            <a:solidFill>
+              <a:schemeClr val="bg1">
+                <a:lumMod val="95000"/>
+              </a:schemeClr>
+            </a:solidFill>
+            <a:ln>
+              <a:solidFill>
+                <a:schemeClr val="tx1"/>
+              </a:solidFill>
+            </a:ln>
+          </p:spPr>
+          <p:style>
+            <a:lnRef idx="2">
+              <a:schemeClr val="accent1">
+                <a:shade val="50000"/>
+              </a:schemeClr>
+            </a:lnRef>
+            <a:fillRef idx="1">
+              <a:schemeClr val="accent1"/>
+            </a:fillRef>
+            <a:effectRef idx="0">
+              <a:schemeClr val="accent1"/>
+            </a:effectRef>
+            <a:fontRef idx="minor">
+              <a:schemeClr val="lt1"/>
+            </a:fontRef>
+          </p:style>
+          <p:txBody>
+            <a:bodyPr rtlCol="0" anchor="ctr"/>
+            <a:lstStyle/>
+            <a:p>
+              <a:pPr algn="ctr"/>
+              <a:endParaRPr lang="en-US" dirty="0">
+                <a:solidFill>
+                  <a:schemeClr val="tx1"/>
+                </a:solidFill>
+                <a:latin typeface="Times New Roman"/>
+                <a:cs typeface="Times New Roman"/>
+              </a:endParaRPr>
+            </a:p>
+          </p:txBody>
+        </p:sp>
+        <p:pic>
+          <p:nvPicPr>
+            <p:cNvPr id="80" name="Picture 79"/>
+            <p:cNvPicPr>
+              <a:picLocks noChangeAspect="1"/>
+            </p:cNvPicPr>
+            <p:nvPr>
+              <p:custDataLst>
+                <p:tags r:id="rId6"/>
+              </p:custDataLst>
+            </p:nvPr>
+          </p:nvPicPr>
+          <p:blipFill>
+            <a:blip r:embed="rId12" cstate="print">
+              <a:extLst>
+                <a:ext uri="{28A0092B-C50C-407E-A947-70E740481C1C}">
+                  <a14:useLocalDpi xmlns:a14="http://schemas.microsoft.com/office/drawing/2010/main" val="0"/>
+                </a:ext>
+              </a:extLst>
+            </a:blip>
+            <a:stretch>
+              <a:fillRect/>
+            </a:stretch>
+          </p:blipFill>
+          <p:spPr>
+            <a:xfrm>
+              <a:off x="7458661" y="2092803"/>
+              <a:ext cx="918857" cy="217905"/>
+            </a:xfrm>
+            <a:prstGeom prst="rect">
+              <a:avLst/>
+            </a:prstGeom>
+          </p:spPr>
+        </p:pic>
+        <p:sp>
+          <p:nvSpPr>
+            <p:cNvPr id="82" name="Rectangle 81"/>
+            <p:cNvSpPr/>
+            <p:nvPr/>
+          </p:nvSpPr>
+          <p:spPr>
+            <a:xfrm>
+              <a:off x="8523215" y="1905000"/>
+              <a:ext cx="1219200" cy="593513"/>
+            </a:xfrm>
+            <a:prstGeom prst="rect">
+              <a:avLst/>
+            </a:prstGeom>
+            <a:solidFill>
+              <a:schemeClr val="bg1">
+                <a:lumMod val="95000"/>
+              </a:schemeClr>
+            </a:solidFill>
+            <a:ln>
+              <a:solidFill>
+                <a:schemeClr val="tx1"/>
+              </a:solidFill>
+            </a:ln>
+          </p:spPr>
+          <p:style>
+            <a:lnRef idx="2">
+              <a:schemeClr val="accent1">
+                <a:shade val="50000"/>
+              </a:schemeClr>
+            </a:lnRef>
+            <a:fillRef idx="1">
+              <a:schemeClr val="accent1"/>
+            </a:fillRef>
+            <a:effectRef idx="0">
+              <a:schemeClr val="accent1"/>
+            </a:effectRef>
+            <a:fontRef idx="minor">
+              <a:schemeClr val="lt1"/>
+            </a:fontRef>
+          </p:style>
+          <p:txBody>
+            <a:bodyPr rtlCol="0" anchor="ctr"/>
+            <a:lstStyle/>
+            <a:p>
+              <a:pPr algn="ctr"/>
+              <a:endParaRPr lang="en-US" dirty="0">
+                <a:solidFill>
+                  <a:schemeClr val="tx1"/>
+                </a:solidFill>
+                <a:latin typeface="Times New Roman"/>
+                <a:cs typeface="Times New Roman"/>
+              </a:endParaRPr>
+            </a:p>
+          </p:txBody>
+        </p:sp>
+        <p:pic>
+          <p:nvPicPr>
+            <p:cNvPr id="83" name="Picture 82"/>
+            <p:cNvPicPr>
+              <a:picLocks noChangeAspect="1"/>
+            </p:cNvPicPr>
+            <p:nvPr>
+              <p:custDataLst>
+                <p:tags r:id="rId7"/>
+              </p:custDataLst>
+            </p:nvPr>
+          </p:nvPicPr>
+          <p:blipFill>
+            <a:blip r:embed="rId12" cstate="print">
+              <a:extLst>
+                <a:ext uri="{28A0092B-C50C-407E-A947-70E740481C1C}">
+                  <a14:useLocalDpi xmlns:a14="http://schemas.microsoft.com/office/drawing/2010/main" val="0"/>
+                </a:ext>
+              </a:extLst>
+            </a:blip>
+            <a:stretch>
+              <a:fillRect/>
+            </a:stretch>
+          </p:blipFill>
+          <p:spPr>
+            <a:xfrm>
+              <a:off x="8673386" y="2092803"/>
+              <a:ext cx="918857" cy="217905"/>
+            </a:xfrm>
+            <a:prstGeom prst="rect">
+              <a:avLst/>
+            </a:prstGeom>
+          </p:spPr>
+        </p:pic>
+        <p:sp>
+          <p:nvSpPr>
+            <p:cNvPr id="85" name="Rectangle 84"/>
+            <p:cNvSpPr/>
+            <p:nvPr/>
+          </p:nvSpPr>
+          <p:spPr>
+            <a:xfrm>
+              <a:off x="9737942" y="1905000"/>
+              <a:ext cx="1219200" cy="593513"/>
+            </a:xfrm>
+            <a:prstGeom prst="rect">
+              <a:avLst/>
+            </a:prstGeom>
+            <a:solidFill>
+              <a:schemeClr val="bg1">
+                <a:lumMod val="95000"/>
+              </a:schemeClr>
+            </a:solidFill>
+            <a:ln>
+              <a:solidFill>
+                <a:schemeClr val="tx1"/>
+              </a:solidFill>
+            </a:ln>
+          </p:spPr>
+          <p:style>
+            <a:lnRef idx="2">
+              <a:schemeClr val="accent1">
+                <a:shade val="50000"/>
+              </a:schemeClr>
+            </a:lnRef>
+            <a:fillRef idx="1">
+              <a:schemeClr val="accent1"/>
+            </a:fillRef>
+            <a:effectRef idx="0">
+              <a:schemeClr val="accent1"/>
+            </a:effectRef>
+            <a:fontRef idx="minor">
+              <a:schemeClr val="lt1"/>
+            </a:fontRef>
+          </p:style>
+          <p:txBody>
+            <a:bodyPr rtlCol="0" anchor="ctr"/>
+            <a:lstStyle/>
+            <a:p>
+              <a:pPr algn="ctr"/>
+              <a:endParaRPr lang="en-US" dirty="0">
+                <a:solidFill>
+                  <a:schemeClr val="tx1"/>
+                </a:solidFill>
+                <a:latin typeface="Times New Roman"/>
+                <a:cs typeface="Times New Roman"/>
+              </a:endParaRPr>
+            </a:p>
+          </p:txBody>
+        </p:sp>
+        <p:pic>
+          <p:nvPicPr>
+            <p:cNvPr id="86" name="Picture 85"/>
+            <p:cNvPicPr>
+              <a:picLocks noChangeAspect="1"/>
+            </p:cNvPicPr>
+            <p:nvPr>
+              <p:custDataLst>
+                <p:tags r:id="rId8"/>
+              </p:custDataLst>
+            </p:nvPr>
+          </p:nvPicPr>
+          <p:blipFill>
+            <a:blip r:embed="rId12" cstate="print">
+              <a:extLst>
+                <a:ext uri="{28A0092B-C50C-407E-A947-70E740481C1C}">
+                  <a14:useLocalDpi xmlns:a14="http://schemas.microsoft.com/office/drawing/2010/main" val="0"/>
+                </a:ext>
+              </a:extLst>
+            </a:blip>
+            <a:stretch>
+              <a:fillRect/>
+            </a:stretch>
+          </p:blipFill>
+          <p:spPr>
+            <a:xfrm>
+              <a:off x="9888113" y="2092803"/>
+              <a:ext cx="918857" cy="217905"/>
+            </a:xfrm>
+            <a:prstGeom prst="rect">
+              <a:avLst/>
+            </a:prstGeom>
+          </p:spPr>
+        </p:pic>
+        <p:sp>
+          <p:nvSpPr>
+            <p:cNvPr id="91" name="Rectangle 90"/>
+            <p:cNvSpPr/>
+            <p:nvPr/>
+          </p:nvSpPr>
+          <p:spPr>
+            <a:xfrm>
+              <a:off x="1237086" y="1161191"/>
+              <a:ext cx="9720055" cy="593513"/>
+            </a:xfrm>
+            <a:prstGeom prst="rect">
+              <a:avLst/>
+            </a:prstGeom>
+            <a:solidFill>
+              <a:schemeClr val="bg1">
+                <a:lumMod val="95000"/>
+              </a:schemeClr>
+            </a:solidFill>
+            <a:ln>
+              <a:solidFill>
+                <a:schemeClr val="tx1"/>
+              </a:solidFill>
+            </a:ln>
+          </p:spPr>
+          <p:style>
+            <a:lnRef idx="2">
+              <a:schemeClr val="accent1">
+                <a:shade val="50000"/>
+              </a:schemeClr>
+            </a:lnRef>
+            <a:fillRef idx="1">
+              <a:schemeClr val="accent1"/>
+            </a:fillRef>
+            <a:effectRef idx="0">
+              <a:schemeClr val="accent1"/>
+            </a:effectRef>
+            <a:fontRef idx="minor">
+              <a:schemeClr val="lt1"/>
+            </a:fontRef>
+          </p:style>
+          <p:txBody>
+            <a:bodyPr rtlCol="0" anchor="ctr"/>
+            <a:lstStyle/>
+            <a:p>
+              <a:pPr algn="ctr"/>
+              <a:r>
+                <a:rPr lang="en-US" dirty="0" smtClean="0">
+                  <a:solidFill>
+                    <a:schemeClr val="tx1"/>
+                  </a:solidFill>
+                  <a:latin typeface="Times New Roman"/>
+                  <a:cs typeface="Times New Roman"/>
+                </a:rPr>
+                <a:t>Preamble</a:t>
+              </a:r>
+              <a:endParaRPr lang="en-US" dirty="0">
+                <a:solidFill>
+                  <a:schemeClr val="tx1"/>
+                </a:solidFill>
+                <a:latin typeface="Times New Roman"/>
+                <a:cs typeface="Times New Roman"/>
+              </a:endParaRPr>
+            </a:p>
+          </p:txBody>
+        </p:sp>
+        <p:sp>
+          <p:nvSpPr>
+            <p:cNvPr id="154" name="Left Brace 153"/>
+            <p:cNvSpPr/>
+            <p:nvPr/>
+          </p:nvSpPr>
+          <p:spPr>
+            <a:xfrm rot="16200000">
+              <a:off x="6018276" y="-2212332"/>
+              <a:ext cx="155448" cy="9722282"/>
+            </a:xfrm>
+            <a:prstGeom prst="leftBrace">
+              <a:avLst/>
+            </a:prstGeom>
+            <a:ln w="12700">
+              <a:solidFill>
+                <a:schemeClr val="tx1"/>
+              </a:solidFill>
+            </a:ln>
+          </p:spPr>
+          <p:style>
+            <a:lnRef idx="1">
+              <a:schemeClr val="accent1"/>
+            </a:lnRef>
+            <a:fillRef idx="0">
+              <a:schemeClr val="accent1"/>
+            </a:fillRef>
+            <a:effectRef idx="0">
+              <a:schemeClr val="accent1"/>
+            </a:effectRef>
+            <a:fontRef idx="minor">
+              <a:schemeClr val="tx1"/>
+            </a:fontRef>
+          </p:style>
+          <p:txBody>
+            <a:bodyPr rtlCol="0" anchor="ctr"/>
+            <a:lstStyle/>
+            <a:p>
+              <a:pPr algn="r"/>
+              <a:endParaRPr lang="en-US" dirty="0"/>
+            </a:p>
+          </p:txBody>
+        </p:sp>
+        <p:sp>
+          <p:nvSpPr>
+            <p:cNvPr id="10" name="Rectangle 9"/>
+            <p:cNvSpPr/>
+            <p:nvPr/>
+          </p:nvSpPr>
+          <p:spPr>
+            <a:xfrm>
+              <a:off x="3727195" y="3417093"/>
+              <a:ext cx="1066800" cy="593513"/>
+            </a:xfrm>
+            <a:prstGeom prst="rect">
+              <a:avLst/>
+            </a:prstGeom>
+            <a:solidFill>
+              <a:schemeClr val="bg1">
+                <a:lumMod val="95000"/>
+              </a:schemeClr>
+            </a:solidFill>
+            <a:ln>
+              <a:solidFill>
+                <a:schemeClr val="tx1"/>
+              </a:solidFill>
+            </a:ln>
+          </p:spPr>
+          <p:style>
+            <a:lnRef idx="2">
+              <a:schemeClr val="accent1">
+                <a:shade val="50000"/>
+              </a:schemeClr>
+            </a:lnRef>
+            <a:fillRef idx="1">
+              <a:schemeClr val="accent1"/>
+            </a:fillRef>
+            <a:effectRef idx="0">
+              <a:schemeClr val="accent1"/>
+            </a:effectRef>
+            <a:fontRef idx="minor">
+              <a:schemeClr val="lt1"/>
+            </a:fontRef>
+          </p:style>
+          <p:txBody>
+            <a:bodyPr rtlCol="0" anchor="ctr"/>
+            <a:lstStyle/>
+            <a:p>
+              <a:pPr algn="ctr"/>
+              <a:endParaRPr lang="en-US" dirty="0">
+                <a:solidFill>
+                  <a:schemeClr val="tx1"/>
+                </a:solidFill>
+                <a:latin typeface="Times New Roman"/>
+                <a:cs typeface="Times New Roman"/>
+              </a:endParaRPr>
+            </a:p>
+          </p:txBody>
+        </p:sp>
+        <p:sp>
+          <p:nvSpPr>
+            <p:cNvPr id="11" name="Rectangle 10"/>
+            <p:cNvSpPr/>
+            <p:nvPr/>
+          </p:nvSpPr>
+          <p:spPr>
+            <a:xfrm>
+              <a:off x="4793995" y="3417093"/>
+              <a:ext cx="762000" cy="593513"/>
+            </a:xfrm>
+            <a:prstGeom prst="rect">
+              <a:avLst/>
+            </a:prstGeom>
+            <a:solidFill>
+              <a:schemeClr val="bg1">
+                <a:lumMod val="95000"/>
+              </a:schemeClr>
+            </a:solidFill>
+            <a:ln>
+              <a:solidFill>
+                <a:schemeClr val="tx1"/>
+              </a:solidFill>
+            </a:ln>
+          </p:spPr>
+          <p:style>
+            <a:lnRef idx="2">
+              <a:schemeClr val="accent1">
+                <a:shade val="50000"/>
+              </a:schemeClr>
+            </a:lnRef>
+            <a:fillRef idx="1">
+              <a:schemeClr val="accent1"/>
+            </a:fillRef>
+            <a:effectRef idx="0">
+              <a:schemeClr val="accent1"/>
+            </a:effectRef>
+            <a:fontRef idx="minor">
+              <a:schemeClr val="lt1"/>
+            </a:fontRef>
+          </p:style>
+          <p:txBody>
+            <a:bodyPr rtlCol="0" anchor="ctr"/>
+            <a:lstStyle/>
+            <a:p>
+              <a:pPr algn="ctr"/>
+              <a:r>
+                <a:rPr lang="en-US" dirty="0">
+                  <a:solidFill>
+                    <a:schemeClr val="tx1"/>
+                  </a:solidFill>
+                  <a:latin typeface="Times New Roman"/>
+                  <a:cs typeface="Times New Roman"/>
+                </a:rPr>
+                <a:t>ASM</a:t>
+              </a:r>
+            </a:p>
+          </p:txBody>
+        </p:sp>
+        <p:sp>
+          <p:nvSpPr>
+            <p:cNvPr id="12" name="Rectangle 11"/>
+            <p:cNvSpPr/>
+            <p:nvPr/>
+          </p:nvSpPr>
+          <p:spPr>
+            <a:xfrm>
+              <a:off x="5555995" y="3417093"/>
+              <a:ext cx="1828800" cy="593513"/>
+            </a:xfrm>
+            <a:prstGeom prst="rect">
+              <a:avLst/>
+            </a:prstGeom>
+            <a:solidFill>
+              <a:schemeClr val="bg1">
+                <a:lumMod val="95000"/>
+              </a:schemeClr>
+            </a:solidFill>
+            <a:ln>
+              <a:solidFill>
+                <a:schemeClr val="tx1"/>
+              </a:solidFill>
+            </a:ln>
+          </p:spPr>
+          <p:style>
+            <a:lnRef idx="2">
+              <a:schemeClr val="accent1">
+                <a:shade val="50000"/>
+              </a:schemeClr>
+            </a:lnRef>
+            <a:fillRef idx="1">
+              <a:schemeClr val="accent1"/>
+            </a:fillRef>
+            <a:effectRef idx="0">
+              <a:schemeClr val="accent1"/>
+            </a:effectRef>
+            <a:fontRef idx="minor">
+              <a:schemeClr val="lt1"/>
+            </a:fontRef>
+          </p:style>
+          <p:txBody>
+            <a:bodyPr rtlCol="0" anchor="ctr"/>
+            <a:lstStyle/>
+            <a:p>
+              <a:pPr algn="ctr"/>
+              <a:r>
+                <a:rPr lang="en-US" dirty="0" smtClean="0">
+                  <a:solidFill>
+                    <a:schemeClr val="tx1"/>
+                  </a:solidFill>
+                  <a:latin typeface="Times New Roman"/>
+                  <a:cs typeface="Times New Roman"/>
+                </a:rPr>
+                <a:t>Data</a:t>
+              </a:r>
+              <a:endParaRPr lang="en-US" dirty="0">
+                <a:solidFill>
+                  <a:schemeClr val="tx1"/>
+                </a:solidFill>
+                <a:latin typeface="Times New Roman"/>
+                <a:cs typeface="Times New Roman"/>
+              </a:endParaRPr>
+            </a:p>
+          </p:txBody>
+        </p:sp>
+        <p:sp>
+          <p:nvSpPr>
+            <p:cNvPr id="13" name="Rectangle 12"/>
+            <p:cNvSpPr/>
+            <p:nvPr/>
+          </p:nvSpPr>
+          <p:spPr>
+            <a:xfrm>
+              <a:off x="7384795" y="3417093"/>
+              <a:ext cx="1066800" cy="593513"/>
+            </a:xfrm>
+            <a:prstGeom prst="rect">
+              <a:avLst/>
+            </a:prstGeom>
+            <a:solidFill>
+              <a:schemeClr val="bg1">
+                <a:lumMod val="95000"/>
+              </a:schemeClr>
+            </a:solidFill>
+            <a:ln>
+              <a:solidFill>
+                <a:schemeClr val="tx1"/>
+              </a:solidFill>
+            </a:ln>
+          </p:spPr>
+          <p:style>
+            <a:lnRef idx="2">
+              <a:schemeClr val="accent1">
+                <a:shade val="50000"/>
+              </a:schemeClr>
+            </a:lnRef>
+            <a:fillRef idx="1">
+              <a:schemeClr val="accent1"/>
+            </a:fillRef>
+            <a:effectRef idx="0">
+              <a:schemeClr val="accent1"/>
+            </a:effectRef>
+            <a:fontRef idx="minor">
+              <a:schemeClr val="lt1"/>
+            </a:fontRef>
+          </p:style>
+          <p:txBody>
+            <a:bodyPr rtlCol="0" anchor="ctr"/>
+            <a:lstStyle/>
+            <a:p>
+              <a:pPr algn="ctr"/>
+              <a:r>
+                <a:rPr lang="en-US" dirty="0" smtClean="0">
+                  <a:solidFill>
+                    <a:schemeClr val="tx1"/>
+                  </a:solidFill>
+                  <a:latin typeface="Times New Roman"/>
+                  <a:cs typeface="Times New Roman"/>
+                </a:rPr>
+                <a:t>Preamble</a:t>
+              </a:r>
+              <a:endParaRPr lang="en-US" dirty="0">
+                <a:solidFill>
+                  <a:schemeClr val="tx1"/>
+                </a:solidFill>
+                <a:latin typeface="Times New Roman"/>
+                <a:cs typeface="Times New Roman"/>
+              </a:endParaRPr>
+            </a:p>
+          </p:txBody>
+        </p:sp>
+        <p:sp>
+          <p:nvSpPr>
+            <p:cNvPr id="14" name="Rectangle 13"/>
+            <p:cNvSpPr/>
+            <p:nvPr/>
+          </p:nvSpPr>
+          <p:spPr>
+            <a:xfrm>
+              <a:off x="8451595" y="3417093"/>
+              <a:ext cx="762000" cy="593513"/>
+            </a:xfrm>
+            <a:prstGeom prst="rect">
+              <a:avLst/>
+            </a:prstGeom>
+            <a:solidFill>
+              <a:schemeClr val="bg1">
+                <a:lumMod val="95000"/>
+              </a:schemeClr>
+            </a:solidFill>
+            <a:ln>
+              <a:solidFill>
+                <a:schemeClr val="tx1"/>
+              </a:solidFill>
+            </a:ln>
+          </p:spPr>
+          <p:style>
+            <a:lnRef idx="2">
+              <a:schemeClr val="accent1">
+                <a:shade val="50000"/>
+              </a:schemeClr>
+            </a:lnRef>
+            <a:fillRef idx="1">
+              <a:schemeClr val="accent1"/>
+            </a:fillRef>
+            <a:effectRef idx="0">
+              <a:schemeClr val="accent1"/>
+            </a:effectRef>
+            <a:fontRef idx="minor">
+              <a:schemeClr val="lt1"/>
+            </a:fontRef>
+          </p:style>
+          <p:txBody>
+            <a:bodyPr rtlCol="0" anchor="ctr"/>
+            <a:lstStyle/>
+            <a:p>
+              <a:pPr algn="ctr"/>
+              <a:r>
+                <a:rPr lang="en-US" dirty="0" smtClean="0">
+                  <a:solidFill>
+                    <a:schemeClr val="tx1"/>
+                  </a:solidFill>
+                  <a:latin typeface="Times New Roman"/>
+                  <a:cs typeface="Times New Roman"/>
+                </a:rPr>
+                <a:t>ASM</a:t>
+              </a:r>
+              <a:endParaRPr lang="en-US" dirty="0">
+                <a:solidFill>
+                  <a:schemeClr val="tx1"/>
+                </a:solidFill>
+                <a:latin typeface="Times New Roman"/>
+                <a:cs typeface="Times New Roman"/>
+              </a:endParaRPr>
+            </a:p>
+          </p:txBody>
+        </p:sp>
+        <p:grpSp>
+          <p:nvGrpSpPr>
+            <p:cNvPr id="209" name="Group 208"/>
+            <p:cNvGrpSpPr/>
+            <p:nvPr/>
+          </p:nvGrpSpPr>
+          <p:grpSpPr>
+            <a:xfrm>
+              <a:off x="9213595" y="3417093"/>
+              <a:ext cx="1295400" cy="593514"/>
+              <a:chOff x="9213595" y="3417093"/>
+              <a:chExt cx="1295400" cy="593514"/>
+            </a:xfrm>
+          </p:grpSpPr>
+          <p:sp>
+            <p:nvSpPr>
+              <p:cNvPr id="15" name="Document 10 1 1"/>
+              <p:cNvSpPr/>
+              <p:nvPr/>
+            </p:nvSpPr>
+            <p:spPr>
+              <a:xfrm rot="16200000">
+                <a:off x="9564538" y="3066150"/>
+                <a:ext cx="593514" cy="1295400"/>
+              </a:xfrm>
+              <a:prstGeom prst="flowChartDocument">
+                <a:avLst/>
+              </a:prstGeom>
+              <a:solidFill>
+                <a:schemeClr val="bg1">
+                  <a:lumMod val="95000"/>
+                </a:schemeClr>
+              </a:solidFill>
+              <a:ln w="12700" cmpd="sng">
+                <a:solidFill>
+                  <a:schemeClr val="tx1"/>
+                </a:solidFill>
+              </a:ln>
+              <a:effectLst/>
+            </p:spPr>
+            <p:style>
+              <a:lnRef idx="1">
+                <a:schemeClr val="accent1"/>
+              </a:lnRef>
+              <a:fillRef idx="3">
+                <a:schemeClr val="accent1"/>
+              </a:fillRef>
+              <a:effectRef idx="2">
+                <a:schemeClr val="accent1"/>
+              </a:effectRef>
+              <a:fontRef idx="minor">
+                <a:schemeClr val="lt1"/>
+              </a:fontRef>
+            </p:style>
+            <p:txBody>
+              <a:bodyPr vert="vert" rtlCol="0" anchor="ctr"/>
+              <a:lstStyle/>
+              <a:p>
+                <a:pPr algn="ctr"/>
+                <a:endParaRPr lang="en-US" sz="1200" dirty="0">
+                  <a:solidFill>
+                    <a:schemeClr val="tx1"/>
+                  </a:solidFill>
+                  <a:latin typeface="Times New Roman"/>
+                  <a:cs typeface="Times New Roman"/>
+                </a:endParaRPr>
+              </a:p>
+            </p:txBody>
+          </p:sp>
+          <p:sp>
+            <p:nvSpPr>
+              <p:cNvPr id="16" name="Rectangle 15"/>
+              <p:cNvSpPr/>
+              <p:nvPr/>
+            </p:nvSpPr>
+            <p:spPr>
+              <a:xfrm>
+                <a:off x="9550954" y="3529184"/>
+                <a:ext cx="620683" cy="369332"/>
+              </a:xfrm>
+              <a:prstGeom prst="rect">
+                <a:avLst/>
+              </a:prstGeom>
+            </p:spPr>
+            <p:txBody>
+              <a:bodyPr wrap="none">
+                <a:spAutoFit/>
+              </a:bodyPr>
+              <a:lstStyle/>
+              <a:p>
+                <a:pPr algn="ctr"/>
+                <a:r>
+                  <a:rPr lang="en-US" dirty="0" smtClean="0">
+                    <a:latin typeface="Times New Roman"/>
+                    <a:cs typeface="Times New Roman"/>
+                  </a:rPr>
+                  <a:t>Data</a:t>
+                </a:r>
+                <a:endParaRPr lang="en-US" dirty="0">
+                  <a:latin typeface="Times New Roman"/>
+                  <a:cs typeface="Times New Roman"/>
+                </a:endParaRPr>
+              </a:p>
+            </p:txBody>
+          </p:sp>
+        </p:grpSp>
+        <p:grpSp>
+          <p:nvGrpSpPr>
+            <p:cNvPr id="210" name="Group 209"/>
+            <p:cNvGrpSpPr/>
+            <p:nvPr/>
+          </p:nvGrpSpPr>
+          <p:grpSpPr>
+            <a:xfrm>
+              <a:off x="2431795" y="3417093"/>
+              <a:ext cx="1295400" cy="593514"/>
+              <a:chOff x="2431795" y="3417093"/>
+              <a:chExt cx="1295400" cy="593514"/>
+            </a:xfrm>
+          </p:grpSpPr>
+          <p:sp>
+            <p:nvSpPr>
+              <p:cNvPr id="17" name="Document 10 1 2"/>
+              <p:cNvSpPr/>
+              <p:nvPr/>
+            </p:nvSpPr>
+            <p:spPr>
+              <a:xfrm rot="5400000" flipH="1">
+                <a:off x="2782738" y="3066150"/>
+                <a:ext cx="593514" cy="1295400"/>
+              </a:xfrm>
+              <a:prstGeom prst="flowChartDocument">
+                <a:avLst/>
+              </a:prstGeom>
+              <a:solidFill>
+                <a:schemeClr val="bg1">
+                  <a:lumMod val="95000"/>
+                </a:schemeClr>
+              </a:solidFill>
+              <a:ln w="12700" cmpd="sng">
+                <a:solidFill>
+                  <a:schemeClr val="tx1"/>
+                </a:solidFill>
+              </a:ln>
+              <a:effectLst/>
+            </p:spPr>
+            <p:style>
+              <a:lnRef idx="1">
+                <a:schemeClr val="accent1"/>
+              </a:lnRef>
+              <a:fillRef idx="3">
+                <a:schemeClr val="accent1"/>
+              </a:fillRef>
+              <a:effectRef idx="2">
+                <a:schemeClr val="accent1"/>
+              </a:effectRef>
+              <a:fontRef idx="minor">
+                <a:schemeClr val="lt1"/>
+              </a:fontRef>
+            </p:style>
+            <p:txBody>
+              <a:bodyPr vert="vert" rtlCol="0" anchor="ctr"/>
+              <a:lstStyle/>
+              <a:p>
+                <a:pPr algn="ctr"/>
+                <a:endParaRPr lang="en-US" sz="1200" dirty="0">
+                  <a:solidFill>
+                    <a:schemeClr val="tx1"/>
+                  </a:solidFill>
+                  <a:latin typeface="Times New Roman"/>
+                  <a:cs typeface="Times New Roman"/>
+                </a:endParaRPr>
+              </a:p>
+            </p:txBody>
+          </p:sp>
+          <p:sp>
+            <p:nvSpPr>
+              <p:cNvPr id="18" name="Rectangle 17"/>
+              <p:cNvSpPr/>
+              <p:nvPr/>
+            </p:nvSpPr>
+            <p:spPr>
+              <a:xfrm>
+                <a:off x="2769154" y="3529184"/>
+                <a:ext cx="620683" cy="369332"/>
+              </a:xfrm>
+              <a:prstGeom prst="rect">
+                <a:avLst/>
+              </a:prstGeom>
+            </p:spPr>
+            <p:txBody>
+              <a:bodyPr wrap="none">
+                <a:spAutoFit/>
+              </a:bodyPr>
+              <a:lstStyle/>
+              <a:p>
+                <a:pPr algn="ctr"/>
+                <a:r>
+                  <a:rPr lang="en-US" dirty="0" smtClean="0">
+                    <a:latin typeface="Times New Roman"/>
+                    <a:cs typeface="Times New Roman"/>
+                  </a:rPr>
+                  <a:t>Data</a:t>
+                </a:r>
+                <a:endParaRPr lang="en-US" dirty="0">
+                  <a:latin typeface="Times New Roman"/>
+                  <a:cs typeface="Times New Roman"/>
+                </a:endParaRPr>
+              </a:p>
+            </p:txBody>
+          </p:sp>
+        </p:grpSp>
+        <p:pic>
+          <p:nvPicPr>
+            <p:cNvPr id="8" name="Picture 7"/>
+            <p:cNvPicPr>
+              <a:picLocks noChangeAspect="1"/>
+            </p:cNvPicPr>
+            <p:nvPr>
+              <p:custDataLst>
+                <p:tags r:id="rId9"/>
+              </p:custDataLst>
+            </p:nvPr>
+          </p:nvPicPr>
+          <p:blipFill>
+            <a:blip r:embed="rId13" cstate="print">
+              <a:extLst>
+                <a:ext uri="{28A0092B-C50C-407E-A947-70E740481C1C}">
+                  <a14:useLocalDpi xmlns:a14="http://schemas.microsoft.com/office/drawing/2010/main" val="0"/>
+                </a:ext>
+              </a:extLst>
+            </a:blip>
+            <a:stretch>
+              <a:fillRect/>
+            </a:stretch>
+          </p:blipFill>
+          <p:spPr>
+            <a:xfrm>
+              <a:off x="2140743" y="3695357"/>
+              <a:ext cx="252952" cy="27429"/>
+            </a:xfrm>
+            <a:prstGeom prst="rect">
+              <a:avLst/>
+            </a:prstGeom>
+          </p:spPr>
+        </p:pic>
+        <p:pic>
+          <p:nvPicPr>
+            <p:cNvPr id="9" name="Picture 8"/>
+            <p:cNvPicPr>
+              <a:picLocks noChangeAspect="1"/>
+            </p:cNvPicPr>
+            <p:nvPr>
+              <p:custDataLst>
+                <p:tags r:id="rId10"/>
+              </p:custDataLst>
+            </p:nvPr>
+          </p:nvPicPr>
+          <p:blipFill>
+            <a:blip r:embed="rId13" cstate="print">
+              <a:extLst>
+                <a:ext uri="{28A0092B-C50C-407E-A947-70E740481C1C}">
+                  <a14:useLocalDpi xmlns:a14="http://schemas.microsoft.com/office/drawing/2010/main" val="0"/>
+                </a:ext>
+              </a:extLst>
+            </a:blip>
+            <a:stretch>
+              <a:fillRect/>
+            </a:stretch>
+          </p:blipFill>
+          <p:spPr>
+            <a:xfrm>
+              <a:off x="10547095" y="3713261"/>
+              <a:ext cx="252952" cy="27429"/>
+            </a:xfrm>
+            <a:prstGeom prst="rect">
+              <a:avLst/>
+            </a:prstGeom>
+          </p:spPr>
+        </p:pic>
+        <p:sp>
+          <p:nvSpPr>
+            <p:cNvPr id="140" name="Rectangle 139"/>
+            <p:cNvSpPr/>
+            <p:nvPr/>
+          </p:nvSpPr>
+          <p:spPr>
+            <a:xfrm>
+              <a:off x="3718305" y="3417093"/>
+              <a:ext cx="137602" cy="593513"/>
+            </a:xfrm>
+            <a:prstGeom prst="rect">
+              <a:avLst/>
+            </a:prstGeom>
+            <a:solidFill>
+              <a:schemeClr val="bg1">
+                <a:lumMod val="95000"/>
+              </a:schemeClr>
+            </a:solidFill>
+            <a:ln>
+              <a:solidFill>
+                <a:schemeClr val="tx1"/>
+              </a:solidFill>
+            </a:ln>
+          </p:spPr>
+          <p:style>
+            <a:lnRef idx="2">
+              <a:schemeClr val="accent1">
+                <a:shade val="50000"/>
+              </a:schemeClr>
+            </a:lnRef>
+            <a:fillRef idx="1">
+              <a:schemeClr val="accent1"/>
+            </a:fillRef>
+            <a:effectRef idx="0">
+              <a:schemeClr val="accent1"/>
+            </a:effectRef>
+            <a:fontRef idx="minor">
+              <a:schemeClr val="lt1"/>
+            </a:fontRef>
+          </p:style>
+          <p:txBody>
+            <a:bodyPr rtlCol="0" anchor="ctr"/>
+            <a:lstStyle/>
+            <a:p>
+              <a:pPr algn="ctr"/>
+              <a:endParaRPr lang="en-US" dirty="0">
+                <a:solidFill>
+                  <a:schemeClr val="tx1"/>
+                </a:solidFill>
+                <a:latin typeface="Times New Roman"/>
+                <a:cs typeface="Times New Roman"/>
+              </a:endParaRPr>
+            </a:p>
+          </p:txBody>
+        </p:sp>
+        <p:sp>
+          <p:nvSpPr>
+            <p:cNvPr id="138" name="Rectangle 137"/>
+            <p:cNvSpPr/>
+            <p:nvPr/>
+          </p:nvSpPr>
+          <p:spPr>
+            <a:xfrm>
+              <a:off x="3855402" y="3417093"/>
+              <a:ext cx="137602" cy="593513"/>
+            </a:xfrm>
+            <a:prstGeom prst="rect">
+              <a:avLst/>
+            </a:prstGeom>
+            <a:solidFill>
+              <a:schemeClr val="bg1">
+                <a:lumMod val="95000"/>
+              </a:schemeClr>
+            </a:solidFill>
+            <a:ln>
+              <a:solidFill>
+                <a:schemeClr val="tx1"/>
+              </a:solidFill>
+            </a:ln>
+          </p:spPr>
+          <p:style>
+            <a:lnRef idx="2">
+              <a:schemeClr val="accent1">
+                <a:shade val="50000"/>
+              </a:schemeClr>
+            </a:lnRef>
+            <a:fillRef idx="1">
+              <a:schemeClr val="accent1"/>
+            </a:fillRef>
+            <a:effectRef idx="0">
+              <a:schemeClr val="accent1"/>
+            </a:effectRef>
+            <a:fontRef idx="minor">
+              <a:schemeClr val="lt1"/>
+            </a:fontRef>
+          </p:style>
+          <p:txBody>
+            <a:bodyPr rtlCol="0" anchor="ctr"/>
+            <a:lstStyle/>
+            <a:p>
+              <a:pPr algn="ctr"/>
+              <a:endParaRPr lang="en-US" dirty="0">
+                <a:solidFill>
+                  <a:schemeClr val="tx1"/>
+                </a:solidFill>
+                <a:latin typeface="Times New Roman"/>
+                <a:cs typeface="Times New Roman"/>
+              </a:endParaRPr>
+            </a:p>
+          </p:txBody>
+        </p:sp>
+        <p:sp>
+          <p:nvSpPr>
+            <p:cNvPr id="136" name="Rectangle 135"/>
+            <p:cNvSpPr/>
+            <p:nvPr/>
+          </p:nvSpPr>
+          <p:spPr>
+            <a:xfrm>
+              <a:off x="3992499" y="3417093"/>
+              <a:ext cx="137602" cy="593513"/>
+            </a:xfrm>
+            <a:prstGeom prst="rect">
+              <a:avLst/>
+            </a:prstGeom>
+            <a:solidFill>
+              <a:schemeClr val="bg1">
+                <a:lumMod val="95000"/>
+              </a:schemeClr>
+            </a:solidFill>
+            <a:ln>
+              <a:solidFill>
+                <a:schemeClr val="tx1"/>
+              </a:solidFill>
+            </a:ln>
+          </p:spPr>
+          <p:style>
+            <a:lnRef idx="2">
+              <a:schemeClr val="accent1">
+                <a:shade val="50000"/>
+              </a:schemeClr>
+            </a:lnRef>
+            <a:fillRef idx="1">
+              <a:schemeClr val="accent1"/>
+            </a:fillRef>
+            <a:effectRef idx="0">
+              <a:schemeClr val="accent1"/>
+            </a:effectRef>
+            <a:fontRef idx="minor">
+              <a:schemeClr val="lt1"/>
+            </a:fontRef>
+          </p:style>
+          <p:txBody>
+            <a:bodyPr rtlCol="0" anchor="ctr"/>
+            <a:lstStyle/>
+            <a:p>
+              <a:pPr algn="ctr"/>
+              <a:endParaRPr lang="en-US" dirty="0">
+                <a:solidFill>
+                  <a:schemeClr val="tx1"/>
+                </a:solidFill>
+                <a:latin typeface="Times New Roman"/>
+                <a:cs typeface="Times New Roman"/>
+              </a:endParaRPr>
+            </a:p>
+          </p:txBody>
+        </p:sp>
+        <p:sp>
+          <p:nvSpPr>
+            <p:cNvPr id="134" name="Rectangle 133"/>
+            <p:cNvSpPr/>
+            <p:nvPr/>
+          </p:nvSpPr>
+          <p:spPr>
+            <a:xfrm>
+              <a:off x="4129596" y="3417093"/>
+              <a:ext cx="137602" cy="593513"/>
+            </a:xfrm>
+            <a:prstGeom prst="rect">
+              <a:avLst/>
+            </a:prstGeom>
+            <a:solidFill>
+              <a:schemeClr val="bg1">
+                <a:lumMod val="95000"/>
+              </a:schemeClr>
+            </a:solidFill>
+            <a:ln>
+              <a:solidFill>
+                <a:schemeClr val="tx1"/>
+              </a:solidFill>
+            </a:ln>
+          </p:spPr>
+          <p:style>
+            <a:lnRef idx="2">
+              <a:schemeClr val="accent1">
+                <a:shade val="50000"/>
+              </a:schemeClr>
+            </a:lnRef>
+            <a:fillRef idx="1">
+              <a:schemeClr val="accent1"/>
+            </a:fillRef>
+            <a:effectRef idx="0">
+              <a:schemeClr val="accent1"/>
+            </a:effectRef>
+            <a:fontRef idx="minor">
+              <a:schemeClr val="lt1"/>
+            </a:fontRef>
+          </p:style>
+          <p:txBody>
+            <a:bodyPr rtlCol="0" anchor="ctr"/>
+            <a:lstStyle/>
+            <a:p>
+              <a:pPr algn="ctr"/>
+              <a:endParaRPr lang="en-US" dirty="0">
+                <a:solidFill>
+                  <a:schemeClr val="tx1"/>
+                </a:solidFill>
+                <a:latin typeface="Times New Roman"/>
+                <a:cs typeface="Times New Roman"/>
+              </a:endParaRPr>
+            </a:p>
+          </p:txBody>
+        </p:sp>
+        <p:sp>
+          <p:nvSpPr>
+            <p:cNvPr id="132" name="Rectangle 131"/>
+            <p:cNvSpPr/>
+            <p:nvPr/>
+          </p:nvSpPr>
+          <p:spPr>
+            <a:xfrm>
+              <a:off x="4266693" y="3417093"/>
+              <a:ext cx="137602" cy="593513"/>
+            </a:xfrm>
+            <a:prstGeom prst="rect">
+              <a:avLst/>
+            </a:prstGeom>
+            <a:solidFill>
+              <a:schemeClr val="bg1">
+                <a:lumMod val="95000"/>
+              </a:schemeClr>
+            </a:solidFill>
+            <a:ln>
+              <a:solidFill>
+                <a:schemeClr val="tx1"/>
+              </a:solidFill>
+            </a:ln>
+          </p:spPr>
+          <p:style>
+            <a:lnRef idx="2">
+              <a:schemeClr val="accent1">
+                <a:shade val="50000"/>
+              </a:schemeClr>
+            </a:lnRef>
+            <a:fillRef idx="1">
+              <a:schemeClr val="accent1"/>
+            </a:fillRef>
+            <a:effectRef idx="0">
+              <a:schemeClr val="accent1"/>
+            </a:effectRef>
+            <a:fontRef idx="minor">
+              <a:schemeClr val="lt1"/>
+            </a:fontRef>
+          </p:style>
+          <p:txBody>
+            <a:bodyPr rtlCol="0" anchor="ctr"/>
+            <a:lstStyle/>
+            <a:p>
+              <a:pPr algn="ctr"/>
+              <a:endParaRPr lang="en-US" dirty="0">
+                <a:solidFill>
+                  <a:schemeClr val="tx1"/>
+                </a:solidFill>
+                <a:latin typeface="Times New Roman"/>
+                <a:cs typeface="Times New Roman"/>
+              </a:endParaRPr>
+            </a:p>
+          </p:txBody>
+        </p:sp>
+        <p:sp>
+          <p:nvSpPr>
+            <p:cNvPr id="130" name="Rectangle 129"/>
+            <p:cNvSpPr/>
+            <p:nvPr/>
+          </p:nvSpPr>
+          <p:spPr>
+            <a:xfrm>
+              <a:off x="4403789" y="3417093"/>
+              <a:ext cx="137602" cy="593513"/>
+            </a:xfrm>
+            <a:prstGeom prst="rect">
+              <a:avLst/>
+            </a:prstGeom>
+            <a:solidFill>
+              <a:schemeClr val="bg1">
+                <a:lumMod val="95000"/>
+              </a:schemeClr>
+            </a:solidFill>
+            <a:ln>
+              <a:solidFill>
+                <a:schemeClr val="tx1"/>
+              </a:solidFill>
+            </a:ln>
+          </p:spPr>
+          <p:style>
+            <a:lnRef idx="2">
+              <a:schemeClr val="accent1">
+                <a:shade val="50000"/>
+              </a:schemeClr>
+            </a:lnRef>
+            <a:fillRef idx="1">
+              <a:schemeClr val="accent1"/>
+            </a:fillRef>
+            <a:effectRef idx="0">
+              <a:schemeClr val="accent1"/>
+            </a:effectRef>
+            <a:fontRef idx="minor">
+              <a:schemeClr val="lt1"/>
+            </a:fontRef>
+          </p:style>
+          <p:txBody>
+            <a:bodyPr rtlCol="0" anchor="ctr"/>
+            <a:lstStyle/>
+            <a:p>
+              <a:pPr algn="ctr"/>
+              <a:endParaRPr lang="en-US" dirty="0">
+                <a:solidFill>
+                  <a:schemeClr val="tx1"/>
+                </a:solidFill>
+                <a:latin typeface="Times New Roman"/>
+                <a:cs typeface="Times New Roman"/>
+              </a:endParaRPr>
+            </a:p>
+          </p:txBody>
+        </p:sp>
+        <p:sp>
+          <p:nvSpPr>
+            <p:cNvPr id="128" name="Rectangle 127"/>
+            <p:cNvSpPr/>
+            <p:nvPr/>
+          </p:nvSpPr>
+          <p:spPr>
+            <a:xfrm>
+              <a:off x="4540886" y="3417093"/>
+              <a:ext cx="137602" cy="593513"/>
+            </a:xfrm>
+            <a:prstGeom prst="rect">
+              <a:avLst/>
+            </a:prstGeom>
+            <a:solidFill>
+              <a:schemeClr val="bg1">
+                <a:lumMod val="95000"/>
+              </a:schemeClr>
+            </a:solidFill>
+            <a:ln>
+              <a:solidFill>
+                <a:schemeClr val="tx1"/>
+              </a:solidFill>
+            </a:ln>
+          </p:spPr>
+          <p:style>
+            <a:lnRef idx="2">
+              <a:schemeClr val="accent1">
+                <a:shade val="50000"/>
+              </a:schemeClr>
+            </a:lnRef>
+            <a:fillRef idx="1">
+              <a:schemeClr val="accent1"/>
+            </a:fillRef>
+            <a:effectRef idx="0">
+              <a:schemeClr val="accent1"/>
+            </a:effectRef>
+            <a:fontRef idx="minor">
+              <a:schemeClr val="lt1"/>
+            </a:fontRef>
+          </p:style>
+          <p:txBody>
+            <a:bodyPr rtlCol="0" anchor="ctr"/>
+            <a:lstStyle/>
+            <a:p>
+              <a:pPr algn="ctr"/>
+              <a:endParaRPr lang="en-US" dirty="0">
+                <a:solidFill>
+                  <a:schemeClr val="tx1"/>
+                </a:solidFill>
+                <a:latin typeface="Times New Roman"/>
+                <a:cs typeface="Times New Roman"/>
+              </a:endParaRPr>
+            </a:p>
+          </p:txBody>
+        </p:sp>
+        <p:sp>
+          <p:nvSpPr>
+            <p:cNvPr id="126" name="Rectangle 125"/>
+            <p:cNvSpPr/>
+            <p:nvPr/>
+          </p:nvSpPr>
+          <p:spPr>
+            <a:xfrm>
+              <a:off x="4677983" y="3417093"/>
+              <a:ext cx="137602" cy="593513"/>
+            </a:xfrm>
+            <a:prstGeom prst="rect">
+              <a:avLst/>
+            </a:prstGeom>
+            <a:solidFill>
+              <a:schemeClr val="bg1">
+                <a:lumMod val="95000"/>
+              </a:schemeClr>
+            </a:solidFill>
+            <a:ln>
+              <a:solidFill>
+                <a:schemeClr val="tx1"/>
+              </a:solidFill>
+            </a:ln>
+          </p:spPr>
+          <p:style>
+            <a:lnRef idx="2">
+              <a:schemeClr val="accent1">
+                <a:shade val="50000"/>
+              </a:schemeClr>
+            </a:lnRef>
+            <a:fillRef idx="1">
+              <a:schemeClr val="accent1"/>
+            </a:fillRef>
+            <a:effectRef idx="0">
+              <a:schemeClr val="accent1"/>
+            </a:effectRef>
+            <a:fontRef idx="minor">
+              <a:schemeClr val="lt1"/>
+            </a:fontRef>
+          </p:style>
+          <p:txBody>
+            <a:bodyPr rtlCol="0" anchor="ctr"/>
+            <a:lstStyle/>
+            <a:p>
+              <a:pPr algn="ctr"/>
+              <a:endParaRPr lang="en-US" dirty="0">
+                <a:solidFill>
+                  <a:schemeClr val="tx1"/>
+                </a:solidFill>
+                <a:latin typeface="Times New Roman"/>
+                <a:cs typeface="Times New Roman"/>
+              </a:endParaRPr>
+            </a:p>
+          </p:txBody>
+        </p:sp>
+        <p:sp>
+          <p:nvSpPr>
+            <p:cNvPr id="146" name="Rectangle 145"/>
+            <p:cNvSpPr/>
+            <p:nvPr/>
+          </p:nvSpPr>
+          <p:spPr>
+            <a:xfrm>
+              <a:off x="7375905" y="3417093"/>
+              <a:ext cx="137602" cy="593513"/>
+            </a:xfrm>
+            <a:prstGeom prst="rect">
+              <a:avLst/>
+            </a:prstGeom>
+            <a:solidFill>
+              <a:schemeClr val="bg1">
+                <a:lumMod val="95000"/>
+              </a:schemeClr>
+            </a:solidFill>
+            <a:ln>
+              <a:solidFill>
+                <a:schemeClr val="tx1"/>
+              </a:solidFill>
+            </a:ln>
+          </p:spPr>
+          <p:style>
+            <a:lnRef idx="2">
+              <a:schemeClr val="accent1">
+                <a:shade val="50000"/>
+              </a:schemeClr>
+            </a:lnRef>
+            <a:fillRef idx="1">
+              <a:schemeClr val="accent1"/>
+            </a:fillRef>
+            <a:effectRef idx="0">
+              <a:schemeClr val="accent1"/>
+            </a:effectRef>
+            <a:fontRef idx="minor">
+              <a:schemeClr val="lt1"/>
+            </a:fontRef>
+          </p:style>
+          <p:txBody>
+            <a:bodyPr rtlCol="0" anchor="ctr"/>
+            <a:lstStyle/>
+            <a:p>
+              <a:pPr algn="ctr"/>
+              <a:endParaRPr lang="en-US" dirty="0">
+                <a:solidFill>
+                  <a:schemeClr val="tx1"/>
+                </a:solidFill>
+                <a:latin typeface="Times New Roman"/>
+                <a:cs typeface="Times New Roman"/>
+              </a:endParaRPr>
+            </a:p>
+          </p:txBody>
+        </p:sp>
+        <p:sp>
+          <p:nvSpPr>
+            <p:cNvPr id="147" name="Rectangle 146"/>
+            <p:cNvSpPr/>
+            <p:nvPr/>
+          </p:nvSpPr>
+          <p:spPr>
+            <a:xfrm>
+              <a:off x="7513002" y="3417093"/>
+              <a:ext cx="137602" cy="593513"/>
+            </a:xfrm>
+            <a:prstGeom prst="rect">
+              <a:avLst/>
+            </a:prstGeom>
+            <a:solidFill>
+              <a:schemeClr val="bg1">
+                <a:lumMod val="95000"/>
+              </a:schemeClr>
+            </a:solidFill>
+            <a:ln>
+              <a:solidFill>
+                <a:schemeClr val="tx1"/>
+              </a:solidFill>
+            </a:ln>
+          </p:spPr>
+          <p:style>
+            <a:lnRef idx="2">
+              <a:schemeClr val="accent1">
+                <a:shade val="50000"/>
+              </a:schemeClr>
+            </a:lnRef>
+            <a:fillRef idx="1">
+              <a:schemeClr val="accent1"/>
+            </a:fillRef>
+            <a:effectRef idx="0">
+              <a:schemeClr val="accent1"/>
+            </a:effectRef>
+            <a:fontRef idx="minor">
+              <a:schemeClr val="lt1"/>
+            </a:fontRef>
+          </p:style>
+          <p:txBody>
+            <a:bodyPr rtlCol="0" anchor="ctr"/>
+            <a:lstStyle/>
+            <a:p>
+              <a:pPr algn="ctr"/>
+              <a:endParaRPr lang="en-US" dirty="0">
+                <a:solidFill>
+                  <a:schemeClr val="tx1"/>
+                </a:solidFill>
+                <a:latin typeface="Times New Roman"/>
+                <a:cs typeface="Times New Roman"/>
+              </a:endParaRPr>
+            </a:p>
+          </p:txBody>
+        </p:sp>
+        <p:sp>
+          <p:nvSpPr>
+            <p:cNvPr id="148" name="Rectangle 147"/>
+            <p:cNvSpPr/>
+            <p:nvPr/>
+          </p:nvSpPr>
+          <p:spPr>
+            <a:xfrm>
+              <a:off x="7650099" y="3417093"/>
+              <a:ext cx="137602" cy="593513"/>
+            </a:xfrm>
+            <a:prstGeom prst="rect">
+              <a:avLst/>
+            </a:prstGeom>
+            <a:solidFill>
+              <a:schemeClr val="bg1">
+                <a:lumMod val="95000"/>
+              </a:schemeClr>
+            </a:solidFill>
+            <a:ln>
+              <a:solidFill>
+                <a:schemeClr val="tx1"/>
+              </a:solidFill>
+            </a:ln>
+          </p:spPr>
+          <p:style>
+            <a:lnRef idx="2">
+              <a:schemeClr val="accent1">
+                <a:shade val="50000"/>
+              </a:schemeClr>
+            </a:lnRef>
+            <a:fillRef idx="1">
+              <a:schemeClr val="accent1"/>
+            </a:fillRef>
+            <a:effectRef idx="0">
+              <a:schemeClr val="accent1"/>
+            </a:effectRef>
+            <a:fontRef idx="minor">
+              <a:schemeClr val="lt1"/>
+            </a:fontRef>
+          </p:style>
+          <p:txBody>
+            <a:bodyPr rtlCol="0" anchor="ctr"/>
+            <a:lstStyle/>
+            <a:p>
+              <a:pPr algn="ctr"/>
+              <a:endParaRPr lang="en-US" dirty="0">
+                <a:solidFill>
+                  <a:schemeClr val="tx1"/>
+                </a:solidFill>
+                <a:latin typeface="Times New Roman"/>
+                <a:cs typeface="Times New Roman"/>
+              </a:endParaRPr>
+            </a:p>
+          </p:txBody>
+        </p:sp>
+        <p:sp>
+          <p:nvSpPr>
+            <p:cNvPr id="149" name="Rectangle 148"/>
+            <p:cNvSpPr/>
+            <p:nvPr/>
+          </p:nvSpPr>
+          <p:spPr>
+            <a:xfrm>
+              <a:off x="7787196" y="3417093"/>
+              <a:ext cx="137602" cy="593513"/>
+            </a:xfrm>
+            <a:prstGeom prst="rect">
+              <a:avLst/>
+            </a:prstGeom>
+            <a:solidFill>
+              <a:schemeClr val="bg1">
+                <a:lumMod val="95000"/>
+              </a:schemeClr>
+            </a:solidFill>
+            <a:ln>
+              <a:solidFill>
+                <a:schemeClr val="tx1"/>
+              </a:solidFill>
+            </a:ln>
+          </p:spPr>
+          <p:style>
+            <a:lnRef idx="2">
+              <a:schemeClr val="accent1">
+                <a:shade val="50000"/>
+              </a:schemeClr>
+            </a:lnRef>
+            <a:fillRef idx="1">
+              <a:schemeClr val="accent1"/>
+            </a:fillRef>
+            <a:effectRef idx="0">
+              <a:schemeClr val="accent1"/>
+            </a:effectRef>
+            <a:fontRef idx="minor">
+              <a:schemeClr val="lt1"/>
+            </a:fontRef>
+          </p:style>
+          <p:txBody>
+            <a:bodyPr rtlCol="0" anchor="ctr"/>
+            <a:lstStyle/>
+            <a:p>
+              <a:pPr algn="ctr"/>
+              <a:endParaRPr lang="en-US" dirty="0">
+                <a:solidFill>
+                  <a:schemeClr val="tx1"/>
+                </a:solidFill>
+                <a:latin typeface="Times New Roman"/>
+                <a:cs typeface="Times New Roman"/>
+              </a:endParaRPr>
+            </a:p>
+          </p:txBody>
+        </p:sp>
+        <p:sp>
+          <p:nvSpPr>
+            <p:cNvPr id="150" name="Rectangle 149"/>
+            <p:cNvSpPr/>
+            <p:nvPr/>
+          </p:nvSpPr>
+          <p:spPr>
+            <a:xfrm>
+              <a:off x="7924293" y="3417093"/>
+              <a:ext cx="137602" cy="593513"/>
+            </a:xfrm>
+            <a:prstGeom prst="rect">
+              <a:avLst/>
+            </a:prstGeom>
+            <a:solidFill>
+              <a:schemeClr val="bg1">
+                <a:lumMod val="95000"/>
+              </a:schemeClr>
+            </a:solidFill>
+            <a:ln>
+              <a:solidFill>
+                <a:schemeClr val="tx1"/>
+              </a:solidFill>
+            </a:ln>
+          </p:spPr>
+          <p:style>
+            <a:lnRef idx="2">
+              <a:schemeClr val="accent1">
+                <a:shade val="50000"/>
+              </a:schemeClr>
+            </a:lnRef>
+            <a:fillRef idx="1">
+              <a:schemeClr val="accent1"/>
+            </a:fillRef>
+            <a:effectRef idx="0">
+              <a:schemeClr val="accent1"/>
+            </a:effectRef>
+            <a:fontRef idx="minor">
+              <a:schemeClr val="lt1"/>
+            </a:fontRef>
+          </p:style>
+          <p:txBody>
+            <a:bodyPr rtlCol="0" anchor="ctr"/>
+            <a:lstStyle/>
+            <a:p>
+              <a:pPr algn="ctr"/>
+              <a:endParaRPr lang="en-US" dirty="0">
+                <a:solidFill>
+                  <a:schemeClr val="tx1"/>
+                </a:solidFill>
+                <a:latin typeface="Times New Roman"/>
+                <a:cs typeface="Times New Roman"/>
+              </a:endParaRPr>
+            </a:p>
+          </p:txBody>
+        </p:sp>
+        <p:sp>
+          <p:nvSpPr>
+            <p:cNvPr id="151" name="Rectangle 150"/>
+            <p:cNvSpPr/>
+            <p:nvPr/>
+          </p:nvSpPr>
+          <p:spPr>
+            <a:xfrm>
+              <a:off x="8061389" y="3417093"/>
+              <a:ext cx="137602" cy="593513"/>
+            </a:xfrm>
+            <a:prstGeom prst="rect">
+              <a:avLst/>
+            </a:prstGeom>
+            <a:solidFill>
+              <a:schemeClr val="bg1">
+                <a:lumMod val="95000"/>
+              </a:schemeClr>
+            </a:solidFill>
+            <a:ln>
+              <a:solidFill>
+                <a:schemeClr val="tx1"/>
+              </a:solidFill>
+            </a:ln>
+          </p:spPr>
+          <p:style>
+            <a:lnRef idx="2">
+              <a:schemeClr val="accent1">
+                <a:shade val="50000"/>
+              </a:schemeClr>
+            </a:lnRef>
+            <a:fillRef idx="1">
+              <a:schemeClr val="accent1"/>
+            </a:fillRef>
+            <a:effectRef idx="0">
+              <a:schemeClr val="accent1"/>
+            </a:effectRef>
+            <a:fontRef idx="minor">
+              <a:schemeClr val="lt1"/>
+            </a:fontRef>
+          </p:style>
+          <p:txBody>
+            <a:bodyPr rtlCol="0" anchor="ctr"/>
+            <a:lstStyle/>
+            <a:p>
+              <a:pPr algn="ctr"/>
+              <a:endParaRPr lang="en-US" dirty="0">
+                <a:solidFill>
+                  <a:schemeClr val="tx1"/>
+                </a:solidFill>
+                <a:latin typeface="Times New Roman"/>
+                <a:cs typeface="Times New Roman"/>
+              </a:endParaRPr>
+            </a:p>
+          </p:txBody>
+        </p:sp>
+        <p:sp>
+          <p:nvSpPr>
+            <p:cNvPr id="152" name="Rectangle 151"/>
+            <p:cNvSpPr/>
+            <p:nvPr/>
+          </p:nvSpPr>
+          <p:spPr>
+            <a:xfrm>
+              <a:off x="8198486" y="3417093"/>
+              <a:ext cx="137602" cy="593513"/>
+            </a:xfrm>
+            <a:prstGeom prst="rect">
+              <a:avLst/>
+            </a:prstGeom>
+            <a:solidFill>
+              <a:schemeClr val="bg1">
+                <a:lumMod val="95000"/>
+              </a:schemeClr>
+            </a:solidFill>
+            <a:ln>
+              <a:solidFill>
+                <a:schemeClr val="tx1"/>
+              </a:solidFill>
+            </a:ln>
+          </p:spPr>
+          <p:style>
+            <a:lnRef idx="2">
+              <a:schemeClr val="accent1">
+                <a:shade val="50000"/>
+              </a:schemeClr>
+            </a:lnRef>
+            <a:fillRef idx="1">
+              <a:schemeClr val="accent1"/>
+            </a:fillRef>
+            <a:effectRef idx="0">
+              <a:schemeClr val="accent1"/>
+            </a:effectRef>
+            <a:fontRef idx="minor">
+              <a:schemeClr val="lt1"/>
+            </a:fontRef>
+          </p:style>
+          <p:txBody>
+            <a:bodyPr rtlCol="0" anchor="ctr"/>
+            <a:lstStyle/>
+            <a:p>
+              <a:pPr algn="ctr"/>
+              <a:endParaRPr lang="en-US" dirty="0">
+                <a:solidFill>
+                  <a:schemeClr val="tx1"/>
+                </a:solidFill>
+                <a:latin typeface="Times New Roman"/>
+                <a:cs typeface="Times New Roman"/>
+              </a:endParaRPr>
+            </a:p>
+          </p:txBody>
+        </p:sp>
+        <p:sp>
+          <p:nvSpPr>
+            <p:cNvPr id="153" name="Rectangle 152"/>
+            <p:cNvSpPr/>
+            <p:nvPr/>
+          </p:nvSpPr>
+          <p:spPr>
+            <a:xfrm>
+              <a:off x="8335583" y="3417093"/>
+              <a:ext cx="137602" cy="593513"/>
+            </a:xfrm>
+            <a:prstGeom prst="rect">
+              <a:avLst/>
+            </a:prstGeom>
+            <a:solidFill>
+              <a:schemeClr val="bg1">
+                <a:lumMod val="95000"/>
+              </a:schemeClr>
+            </a:solidFill>
+            <a:ln>
+              <a:solidFill>
+                <a:schemeClr val="tx1"/>
+              </a:solidFill>
+            </a:ln>
+          </p:spPr>
+          <p:style>
+            <a:lnRef idx="2">
+              <a:schemeClr val="accent1">
+                <a:shade val="50000"/>
+              </a:schemeClr>
+            </a:lnRef>
+            <a:fillRef idx="1">
+              <a:schemeClr val="accent1"/>
+            </a:fillRef>
+            <a:effectRef idx="0">
+              <a:schemeClr val="accent1"/>
+            </a:effectRef>
+            <a:fontRef idx="minor">
+              <a:schemeClr val="lt1"/>
+            </a:fontRef>
+          </p:style>
+          <p:txBody>
+            <a:bodyPr rtlCol="0" anchor="ctr"/>
+            <a:lstStyle/>
+            <a:p>
+              <a:pPr algn="ctr"/>
+              <a:endParaRPr lang="en-US" dirty="0">
+                <a:solidFill>
+                  <a:schemeClr val="tx1"/>
+                </a:solidFill>
+                <a:latin typeface="Times New Roman"/>
+                <a:cs typeface="Times New Roman"/>
+              </a:endParaRPr>
+            </a:p>
+          </p:txBody>
+        </p:sp>
+        <p:sp>
+          <p:nvSpPr>
+            <p:cNvPr id="155" name="Left Brace 154"/>
+            <p:cNvSpPr/>
+            <p:nvPr/>
+          </p:nvSpPr>
+          <p:spPr>
+            <a:xfrm rot="5400000">
+              <a:off x="4198111" y="2713005"/>
+              <a:ext cx="155448" cy="1097280"/>
+            </a:xfrm>
+            <a:prstGeom prst="leftBrace">
+              <a:avLst/>
+            </a:prstGeom>
+            <a:ln w="12700">
+              <a:solidFill>
+                <a:schemeClr val="tx1"/>
+              </a:solidFill>
+            </a:ln>
+          </p:spPr>
+          <p:style>
+            <a:lnRef idx="1">
+              <a:schemeClr val="accent1"/>
+            </a:lnRef>
+            <a:fillRef idx="0">
+              <a:schemeClr val="accent1"/>
+            </a:fillRef>
+            <a:effectRef idx="0">
+              <a:schemeClr val="accent1"/>
+            </a:effectRef>
+            <a:fontRef idx="minor">
+              <a:schemeClr val="tx1"/>
+            </a:fontRef>
+          </p:style>
+          <p:txBody>
+            <a:bodyPr rtlCol="0" anchor="ctr"/>
+            <a:lstStyle/>
+            <a:p>
+              <a:pPr algn="r"/>
+              <a:endParaRPr lang="en-US" dirty="0"/>
+            </a:p>
+          </p:txBody>
+        </p:sp>
+        <p:sp>
+          <p:nvSpPr>
+            <p:cNvPr id="156" name="Left Brace 155"/>
+            <p:cNvSpPr/>
+            <p:nvPr/>
+          </p:nvSpPr>
+          <p:spPr>
+            <a:xfrm rot="5400000">
+              <a:off x="7843233" y="2713005"/>
+              <a:ext cx="155448" cy="1097280"/>
+            </a:xfrm>
+            <a:prstGeom prst="leftBrace">
+              <a:avLst/>
+            </a:prstGeom>
+            <a:ln w="12700">
+              <a:solidFill>
+                <a:schemeClr val="tx1"/>
+              </a:solidFill>
+            </a:ln>
+          </p:spPr>
+          <p:style>
+            <a:lnRef idx="1">
+              <a:schemeClr val="accent1"/>
+            </a:lnRef>
+            <a:fillRef idx="0">
+              <a:schemeClr val="accent1"/>
+            </a:fillRef>
+            <a:effectRef idx="0">
+              <a:schemeClr val="accent1"/>
+            </a:effectRef>
+            <a:fontRef idx="minor">
+              <a:schemeClr val="tx1"/>
+            </a:fontRef>
+          </p:style>
+          <p:txBody>
+            <a:bodyPr rtlCol="0" anchor="ctr"/>
+            <a:lstStyle/>
+            <a:p>
+              <a:pPr algn="r"/>
+              <a:endParaRPr lang="en-US" dirty="0"/>
+            </a:p>
+          </p:txBody>
+        </p:sp>
+        <p:sp>
+          <p:nvSpPr>
+            <p:cNvPr id="159" name="Left Brace 158"/>
+            <p:cNvSpPr/>
+            <p:nvPr/>
+          </p:nvSpPr>
+          <p:spPr>
+            <a:xfrm rot="16200000">
+              <a:off x="6018400" y="2337381"/>
+              <a:ext cx="155448" cy="3657348"/>
+            </a:xfrm>
+            <a:prstGeom prst="leftBrace">
+              <a:avLst/>
+            </a:prstGeom>
+            <a:ln w="12700">
+              <a:solidFill>
+                <a:schemeClr val="tx1"/>
+              </a:solidFill>
+            </a:ln>
+          </p:spPr>
+          <p:style>
+            <a:lnRef idx="1">
+              <a:schemeClr val="accent1"/>
+            </a:lnRef>
+            <a:fillRef idx="0">
+              <a:schemeClr val="accent1"/>
+            </a:fillRef>
+            <a:effectRef idx="0">
+              <a:schemeClr val="accent1"/>
+            </a:effectRef>
+            <a:fontRef idx="minor">
+              <a:schemeClr val="tx1"/>
+            </a:fontRef>
+          </p:style>
+          <p:txBody>
+            <a:bodyPr rtlCol="0" anchor="ctr"/>
+            <a:lstStyle/>
+            <a:p>
+              <a:pPr algn="r"/>
+              <a:endParaRPr lang="en-US" dirty="0"/>
+            </a:p>
+          </p:txBody>
+        </p:sp>
+        <p:cxnSp>
+          <p:nvCxnSpPr>
+            <p:cNvPr id="167" name="Elbow Connector 166"/>
+            <p:cNvCxnSpPr>
+              <a:stCxn id="154" idx="1"/>
+              <a:endCxn id="155" idx="1"/>
+            </p:cNvCxnSpPr>
+            <p:nvPr/>
+          </p:nvCxnSpPr>
+          <p:spPr>
+            <a:xfrm rot="5400000">
+              <a:off x="4957224" y="2045145"/>
+              <a:ext cx="457388" cy="1820165"/>
+            </a:xfrm>
+            <a:prstGeom prst="bentConnector5">
+              <a:avLst>
+                <a:gd name="adj1" fmla="val 49979"/>
+                <a:gd name="adj2" fmla="val 50000"/>
+                <a:gd name="adj3" fmla="val 50021"/>
+              </a:avLst>
+            </a:prstGeom>
+            <a:ln w="12700">
+              <a:solidFill>
+                <a:schemeClr val="tx1"/>
+              </a:solidFill>
+              <a:tailEnd type="triangle"/>
+            </a:ln>
+          </p:spPr>
+          <p:style>
+            <a:lnRef idx="1">
+              <a:schemeClr val="accent1"/>
+            </a:lnRef>
+            <a:fillRef idx="0">
+              <a:schemeClr val="accent1"/>
+            </a:fillRef>
+            <a:effectRef idx="0">
+              <a:schemeClr val="accent1"/>
+            </a:effectRef>
+            <a:fontRef idx="minor">
+              <a:schemeClr val="tx1"/>
+            </a:fontRef>
+          </p:style>
+        </p:cxnSp>
+        <p:cxnSp>
+          <p:nvCxnSpPr>
+            <p:cNvPr id="169" name="Elbow Connector 168"/>
+            <p:cNvCxnSpPr>
+              <a:stCxn id="154" idx="1"/>
+              <a:endCxn id="156" idx="1"/>
+            </p:cNvCxnSpPr>
+            <p:nvPr/>
+          </p:nvCxnSpPr>
+          <p:spPr>
+            <a:xfrm rot="16200000" flipH="1">
+              <a:off x="6779784" y="2042748"/>
+              <a:ext cx="457388" cy="1824957"/>
+            </a:xfrm>
+            <a:prstGeom prst="bentConnector5">
+              <a:avLst>
+                <a:gd name="adj1" fmla="val 49979"/>
+                <a:gd name="adj2" fmla="val 50000"/>
+                <a:gd name="adj3" fmla="val 50021"/>
+              </a:avLst>
+            </a:prstGeom>
+            <a:ln w="12700">
+              <a:solidFill>
+                <a:schemeClr val="tx1"/>
+              </a:solidFill>
+              <a:tailEnd type="triangle"/>
+            </a:ln>
+          </p:spPr>
+          <p:style>
+            <a:lnRef idx="1">
+              <a:schemeClr val="accent1"/>
+            </a:lnRef>
+            <a:fillRef idx="0">
+              <a:schemeClr val="accent1"/>
+            </a:fillRef>
+            <a:effectRef idx="0">
+              <a:schemeClr val="accent1"/>
+            </a:effectRef>
+            <a:fontRef idx="minor">
+              <a:schemeClr val="tx1"/>
+            </a:fontRef>
+          </p:style>
+        </p:cxnSp>
+        <p:sp>
+          <p:nvSpPr>
+            <p:cNvPr id="173" name="Rectangle 172"/>
+            <p:cNvSpPr/>
+            <p:nvPr/>
+          </p:nvSpPr>
+          <p:spPr>
+            <a:xfrm>
+              <a:off x="4794251" y="4899128"/>
+              <a:ext cx="762000" cy="593513"/>
+            </a:xfrm>
+            <a:prstGeom prst="rect">
+              <a:avLst/>
+            </a:prstGeom>
+            <a:solidFill>
+              <a:schemeClr val="bg1">
+                <a:lumMod val="95000"/>
+              </a:schemeClr>
+            </a:solidFill>
+            <a:ln>
+              <a:solidFill>
+                <a:schemeClr val="tx1"/>
+              </a:solidFill>
+            </a:ln>
+          </p:spPr>
+          <p:style>
+            <a:lnRef idx="2">
+              <a:schemeClr val="accent1">
+                <a:shade val="50000"/>
+              </a:schemeClr>
+            </a:lnRef>
+            <a:fillRef idx="1">
+              <a:schemeClr val="accent1"/>
+            </a:fillRef>
+            <a:effectRef idx="0">
+              <a:schemeClr val="accent1"/>
+            </a:effectRef>
+            <a:fontRef idx="minor">
+              <a:schemeClr val="lt1"/>
+            </a:fontRef>
+          </p:style>
+          <p:txBody>
+            <a:bodyPr rtlCol="0" anchor="ctr"/>
+            <a:lstStyle/>
+            <a:p>
+              <a:pPr algn="ctr"/>
+              <a:r>
+                <a:rPr lang="en-US" dirty="0" smtClean="0">
+                  <a:solidFill>
+                    <a:schemeClr val="tx1"/>
+                  </a:solidFill>
+                  <a:latin typeface="Times New Roman"/>
+                  <a:cs typeface="Times New Roman"/>
+                </a:rPr>
+                <a:t>ASM</a:t>
+              </a:r>
+              <a:endParaRPr lang="en-US" dirty="0">
+                <a:solidFill>
+                  <a:schemeClr val="tx1"/>
+                </a:solidFill>
+                <a:latin typeface="Times New Roman"/>
+                <a:cs typeface="Times New Roman"/>
+              </a:endParaRPr>
+            </a:p>
+          </p:txBody>
+        </p:sp>
+        <p:sp>
+          <p:nvSpPr>
+            <p:cNvPr id="174" name="Rectangle 173"/>
+            <p:cNvSpPr/>
+            <p:nvPr/>
+          </p:nvSpPr>
+          <p:spPr>
+            <a:xfrm>
+              <a:off x="5556251" y="4899128"/>
+              <a:ext cx="1828800" cy="593513"/>
+            </a:xfrm>
+            <a:prstGeom prst="rect">
+              <a:avLst/>
+            </a:prstGeom>
+            <a:solidFill>
+              <a:schemeClr val="bg1">
+                <a:lumMod val="95000"/>
+              </a:schemeClr>
+            </a:solidFill>
+            <a:ln>
+              <a:solidFill>
+                <a:schemeClr val="tx1"/>
+              </a:solidFill>
+            </a:ln>
+          </p:spPr>
+          <p:style>
+            <a:lnRef idx="2">
+              <a:schemeClr val="accent1">
+                <a:shade val="50000"/>
+              </a:schemeClr>
+            </a:lnRef>
+            <a:fillRef idx="1">
+              <a:schemeClr val="accent1"/>
+            </a:fillRef>
+            <a:effectRef idx="0">
+              <a:schemeClr val="accent1"/>
+            </a:effectRef>
+            <a:fontRef idx="minor">
+              <a:schemeClr val="lt1"/>
+            </a:fontRef>
+          </p:style>
+          <p:txBody>
+            <a:bodyPr rtlCol="0" anchor="ctr"/>
+            <a:lstStyle/>
+            <a:p>
+              <a:pPr algn="ctr"/>
+              <a:r>
+                <a:rPr lang="en-US" dirty="0" smtClean="0">
+                  <a:solidFill>
+                    <a:schemeClr val="tx1"/>
+                  </a:solidFill>
+                  <a:latin typeface="Times New Roman"/>
+                  <a:cs typeface="Times New Roman"/>
+                </a:rPr>
+                <a:t>Data</a:t>
+              </a:r>
+              <a:endParaRPr lang="en-US" dirty="0">
+                <a:solidFill>
+                  <a:schemeClr val="tx1"/>
+                </a:solidFill>
+                <a:latin typeface="Times New Roman"/>
+                <a:cs typeface="Times New Roman"/>
+              </a:endParaRPr>
+            </a:p>
+          </p:txBody>
+        </p:sp>
+        <p:sp>
+          <p:nvSpPr>
+            <p:cNvPr id="176" name="Rectangle 175"/>
+            <p:cNvSpPr/>
+            <p:nvPr/>
+          </p:nvSpPr>
+          <p:spPr>
+            <a:xfrm>
+              <a:off x="4266949" y="4899128"/>
+              <a:ext cx="137602" cy="593513"/>
+            </a:xfrm>
+            <a:prstGeom prst="rect">
+              <a:avLst/>
+            </a:prstGeom>
+            <a:solidFill>
+              <a:schemeClr val="bg1">
+                <a:lumMod val="95000"/>
+              </a:schemeClr>
+            </a:solidFill>
+            <a:ln>
+              <a:solidFill>
+                <a:schemeClr val="tx1"/>
+              </a:solidFill>
+            </a:ln>
+          </p:spPr>
+          <p:style>
+            <a:lnRef idx="2">
+              <a:schemeClr val="accent1">
+                <a:shade val="50000"/>
+              </a:schemeClr>
+            </a:lnRef>
+            <a:fillRef idx="1">
+              <a:schemeClr val="accent1"/>
+            </a:fillRef>
+            <a:effectRef idx="0">
+              <a:schemeClr val="accent1"/>
+            </a:effectRef>
+            <a:fontRef idx="minor">
+              <a:schemeClr val="lt1"/>
+            </a:fontRef>
+          </p:style>
+          <p:txBody>
+            <a:bodyPr rtlCol="0" anchor="ctr"/>
+            <a:lstStyle/>
+            <a:p>
+              <a:pPr algn="ctr"/>
+              <a:endParaRPr lang="en-US" dirty="0">
+                <a:solidFill>
+                  <a:schemeClr val="tx1"/>
+                </a:solidFill>
+                <a:latin typeface="Times New Roman"/>
+                <a:cs typeface="Times New Roman"/>
+              </a:endParaRPr>
+            </a:p>
+          </p:txBody>
+        </p:sp>
+        <p:sp>
+          <p:nvSpPr>
+            <p:cNvPr id="177" name="Rectangle 176"/>
+            <p:cNvSpPr/>
+            <p:nvPr/>
+          </p:nvSpPr>
+          <p:spPr>
+            <a:xfrm>
+              <a:off x="4404045" y="4899128"/>
+              <a:ext cx="137602" cy="593513"/>
+            </a:xfrm>
+            <a:prstGeom prst="rect">
+              <a:avLst/>
+            </a:prstGeom>
+            <a:solidFill>
+              <a:schemeClr val="bg1">
+                <a:lumMod val="95000"/>
+              </a:schemeClr>
+            </a:solidFill>
+            <a:ln>
+              <a:solidFill>
+                <a:schemeClr val="tx1"/>
+              </a:solidFill>
+            </a:ln>
+          </p:spPr>
+          <p:style>
+            <a:lnRef idx="2">
+              <a:schemeClr val="accent1">
+                <a:shade val="50000"/>
+              </a:schemeClr>
+            </a:lnRef>
+            <a:fillRef idx="1">
+              <a:schemeClr val="accent1"/>
+            </a:fillRef>
+            <a:effectRef idx="0">
+              <a:schemeClr val="accent1"/>
+            </a:effectRef>
+            <a:fontRef idx="minor">
+              <a:schemeClr val="lt1"/>
+            </a:fontRef>
+          </p:style>
+          <p:txBody>
+            <a:bodyPr rtlCol="0" anchor="ctr"/>
+            <a:lstStyle/>
+            <a:p>
+              <a:pPr algn="ctr"/>
+              <a:endParaRPr lang="en-US" dirty="0">
+                <a:solidFill>
+                  <a:schemeClr val="tx1"/>
+                </a:solidFill>
+                <a:latin typeface="Times New Roman"/>
+                <a:cs typeface="Times New Roman"/>
+              </a:endParaRPr>
+            </a:p>
+          </p:txBody>
+        </p:sp>
+        <p:sp>
+          <p:nvSpPr>
+            <p:cNvPr id="178" name="Rectangle 177"/>
+            <p:cNvSpPr/>
+            <p:nvPr/>
+          </p:nvSpPr>
+          <p:spPr>
+            <a:xfrm>
+              <a:off x="4541142" y="4899128"/>
+              <a:ext cx="137602" cy="593513"/>
+            </a:xfrm>
+            <a:prstGeom prst="rect">
+              <a:avLst/>
+            </a:prstGeom>
+            <a:solidFill>
+              <a:schemeClr val="bg1">
+                <a:lumMod val="95000"/>
+              </a:schemeClr>
+            </a:solidFill>
+            <a:ln>
+              <a:solidFill>
+                <a:schemeClr val="tx1"/>
+              </a:solidFill>
+            </a:ln>
+          </p:spPr>
+          <p:style>
+            <a:lnRef idx="2">
+              <a:schemeClr val="accent1">
+                <a:shade val="50000"/>
+              </a:schemeClr>
+            </a:lnRef>
+            <a:fillRef idx="1">
+              <a:schemeClr val="accent1"/>
+            </a:fillRef>
+            <a:effectRef idx="0">
+              <a:schemeClr val="accent1"/>
+            </a:effectRef>
+            <a:fontRef idx="minor">
+              <a:schemeClr val="lt1"/>
+            </a:fontRef>
+          </p:style>
+          <p:txBody>
+            <a:bodyPr rtlCol="0" anchor="ctr"/>
+            <a:lstStyle/>
+            <a:p>
+              <a:pPr algn="ctr"/>
+              <a:endParaRPr lang="en-US" dirty="0">
+                <a:solidFill>
+                  <a:schemeClr val="tx1"/>
+                </a:solidFill>
+                <a:latin typeface="Times New Roman"/>
+                <a:cs typeface="Times New Roman"/>
+              </a:endParaRPr>
+            </a:p>
+          </p:txBody>
+        </p:sp>
+        <p:sp>
+          <p:nvSpPr>
+            <p:cNvPr id="179" name="Rectangle 178"/>
+            <p:cNvSpPr/>
+            <p:nvPr/>
+          </p:nvSpPr>
+          <p:spPr>
+            <a:xfrm>
+              <a:off x="4678239" y="4899128"/>
+              <a:ext cx="137602" cy="593513"/>
+            </a:xfrm>
+            <a:prstGeom prst="rect">
+              <a:avLst/>
+            </a:prstGeom>
+            <a:solidFill>
+              <a:schemeClr val="bg1">
+                <a:lumMod val="95000"/>
+              </a:schemeClr>
+            </a:solidFill>
+            <a:ln>
+              <a:solidFill>
+                <a:schemeClr val="tx1"/>
+              </a:solidFill>
+            </a:ln>
+          </p:spPr>
+          <p:style>
+            <a:lnRef idx="2">
+              <a:schemeClr val="accent1">
+                <a:shade val="50000"/>
+              </a:schemeClr>
+            </a:lnRef>
+            <a:fillRef idx="1">
+              <a:schemeClr val="accent1"/>
+            </a:fillRef>
+            <a:effectRef idx="0">
+              <a:schemeClr val="accent1"/>
+            </a:effectRef>
+            <a:fontRef idx="minor">
+              <a:schemeClr val="lt1"/>
+            </a:fontRef>
+          </p:style>
+          <p:txBody>
+            <a:bodyPr rtlCol="0" anchor="ctr"/>
+            <a:lstStyle/>
+            <a:p>
+              <a:pPr algn="ctr"/>
+              <a:endParaRPr lang="en-US" dirty="0">
+                <a:solidFill>
+                  <a:schemeClr val="tx1"/>
+                </a:solidFill>
+                <a:latin typeface="Times New Roman"/>
+                <a:cs typeface="Times New Roman"/>
+              </a:endParaRPr>
+            </a:p>
+          </p:txBody>
+        </p:sp>
+        <p:sp>
+          <p:nvSpPr>
+            <p:cNvPr id="180" name="Rectangle 179"/>
+            <p:cNvSpPr/>
+            <p:nvPr/>
+          </p:nvSpPr>
+          <p:spPr>
+            <a:xfrm>
+              <a:off x="7376161" y="4899128"/>
+              <a:ext cx="137602" cy="593513"/>
+            </a:xfrm>
+            <a:prstGeom prst="rect">
+              <a:avLst/>
+            </a:prstGeom>
+            <a:solidFill>
+              <a:schemeClr val="bg1">
+                <a:lumMod val="95000"/>
+              </a:schemeClr>
+            </a:solidFill>
+            <a:ln>
+              <a:solidFill>
+                <a:schemeClr val="tx1"/>
+              </a:solidFill>
+            </a:ln>
+          </p:spPr>
+          <p:style>
+            <a:lnRef idx="2">
+              <a:schemeClr val="accent1">
+                <a:shade val="50000"/>
+              </a:schemeClr>
+            </a:lnRef>
+            <a:fillRef idx="1">
+              <a:schemeClr val="accent1"/>
+            </a:fillRef>
+            <a:effectRef idx="0">
+              <a:schemeClr val="accent1"/>
+            </a:effectRef>
+            <a:fontRef idx="minor">
+              <a:schemeClr val="lt1"/>
+            </a:fontRef>
+          </p:style>
+          <p:txBody>
+            <a:bodyPr rtlCol="0" anchor="ctr"/>
+            <a:lstStyle/>
+            <a:p>
+              <a:pPr algn="ctr"/>
+              <a:endParaRPr lang="en-US" dirty="0">
+                <a:solidFill>
+                  <a:schemeClr val="tx1"/>
+                </a:solidFill>
+                <a:latin typeface="Times New Roman"/>
+                <a:cs typeface="Times New Roman"/>
+              </a:endParaRPr>
+            </a:p>
+          </p:txBody>
+        </p:sp>
+        <p:sp>
+          <p:nvSpPr>
+            <p:cNvPr id="181" name="Rectangle 180"/>
+            <p:cNvSpPr/>
+            <p:nvPr/>
+          </p:nvSpPr>
+          <p:spPr>
+            <a:xfrm>
+              <a:off x="7513258" y="4899128"/>
+              <a:ext cx="137602" cy="593513"/>
+            </a:xfrm>
+            <a:prstGeom prst="rect">
+              <a:avLst/>
+            </a:prstGeom>
+            <a:solidFill>
+              <a:schemeClr val="bg1">
+                <a:lumMod val="95000"/>
+              </a:schemeClr>
+            </a:solidFill>
+            <a:ln>
+              <a:solidFill>
+                <a:schemeClr val="tx1"/>
+              </a:solidFill>
+            </a:ln>
+          </p:spPr>
+          <p:style>
+            <a:lnRef idx="2">
+              <a:schemeClr val="accent1">
+                <a:shade val="50000"/>
+              </a:schemeClr>
+            </a:lnRef>
+            <a:fillRef idx="1">
+              <a:schemeClr val="accent1"/>
+            </a:fillRef>
+            <a:effectRef idx="0">
+              <a:schemeClr val="accent1"/>
+            </a:effectRef>
+            <a:fontRef idx="minor">
+              <a:schemeClr val="lt1"/>
+            </a:fontRef>
+          </p:style>
+          <p:txBody>
+            <a:bodyPr rtlCol="0" anchor="ctr"/>
+            <a:lstStyle/>
+            <a:p>
+              <a:pPr algn="ctr"/>
+              <a:endParaRPr lang="en-US" dirty="0">
+                <a:solidFill>
+                  <a:schemeClr val="tx1"/>
+                </a:solidFill>
+                <a:latin typeface="Times New Roman"/>
+                <a:cs typeface="Times New Roman"/>
+              </a:endParaRPr>
+            </a:p>
+          </p:txBody>
+        </p:sp>
+        <p:sp>
+          <p:nvSpPr>
+            <p:cNvPr id="182" name="Rectangle 181"/>
+            <p:cNvSpPr/>
+            <p:nvPr/>
+          </p:nvSpPr>
+          <p:spPr>
+            <a:xfrm>
+              <a:off x="7650355" y="4899128"/>
+              <a:ext cx="137602" cy="593513"/>
+            </a:xfrm>
+            <a:prstGeom prst="rect">
+              <a:avLst/>
+            </a:prstGeom>
+            <a:solidFill>
+              <a:schemeClr val="bg1">
+                <a:lumMod val="95000"/>
+              </a:schemeClr>
+            </a:solidFill>
+            <a:ln>
+              <a:solidFill>
+                <a:schemeClr val="tx1"/>
+              </a:solidFill>
+            </a:ln>
+          </p:spPr>
+          <p:style>
+            <a:lnRef idx="2">
+              <a:schemeClr val="accent1">
+                <a:shade val="50000"/>
+              </a:schemeClr>
+            </a:lnRef>
+            <a:fillRef idx="1">
+              <a:schemeClr val="accent1"/>
+            </a:fillRef>
+            <a:effectRef idx="0">
+              <a:schemeClr val="accent1"/>
+            </a:effectRef>
+            <a:fontRef idx="minor">
+              <a:schemeClr val="lt1"/>
+            </a:fontRef>
+          </p:style>
+          <p:txBody>
+            <a:bodyPr rtlCol="0" anchor="ctr"/>
+            <a:lstStyle/>
+            <a:p>
+              <a:pPr algn="ctr"/>
+              <a:endParaRPr lang="en-US" dirty="0">
+                <a:solidFill>
+                  <a:schemeClr val="tx1"/>
+                </a:solidFill>
+                <a:latin typeface="Times New Roman"/>
+                <a:cs typeface="Times New Roman"/>
+              </a:endParaRPr>
+            </a:p>
+          </p:txBody>
+        </p:sp>
+        <p:sp>
+          <p:nvSpPr>
+            <p:cNvPr id="183" name="Rectangle 182"/>
+            <p:cNvSpPr/>
+            <p:nvPr/>
+          </p:nvSpPr>
+          <p:spPr>
+            <a:xfrm>
+              <a:off x="7787452" y="4899128"/>
+              <a:ext cx="137602" cy="593513"/>
+            </a:xfrm>
+            <a:prstGeom prst="rect">
+              <a:avLst/>
+            </a:prstGeom>
+            <a:solidFill>
+              <a:schemeClr val="bg1">
+                <a:lumMod val="95000"/>
+              </a:schemeClr>
+            </a:solidFill>
+            <a:ln>
+              <a:solidFill>
+                <a:schemeClr val="tx1"/>
+              </a:solidFill>
+            </a:ln>
+          </p:spPr>
+          <p:style>
+            <a:lnRef idx="2">
+              <a:schemeClr val="accent1">
+                <a:shade val="50000"/>
+              </a:schemeClr>
+            </a:lnRef>
+            <a:fillRef idx="1">
+              <a:schemeClr val="accent1"/>
+            </a:fillRef>
+            <a:effectRef idx="0">
+              <a:schemeClr val="accent1"/>
+            </a:effectRef>
+            <a:fontRef idx="minor">
+              <a:schemeClr val="lt1"/>
+            </a:fontRef>
+          </p:style>
+          <p:txBody>
+            <a:bodyPr rtlCol="0" anchor="ctr"/>
+            <a:lstStyle/>
+            <a:p>
+              <a:pPr algn="ctr"/>
+              <a:endParaRPr lang="en-US" dirty="0">
+                <a:solidFill>
+                  <a:schemeClr val="tx1"/>
+                </a:solidFill>
+                <a:latin typeface="Times New Roman"/>
+                <a:cs typeface="Times New Roman"/>
+              </a:endParaRPr>
+            </a:p>
+          </p:txBody>
+        </p:sp>
+        <p:cxnSp>
+          <p:nvCxnSpPr>
+            <p:cNvPr id="193" name="Straight Arrow Connector 192"/>
+            <p:cNvCxnSpPr/>
+            <p:nvPr/>
+          </p:nvCxnSpPr>
+          <p:spPr>
+            <a:xfrm flipV="1">
+              <a:off x="4267454" y="5574268"/>
+              <a:ext cx="3657600" cy="1"/>
+            </a:xfrm>
+            <a:prstGeom prst="straightConnector1">
+              <a:avLst/>
+            </a:prstGeom>
+            <a:ln w="12700">
+              <a:solidFill>
+                <a:schemeClr val="tx1"/>
+              </a:solidFill>
+              <a:headEnd type="triangle" w="med" len="med"/>
+              <a:tailEnd type="triangle" w="med" len="med"/>
+            </a:ln>
+          </p:spPr>
+          <p:style>
+            <a:lnRef idx="1">
+              <a:schemeClr val="accent1"/>
+            </a:lnRef>
+            <a:fillRef idx="0">
+              <a:schemeClr val="accent1"/>
+            </a:fillRef>
+            <a:effectRef idx="0">
+              <a:schemeClr val="accent1"/>
+            </a:effectRef>
+            <a:fontRef idx="minor">
+              <a:schemeClr val="tx1"/>
+            </a:fontRef>
+          </p:style>
+        </p:cxnSp>
+        <p:sp>
+          <p:nvSpPr>
+            <p:cNvPr id="194" name="Rectangle 193"/>
+            <p:cNvSpPr/>
+            <p:nvPr/>
+          </p:nvSpPr>
+          <p:spPr>
+            <a:xfrm>
+              <a:off x="5260151" y="5574268"/>
+              <a:ext cx="1676400" cy="369332"/>
+            </a:xfrm>
+            <a:prstGeom prst="rect">
+              <a:avLst/>
+            </a:prstGeom>
+          </p:spPr>
+          <p:txBody>
+            <a:bodyPr wrap="square">
+              <a:spAutoFit/>
+            </a:bodyPr>
+            <a:lstStyle/>
+            <a:p>
+              <a:pPr algn="ctr"/>
+              <a:r>
+                <a:rPr lang="en-US" dirty="0" smtClean="0">
+                  <a:latin typeface="Times New Roman"/>
+                  <a:cs typeface="Times New Roman"/>
+                </a:rPr>
+                <a:t>12672 samples</a:t>
+              </a:r>
+              <a:endParaRPr lang="en-US" dirty="0">
+                <a:latin typeface="Times New Roman"/>
+                <a:cs typeface="Times New Roman"/>
+              </a:endParaRPr>
+            </a:p>
+          </p:txBody>
+        </p:sp>
+        <p:sp>
+          <p:nvSpPr>
+            <p:cNvPr id="195" name="Left Brace 194"/>
+            <p:cNvSpPr/>
+            <p:nvPr/>
+          </p:nvSpPr>
+          <p:spPr>
+            <a:xfrm rot="5400000">
+              <a:off x="4461683" y="4467245"/>
+              <a:ext cx="155448" cy="552869"/>
+            </a:xfrm>
+            <a:prstGeom prst="leftBrace">
+              <a:avLst/>
+            </a:prstGeom>
+            <a:ln w="12700">
+              <a:solidFill>
+                <a:schemeClr val="tx1"/>
+              </a:solidFill>
+            </a:ln>
+          </p:spPr>
+          <p:style>
+            <a:lnRef idx="1">
+              <a:schemeClr val="accent1"/>
+            </a:lnRef>
+            <a:fillRef idx="0">
+              <a:schemeClr val="accent1"/>
+            </a:fillRef>
+            <a:effectRef idx="0">
+              <a:schemeClr val="accent1"/>
+            </a:effectRef>
+            <a:fontRef idx="minor">
+              <a:schemeClr val="tx1"/>
+            </a:fontRef>
+          </p:style>
+          <p:txBody>
+            <a:bodyPr rtlCol="0" anchor="ctr"/>
+            <a:lstStyle/>
+            <a:p>
+              <a:pPr algn="r"/>
+              <a:endParaRPr lang="en-US" dirty="0"/>
+            </a:p>
+          </p:txBody>
+        </p:sp>
+        <p:sp>
+          <p:nvSpPr>
+            <p:cNvPr id="196" name="Left Brace 195"/>
+            <p:cNvSpPr/>
+            <p:nvPr/>
+          </p:nvSpPr>
+          <p:spPr>
+            <a:xfrm rot="5400000">
+              <a:off x="7574871" y="4467245"/>
+              <a:ext cx="155448" cy="552869"/>
+            </a:xfrm>
+            <a:prstGeom prst="leftBrace">
+              <a:avLst/>
+            </a:prstGeom>
+            <a:ln w="12700">
+              <a:solidFill>
+                <a:schemeClr val="tx1"/>
+              </a:solidFill>
+            </a:ln>
+          </p:spPr>
+          <p:style>
+            <a:lnRef idx="1">
+              <a:schemeClr val="accent1"/>
+            </a:lnRef>
+            <a:fillRef idx="0">
+              <a:schemeClr val="accent1"/>
+            </a:fillRef>
+            <a:effectRef idx="0">
+              <a:schemeClr val="accent1"/>
+            </a:effectRef>
+            <a:fontRef idx="minor">
+              <a:schemeClr val="tx1"/>
+            </a:fontRef>
+          </p:style>
+          <p:txBody>
+            <a:bodyPr rtlCol="0" anchor="ctr"/>
+            <a:lstStyle/>
+            <a:p>
+              <a:pPr algn="r"/>
+              <a:endParaRPr lang="en-US" dirty="0"/>
+            </a:p>
+          </p:txBody>
+        </p:sp>
+        <p:cxnSp>
+          <p:nvCxnSpPr>
+            <p:cNvPr id="203" name="Straight Arrow Connector 202"/>
+            <p:cNvCxnSpPr>
+              <a:stCxn id="159" idx="1"/>
+            </p:cNvCxnSpPr>
+            <p:nvPr/>
+          </p:nvCxnSpPr>
+          <p:spPr>
+            <a:xfrm flipH="1">
+              <a:off x="6093764" y="4243779"/>
+              <a:ext cx="2360" cy="499900"/>
+            </a:xfrm>
+            <a:prstGeom prst="straightConnector1">
+              <a:avLst/>
+            </a:prstGeom>
+            <a:ln w="12700">
+              <a:solidFill>
+                <a:schemeClr val="tx1"/>
+              </a:solidFill>
+              <a:tailEnd type="triangle"/>
+            </a:ln>
+          </p:spPr>
+          <p:style>
+            <a:lnRef idx="1">
+              <a:schemeClr val="accent1"/>
+            </a:lnRef>
+            <a:fillRef idx="0">
+              <a:schemeClr val="accent1"/>
+            </a:fillRef>
+            <a:effectRef idx="0">
+              <a:schemeClr val="accent1"/>
+            </a:effectRef>
+            <a:fontRef idx="minor">
+              <a:schemeClr val="tx1"/>
+            </a:fontRef>
+          </p:style>
+        </p:cxnSp>
+        <p:sp>
+          <p:nvSpPr>
+            <p:cNvPr id="205" name="Rectangle 204"/>
+            <p:cNvSpPr/>
+            <p:nvPr/>
+          </p:nvSpPr>
+          <p:spPr>
+            <a:xfrm>
+              <a:off x="3834727" y="4296624"/>
+              <a:ext cx="1409360" cy="369332"/>
+            </a:xfrm>
+            <a:prstGeom prst="rect">
+              <a:avLst/>
+            </a:prstGeom>
+          </p:spPr>
+          <p:txBody>
+            <a:bodyPr wrap="none">
+              <a:spAutoFit/>
+            </a:bodyPr>
+            <a:lstStyle/>
+            <a:p>
+              <a:pPr algn="ctr"/>
+              <a:r>
+                <a:rPr lang="en-US" dirty="0" smtClean="0">
+                  <a:latin typeface="Times New Roman"/>
+                  <a:cs typeface="Times New Roman"/>
+                </a:rPr>
+                <a:t>Cyclic Prefix</a:t>
+              </a:r>
+              <a:endParaRPr lang="en-US" dirty="0">
+                <a:latin typeface="Times New Roman"/>
+                <a:cs typeface="Times New Roman"/>
+              </a:endParaRPr>
+            </a:p>
+          </p:txBody>
+        </p:sp>
+        <p:sp>
+          <p:nvSpPr>
+            <p:cNvPr id="206" name="Rectangle 205"/>
+            <p:cNvSpPr/>
+            <p:nvPr/>
+          </p:nvSpPr>
+          <p:spPr>
+            <a:xfrm>
+              <a:off x="6948161" y="4296624"/>
+              <a:ext cx="1409360" cy="369332"/>
+            </a:xfrm>
+            <a:prstGeom prst="rect">
+              <a:avLst/>
+            </a:prstGeom>
+          </p:spPr>
+          <p:txBody>
+            <a:bodyPr wrap="none">
+              <a:spAutoFit/>
+            </a:bodyPr>
+            <a:lstStyle/>
+            <a:p>
+              <a:pPr algn="ctr"/>
+              <a:r>
+                <a:rPr lang="en-US" dirty="0" smtClean="0">
+                  <a:latin typeface="Times New Roman"/>
+                  <a:cs typeface="Times New Roman"/>
+                </a:rPr>
+                <a:t>Cyclic Prefix</a:t>
+              </a:r>
+              <a:endParaRPr lang="en-US" dirty="0">
+                <a:latin typeface="Times New Roman"/>
+                <a:cs typeface="Times New Roman"/>
+              </a:endParaRPr>
+            </a:p>
+          </p:txBody>
+        </p:sp>
+      </p:grpSp>
+    </p:spTree>
+    <p:extLst>
+      <p:ext uri="{BB962C8B-B14F-4D97-AF65-F5344CB8AC3E}">
+        <p14:creationId xmlns:p14="http://schemas.microsoft.com/office/powerpoint/2010/main" val="3467809309"/>
+      </p:ext>
+    </p:extLst>
+  </p:cSld>
+  <p:clrMapOvr>
+    <a:masterClrMapping/>
+  </p:clrMapOvr>
+  <p:timing>
+    <p:tnLst>
+      <p:par>
+        <p:cTn id="1" dur="indefinite" restart="never" nodeType="tmRoot"/>
+      </p:par>
+    </p:tnLst>
+  </p:timing>
+</p:sld>
+</file>
+
 <file path=ppt/tags/tag1.xml><?xml version="1.0" encoding="utf-8"?>
 <p:tagLst xmlns:a="http://schemas.openxmlformats.org/drawingml/2006/main" xmlns:r="http://schemas.openxmlformats.org/officeDocument/2006/relationships" xmlns:p="http://schemas.openxmlformats.org/presentationml/2006/main">
   <p:tag name="ORIGINALHEIGHT" val="120.7349"/>
@@ -11128,22 +14548,6 @@
 
 <file path=ppt/tags/tag12.xml><?xml version="1.0" encoding="utf-8"?>
 <p:tagLst xmlns:a="http://schemas.openxmlformats.org/drawingml/2006/main" xmlns:r="http://schemas.openxmlformats.org/officeDocument/2006/relationships" xmlns:p="http://schemas.openxmlformats.org/presentationml/2006/main">
-  <p:tag name="ORIGINALHEIGHT" val="56.24299"/>
-  <p:tag name="ORIGINALWIDTH" val="68.24149"/>
-  <p:tag name="OUTPUTDPI" val="1200"/>
-  <p:tag name="LATEXADDIN" val="\documentclass{article}&#10;\usepackage{amsmath}&#10;\pagestyle{empty}&#10;\begin{document}&#10;&#10;$n$&#10;&#10;&#10;\end{document}"/>
-  <p:tag name="IGUANATEXSIZE" val="20"/>
-  <p:tag name="IGUANATEXCURSOR" val="82"/>
-  <p:tag name="TRANSPARENCY" val="True"/>
-  <p:tag name="FILENAME" val=""/>
-  <p:tag name="INPUTTYPE" val="0"/>
-  <p:tag name="LATEXENGINEID" val="0"/>
-  <p:tag name="TEMPFOLDER" val="C:\Users\ecestudent\Documents\IguanaTexTemp\"/>
-</p:tagLst>
-</file>
-
-<file path=ppt/tags/tag13.xml><?xml version="1.0" encoding="utf-8"?>
-<p:tagLst xmlns:a="http://schemas.openxmlformats.org/drawingml/2006/main" xmlns:r="http://schemas.openxmlformats.org/officeDocument/2006/relationships" xmlns:p="http://schemas.openxmlformats.org/presentationml/2006/main">
   <p:tag name="ORIGINALHEIGHT" val="123.7346"/>
   <p:tag name="ORIGINALWIDTH" val="218.2228"/>
   <p:tag name="OUTPUTDPI" val="1200"/>
@@ -11158,7 +14562,7 @@
 </p:tagLst>
 </file>
 
-<file path=ppt/tags/tag14.xml><?xml version="1.0" encoding="utf-8"?>
+<file path=ppt/tags/tag13.xml><?xml version="1.0" encoding="utf-8"?>
 <p:tagLst xmlns:a="http://schemas.openxmlformats.org/drawingml/2006/main" xmlns:r="http://schemas.openxmlformats.org/officeDocument/2006/relationships" xmlns:p="http://schemas.openxmlformats.org/presentationml/2006/main">
   <p:tag name="ORIGINALHEIGHT" val="123.7346"/>
   <p:tag name="ORIGINALWIDTH" val="221.2224"/>
@@ -11174,14 +14578,30 @@
 </p:tagLst>
 </file>
 
+<file path=ppt/tags/tag14.xml><?xml version="1.0" encoding="utf-8"?>
+<p:tagLst xmlns:a="http://schemas.openxmlformats.org/drawingml/2006/main" xmlns:r="http://schemas.openxmlformats.org/officeDocument/2006/relationships" xmlns:p="http://schemas.openxmlformats.org/presentationml/2006/main">
+  <p:tag name="ORIGINALHEIGHT" val="123.7346"/>
+  <p:tag name="ORIGINALWIDTH" val="266.2167"/>
+  <p:tag name="OUTPUTDPI" val="1200"/>
+  <p:tag name="LATEXADDIN" val="\documentclass{article}&#10;\usepackage{amsmath}&#10;\pagestyle{empty}&#10;\begin{document}&#10;&#10;$m(n)$&#10;&#10;&#10;\end{document}"/>
+  <p:tag name="IGUANATEXSIZE" val="20"/>
+  <p:tag name="IGUANATEXCURSOR" val="83"/>
+  <p:tag name="TRANSPARENCY" val="True"/>
+  <p:tag name="FILENAME" val=""/>
+  <p:tag name="INPUTTYPE" val="0"/>
+  <p:tag name="LATEXENGINEID" val="0"/>
+  <p:tag name="TEMPFOLDER" val="C:\Users\ecestudent\Documents\IguanaTexTemp\"/>
+</p:tagLst>
+</file>
+
 <file path=ppt/tags/tag15.xml><?xml version="1.0" encoding="utf-8"?>
 <p:tagLst xmlns:a="http://schemas.openxmlformats.org/drawingml/2006/main" xmlns:r="http://schemas.openxmlformats.org/officeDocument/2006/relationships" xmlns:p="http://schemas.openxmlformats.org/presentationml/2006/main">
-  <p:tag name="ORIGINALHEIGHT" val="123.7346"/>
-  <p:tag name="ORIGINALWIDTH" val="207.724"/>
+  <p:tag name="ORIGINALHEIGHT" val="56.24299"/>
+  <p:tag name="ORIGINALWIDTH" val="68.24149"/>
   <p:tag name="OUTPUTDPI" val="1200"/>
-  <p:tag name="LATEXADDIN" val="\documentclass{article}&#10;\usepackage{amsmath}&#10;\pagestyle{empty}&#10;\begin{document}&#10;&#10;$b(n)$&#10;&#10;&#10;\end{document}"/>
+  <p:tag name="LATEXADDIN" val="\documentclass{article}&#10;\usepackage{amsmath}&#10;\pagestyle{empty}&#10;\begin{document}&#10;&#10;$n$&#10;&#10;&#10;\end{document}"/>
   <p:tag name="IGUANATEXSIZE" val="20"/>
-  <p:tag name="IGUANATEXCURSOR" val="83"/>
+  <p:tag name="IGUANATEXCURSOR" val="82"/>
   <p:tag name="TRANSPARENCY" val="True"/>
   <p:tag name="FILENAME" val=""/>
   <p:tag name="INPUTTYPE" val="0"/>
@@ -11334,6 +14754,102 @@
 </p:tagLst>
 </file>
 
+<file path=ppt/tags/tag24.xml><?xml version="1.0" encoding="utf-8"?>
+<p:tagLst xmlns:a="http://schemas.openxmlformats.org/drawingml/2006/main" xmlns:r="http://schemas.openxmlformats.org/officeDocument/2006/relationships" xmlns:p="http://schemas.openxmlformats.org/presentationml/2006/main">
+  <p:tag name="ORIGINALHEIGHT" val="107.2366"/>
+  <p:tag name="ORIGINALWIDTH" val="452.1935"/>
+  <p:tag name="OUTPUTDPI" val="1200"/>
+  <p:tag name="LATEXADDIN" val="\documentclass{article}&#10;\usepackage{amsmath}&#10;\pagestyle{empty}&#10;\begin{document}&#10;&#10;$\text{CD98}_\text{hex}$&#10;&#10;&#10;\end{document}"/>
+  <p:tag name="IGUANATEXSIZE" val="20"/>
+  <p:tag name="IGUANATEXCURSOR" val="103"/>
+  <p:tag name="TRANSPARENCY" val="True"/>
+  <p:tag name="FILENAME" val=""/>
+  <p:tag name="INPUTTYPE" val="0"/>
+  <p:tag name="LATEXENGINEID" val="0"/>
+  <p:tag name="TEMPFOLDER" val="C:\Users\ecestudent\Documents\IguanaTexTemp\"/>
+</p:tagLst>
+</file>
+
+<file path=ppt/tags/tag25.xml><?xml version="1.0" encoding="utf-8"?>
+<p:tagLst xmlns:a="http://schemas.openxmlformats.org/drawingml/2006/main" xmlns:r="http://schemas.openxmlformats.org/officeDocument/2006/relationships" xmlns:p="http://schemas.openxmlformats.org/presentationml/2006/main">
+  <p:tag name="ORIGINALHEIGHT" val="107.2366"/>
+  <p:tag name="ORIGINALWIDTH" val="452.1935"/>
+  <p:tag name="OUTPUTDPI" val="1200"/>
+  <p:tag name="LATEXADDIN" val="\documentclass{article}&#10;\usepackage{amsmath}&#10;\pagestyle{empty}&#10;\begin{document}&#10;&#10;$\text{CD98}_\text{hex}$&#10;&#10;&#10;\end{document}"/>
+  <p:tag name="IGUANATEXSIZE" val="20"/>
+  <p:tag name="IGUANATEXCURSOR" val="103"/>
+  <p:tag name="TRANSPARENCY" val="True"/>
+  <p:tag name="FILENAME" val=""/>
+  <p:tag name="INPUTTYPE" val="0"/>
+  <p:tag name="LATEXENGINEID" val="0"/>
+  <p:tag name="TEMPFOLDER" val="C:\Users\ecestudent\Documents\IguanaTexTemp\"/>
+</p:tagLst>
+</file>
+
+<file path=ppt/tags/tag26.xml><?xml version="1.0" encoding="utf-8"?>
+<p:tagLst xmlns:a="http://schemas.openxmlformats.org/drawingml/2006/main" xmlns:r="http://schemas.openxmlformats.org/officeDocument/2006/relationships" xmlns:p="http://schemas.openxmlformats.org/presentationml/2006/main">
+  <p:tag name="ORIGINALHEIGHT" val="107.2366"/>
+  <p:tag name="ORIGINALWIDTH" val="452.1935"/>
+  <p:tag name="OUTPUTDPI" val="1200"/>
+  <p:tag name="LATEXADDIN" val="\documentclass{article}&#10;\usepackage{amsmath}&#10;\pagestyle{empty}&#10;\begin{document}&#10;&#10;$\text{CD98}_\text{hex}$&#10;&#10;&#10;\end{document}"/>
+  <p:tag name="IGUANATEXSIZE" val="20"/>
+  <p:tag name="IGUANATEXCURSOR" val="103"/>
+  <p:tag name="TRANSPARENCY" val="True"/>
+  <p:tag name="FILENAME" val=""/>
+  <p:tag name="INPUTTYPE" val="0"/>
+  <p:tag name="LATEXENGINEID" val="0"/>
+  <p:tag name="TEMPFOLDER" val="C:\Users\ecestudent\Documents\IguanaTexTemp\"/>
+</p:tagLst>
+</file>
+
+<file path=ppt/tags/tag27.xml><?xml version="1.0" encoding="utf-8"?>
+<p:tagLst xmlns:a="http://schemas.openxmlformats.org/drawingml/2006/main" xmlns:r="http://schemas.openxmlformats.org/officeDocument/2006/relationships" xmlns:p="http://schemas.openxmlformats.org/presentationml/2006/main">
+  <p:tag name="ORIGINALHEIGHT" val="107.2366"/>
+  <p:tag name="ORIGINALWIDTH" val="452.1935"/>
+  <p:tag name="OUTPUTDPI" val="1200"/>
+  <p:tag name="LATEXADDIN" val="\documentclass{article}&#10;\usepackage{amsmath}&#10;\pagestyle{empty}&#10;\begin{document}&#10;&#10;$\text{CD98}_\text{hex}$&#10;&#10;&#10;\end{document}"/>
+  <p:tag name="IGUANATEXSIZE" val="20"/>
+  <p:tag name="IGUANATEXCURSOR" val="103"/>
+  <p:tag name="TRANSPARENCY" val="True"/>
+  <p:tag name="FILENAME" val=""/>
+  <p:tag name="INPUTTYPE" val="0"/>
+  <p:tag name="LATEXENGINEID" val="0"/>
+  <p:tag name="TEMPFOLDER" val="C:\Users\ecestudent\Documents\IguanaTexTemp\"/>
+</p:tagLst>
+</file>
+
+<file path=ppt/tags/tag28.xml><?xml version="1.0" encoding="utf-8"?>
+<p:tagLst xmlns:a="http://schemas.openxmlformats.org/drawingml/2006/main" xmlns:r="http://schemas.openxmlformats.org/officeDocument/2006/relationships" xmlns:p="http://schemas.openxmlformats.org/presentationml/2006/main">
+  <p:tag name="ORIGINALHEIGHT" val="107.2366"/>
+  <p:tag name="ORIGINALWIDTH" val="452.1935"/>
+  <p:tag name="OUTPUTDPI" val="1200"/>
+  <p:tag name="LATEXADDIN" val="\documentclass{article}&#10;\usepackage{amsmath}&#10;\pagestyle{empty}&#10;\begin{document}&#10;&#10;$\text{CD98}_\text{hex}$&#10;&#10;&#10;\end{document}"/>
+  <p:tag name="IGUANATEXSIZE" val="20"/>
+  <p:tag name="IGUANATEXCURSOR" val="103"/>
+  <p:tag name="TRANSPARENCY" val="True"/>
+  <p:tag name="FILENAME" val=""/>
+  <p:tag name="INPUTTYPE" val="0"/>
+  <p:tag name="LATEXENGINEID" val="0"/>
+  <p:tag name="TEMPFOLDER" val="C:\Users\ecestudent\Documents\IguanaTexTemp\"/>
+</p:tagLst>
+</file>
+
+<file path=ppt/tags/tag29.xml><?xml version="1.0" encoding="utf-8"?>
+<p:tagLst xmlns:a="http://schemas.openxmlformats.org/drawingml/2006/main" xmlns:r="http://schemas.openxmlformats.org/officeDocument/2006/relationships" xmlns:p="http://schemas.openxmlformats.org/presentationml/2006/main">
+  <p:tag name="ORIGINALHEIGHT" val="107.2366"/>
+  <p:tag name="ORIGINALWIDTH" val="452.1935"/>
+  <p:tag name="OUTPUTDPI" val="1200"/>
+  <p:tag name="LATEXADDIN" val="\documentclass{article}&#10;\usepackage{amsmath}&#10;\pagestyle{empty}&#10;\begin{document}&#10;&#10;$\text{CD98}_\text{hex}$&#10;&#10;&#10;\end{document}"/>
+  <p:tag name="IGUANATEXSIZE" val="20"/>
+  <p:tag name="IGUANATEXCURSOR" val="103"/>
+  <p:tag name="TRANSPARENCY" val="True"/>
+  <p:tag name="FILENAME" val=""/>
+  <p:tag name="INPUTTYPE" val="0"/>
+  <p:tag name="LATEXENGINEID" val="0"/>
+  <p:tag name="TEMPFOLDER" val="C:\Users\ecestudent\Documents\IguanaTexTemp\"/>
+</p:tagLst>
+</file>
+
 <file path=ppt/tags/tag3.xml><?xml version="1.0" encoding="utf-8"?>
 <p:tagLst xmlns:a="http://schemas.openxmlformats.org/drawingml/2006/main" xmlns:r="http://schemas.openxmlformats.org/officeDocument/2006/relationships" xmlns:p="http://schemas.openxmlformats.org/presentationml/2006/main">
   <p:tag name="ORIGINALHEIGHT" val="56.24299"/>
@@ -11342,6 +14858,70 @@
   <p:tag name="LATEXADDIN" val="\documentclass{article}&#10;\usepackage{amsmath}&#10;\pagestyle{empty}&#10;\begin{document}&#10;&#10;$n$&#10;&#10;&#10;\end{document}"/>
   <p:tag name="IGUANATEXSIZE" val="20"/>
   <p:tag name="IGUANATEXCURSOR" val="82"/>
+  <p:tag name="TRANSPARENCY" val="True"/>
+  <p:tag name="FILENAME" val=""/>
+  <p:tag name="INPUTTYPE" val="0"/>
+  <p:tag name="LATEXENGINEID" val="0"/>
+  <p:tag name="TEMPFOLDER" val="C:\Users\ecestudent\Documents\IguanaTexTemp\"/>
+</p:tagLst>
+</file>
+
+<file path=ppt/tags/tag30.xml><?xml version="1.0" encoding="utf-8"?>
+<p:tagLst xmlns:a="http://schemas.openxmlformats.org/drawingml/2006/main" xmlns:r="http://schemas.openxmlformats.org/officeDocument/2006/relationships" xmlns:p="http://schemas.openxmlformats.org/presentationml/2006/main">
+  <p:tag name="ORIGINALHEIGHT" val="107.2366"/>
+  <p:tag name="ORIGINALWIDTH" val="452.1935"/>
+  <p:tag name="OUTPUTDPI" val="1200"/>
+  <p:tag name="LATEXADDIN" val="\documentclass{article}&#10;\usepackage{amsmath}&#10;\pagestyle{empty}&#10;\begin{document}&#10;&#10;$\text{CD98}_\text{hex}$&#10;&#10;&#10;\end{document}"/>
+  <p:tag name="IGUANATEXSIZE" val="20"/>
+  <p:tag name="IGUANATEXCURSOR" val="103"/>
+  <p:tag name="TRANSPARENCY" val="True"/>
+  <p:tag name="FILENAME" val=""/>
+  <p:tag name="INPUTTYPE" val="0"/>
+  <p:tag name="LATEXENGINEID" val="0"/>
+  <p:tag name="TEMPFOLDER" val="C:\Users\ecestudent\Documents\IguanaTexTemp\"/>
+</p:tagLst>
+</file>
+
+<file path=ppt/tags/tag31.xml><?xml version="1.0" encoding="utf-8"?>
+<p:tagLst xmlns:a="http://schemas.openxmlformats.org/drawingml/2006/main" xmlns:r="http://schemas.openxmlformats.org/officeDocument/2006/relationships" xmlns:p="http://schemas.openxmlformats.org/presentationml/2006/main">
+  <p:tag name="ORIGINALHEIGHT" val="107.2366"/>
+  <p:tag name="ORIGINALWIDTH" val="452.1935"/>
+  <p:tag name="OUTPUTDPI" val="1200"/>
+  <p:tag name="LATEXADDIN" val="\documentclass{article}&#10;\usepackage{amsmath}&#10;\pagestyle{empty}&#10;\begin{document}&#10;&#10;$\text{CD98}_\text{hex}$&#10;&#10;&#10;\end{document}"/>
+  <p:tag name="IGUANATEXSIZE" val="20"/>
+  <p:tag name="IGUANATEXCURSOR" val="103"/>
+  <p:tag name="TRANSPARENCY" val="True"/>
+  <p:tag name="FILENAME" val=""/>
+  <p:tag name="INPUTTYPE" val="0"/>
+  <p:tag name="LATEXENGINEID" val="0"/>
+  <p:tag name="TEMPFOLDER" val="C:\Users\ecestudent\Documents\IguanaTexTemp\"/>
+</p:tagLst>
+</file>
+
+<file path=ppt/tags/tag32.xml><?xml version="1.0" encoding="utf-8"?>
+<p:tagLst xmlns:a="http://schemas.openxmlformats.org/drawingml/2006/main" xmlns:r="http://schemas.openxmlformats.org/officeDocument/2006/relationships" xmlns:p="http://schemas.openxmlformats.org/presentationml/2006/main">
+  <p:tag name="ORIGINALHEIGHT" val="13.49835"/>
+  <p:tag name="ORIGINALWIDTH" val="124.4844"/>
+  <p:tag name="OUTPUTDPI" val="1200"/>
+  <p:tag name="LATEXADDIN" val="\documentclass{article}&#10;\usepackage{amsmath}&#10;\pagestyle{empty}&#10;\begin{document}&#10;&#10;&#10;$\cdots$&#10;&#10;&#10;\end{document}"/>
+  <p:tag name="IGUANATEXSIZE" val="20"/>
+  <p:tag name="IGUANATEXCURSOR" val="86"/>
+  <p:tag name="TRANSPARENCY" val="True"/>
+  <p:tag name="FILENAME" val=""/>
+  <p:tag name="INPUTTYPE" val="0"/>
+  <p:tag name="LATEXENGINEID" val="0"/>
+  <p:tag name="TEMPFOLDER" val="C:\Users\ecestudent\Documents\IguanaTexTemp\"/>
+</p:tagLst>
+</file>
+
+<file path=ppt/tags/tag33.xml><?xml version="1.0" encoding="utf-8"?>
+<p:tagLst xmlns:a="http://schemas.openxmlformats.org/drawingml/2006/main" xmlns:r="http://schemas.openxmlformats.org/officeDocument/2006/relationships" xmlns:p="http://schemas.openxmlformats.org/presentationml/2006/main">
+  <p:tag name="ORIGINALHEIGHT" val="13.49835"/>
+  <p:tag name="ORIGINALWIDTH" val="124.4844"/>
+  <p:tag name="OUTPUTDPI" val="1200"/>
+  <p:tag name="LATEXADDIN" val="\documentclass{article}&#10;\usepackage{amsmath}&#10;\pagestyle{empty}&#10;\begin{document}&#10;&#10;&#10;$\cdots$&#10;&#10;&#10;\end{document}"/>
+  <p:tag name="IGUANATEXSIZE" val="20"/>
+  <p:tag name="IGUANATEXCURSOR" val="86"/>
   <p:tag name="TRANSPARENCY" val="True"/>
   <p:tag name="FILENAME" val=""/>
   <p:tag name="INPUTTYPE" val="0"/>

</xml_diff>